<commit_message>
A few edits and tidy-ups to the presentation
</commit_message>
<xml_diff>
--- a/svlib/doc/163-aq602-final.pptx
+++ b/svlib/doc/163-aq602-final.pptx
@@ -1257,24 +1257,7 @@
                 <a:ea typeface="+mn-ea"/>
                 <a:cs typeface="+mn-cs"/>
               </a:rPr>
-              <a:t> of </a:t>
-            </a:r>
-            <a:r>
-              <a:rPr kumimoji="0" lang="en-US" sz="1200" b="0" i="0" u="none" strike="noStrike" kern="1200" cap="none" spc="0" normalizeH="0" baseline="0" noProof="0" dirty="0" smtClean="0">
-                <a:ln>
-                  <a:noFill/>
-                </a:ln>
-                <a:solidFill>
-                  <a:schemeClr val="bg1"/>
-                </a:solidFill>
-                <a:effectLst/>
-                <a:uLnTx/>
-                <a:uFillTx/>
-                <a:latin typeface="+mn-lt"/>
-                <a:ea typeface="+mn-ea"/>
-                <a:cs typeface="+mn-cs"/>
-              </a:rPr>
-              <a:t>21</a:t>
+              <a:t> of 21</a:t>
             </a:r>
             <a:endParaRPr kumimoji="0" lang="en-US" sz="1200" b="0" i="0" u="none" strike="noStrike" kern="1200" cap="none" spc="0" normalizeH="0" baseline="0" noProof="0" dirty="0">
               <a:ln>
@@ -7898,11 +7881,7 @@
             <a:pPr algn="ctr"/>
             <a:r>
               <a:rPr lang="en-GB" sz="2000" dirty="0" smtClean="0"/>
-              <a:t>No message, returns </a:t>
-            </a:r>
-            <a:r>
-              <a:rPr lang="en-GB" sz="2000" dirty="0" smtClean="0"/>
-              <a:t> t=0</a:t>
+              <a:t>No message, returns  t=0</a:t>
             </a:r>
             <a:endParaRPr lang="en-GB" sz="2000" dirty="0"/>
           </a:p>
@@ -8549,11 +8528,7 @@
             <a:pPr lvl="1"/>
             <a:r>
               <a:rPr lang="en-US" dirty="0" smtClean="0"/>
-              <a:t>Maintains pool </a:t>
-            </a:r>
-            <a:r>
-              <a:rPr lang="en-US" dirty="0" smtClean="0"/>
-              <a:t>of reusable objects for efficiency</a:t>
+              <a:t>Maintains pool of reusable objects for efficiency</a:t>
             </a:r>
           </a:p>
           <a:p>
@@ -8751,11 +8726,7 @@
             </a:r>
             <a:r>
               <a:rPr lang="en-US" sz="2800" dirty="0" smtClean="0"/>
-              <a:t> </a:t>
-            </a:r>
-            <a:r>
-              <a:rPr lang="en-US" sz="2800" dirty="0" smtClean="0"/>
-              <a:t>generates objects – may impact random stability</a:t>
+              <a:t> generates objects – may impact random stability</a:t>
             </a:r>
             <a:endParaRPr kumimoji="0" lang="en-US" sz="2800" b="0" i="0" u="none" strike="noStrike" kern="1200" cap="none" spc="0" normalizeH="0" baseline="0" noProof="0" dirty="0" smtClean="0">
               <a:ln>
@@ -18241,6 +18212,224 @@
           </a:p>
         </p:txBody>
       </p:sp>
+      <p:sp>
+        <p:nvSpPr>
+          <p:cNvPr id="17" name="TextBox 16"/>
+          <p:cNvSpPr txBox="1"/>
+          <p:nvPr/>
+        </p:nvSpPr>
+        <p:spPr>
+          <a:xfrm>
+            <a:off x="1676400" y="3733800"/>
+            <a:ext cx="7086600" cy="1295400"/>
+          </a:xfrm>
+          <a:prstGeom prst="rect">
+            <a:avLst/>
+          </a:prstGeom>
+          <a:solidFill>
+            <a:schemeClr val="accent4"/>
+          </a:solidFill>
+          <a:ln w="50800">
+            <a:noFill/>
+          </a:ln>
+          <a:effectLst>
+            <a:glow rad="228600">
+              <a:schemeClr val="accent5">
+                <a:satMod val="175000"/>
+                <a:alpha val="40000"/>
+              </a:schemeClr>
+            </a:glow>
+          </a:effectLst>
+          <a:scene3d>
+            <a:camera prst="orthographicFront"/>
+            <a:lightRig rig="threePt" dir="t"/>
+          </a:scene3d>
+          <a:sp3d prstMaterial="matte">
+            <a:bevelT w="101600" h="101600"/>
+          </a:sp3d>
+        </p:spPr>
+        <p:txBody>
+          <a:bodyPr wrap="square" lIns="144000" tIns="72000" rIns="144000" bIns="72000" rtlCol="0">
+            <a:noAutofit/>
+          </a:bodyPr>
+          <a:lstStyle/>
+          <a:p>
+            <a:r>
+              <a:rPr lang="en-GB" b="1" dirty="0" smtClean="0">
+                <a:solidFill>
+                  <a:schemeClr val="accent5"/>
+                </a:solidFill>
+                <a:latin typeface="consolas"/>
+                <a:cs typeface="Courier New" pitchFamily="49" charset="0"/>
+              </a:rPr>
+              <a:t>interface class </a:t>
+            </a:r>
+            <a:r>
+              <a:rPr lang="en-GB" b="1" dirty="0" err="1" smtClean="0">
+                <a:solidFill>
+                  <a:schemeClr val="accent6"/>
+                </a:solidFill>
+                <a:latin typeface="consolas"/>
+                <a:cs typeface="Courier New" pitchFamily="49" charset="0"/>
+              </a:rPr>
+              <a:t>svlibSerializable</a:t>
+            </a:r>
+            <a:r>
+              <a:rPr lang="en-GB" b="1" dirty="0" smtClean="0">
+                <a:solidFill>
+                  <a:schemeClr val="accent5"/>
+                </a:solidFill>
+                <a:latin typeface="consolas"/>
+                <a:cs typeface="Courier New" pitchFamily="49" charset="0"/>
+              </a:rPr>
+              <a:t>;</a:t>
+            </a:r>
+          </a:p>
+          <a:p>
+            <a:r>
+              <a:rPr lang="en-GB" b="1" dirty="0" smtClean="0">
+                <a:solidFill>
+                  <a:schemeClr val="accent5"/>
+                </a:solidFill>
+                <a:latin typeface="consolas"/>
+                <a:cs typeface="Courier New" pitchFamily="49" charset="0"/>
+              </a:rPr>
+              <a:t>  pure virtual function void </a:t>
+            </a:r>
+            <a:r>
+              <a:rPr lang="en-GB" b="1" dirty="0" err="1" smtClean="0">
+                <a:solidFill>
+                  <a:schemeClr val="accent6"/>
+                </a:solidFill>
+                <a:latin typeface="consolas"/>
+                <a:cs typeface="Courier New" pitchFamily="49" charset="0"/>
+              </a:rPr>
+              <a:t>fromDOM</a:t>
+            </a:r>
+            <a:r>
+              <a:rPr lang="en-GB" b="1" dirty="0" smtClean="0">
+                <a:solidFill>
+                  <a:schemeClr val="accent5"/>
+                </a:solidFill>
+                <a:latin typeface="consolas"/>
+                <a:cs typeface="Courier New" pitchFamily="49" charset="0"/>
+              </a:rPr>
+              <a:t>(</a:t>
+            </a:r>
+            <a:r>
+              <a:rPr lang="en-GB" b="1" dirty="0" err="1" smtClean="0">
+                <a:solidFill>
+                  <a:schemeClr val="accent6"/>
+                </a:solidFill>
+                <a:latin typeface="consolas"/>
+                <a:cs typeface="Courier New" pitchFamily="49" charset="0"/>
+              </a:rPr>
+              <a:t>cfgNodeBase</a:t>
+            </a:r>
+            <a:r>
+              <a:rPr lang="en-GB" b="1" dirty="0" smtClean="0">
+                <a:solidFill>
+                  <a:schemeClr val="accent5"/>
+                </a:solidFill>
+                <a:latin typeface="consolas"/>
+                <a:cs typeface="Courier New" pitchFamily="49" charset="0"/>
+              </a:rPr>
+              <a:t> </a:t>
+            </a:r>
+            <a:r>
+              <a:rPr lang="en-GB" b="1" dirty="0" err="1" smtClean="0">
+                <a:solidFill>
+                  <a:schemeClr val="accent5"/>
+                </a:solidFill>
+                <a:latin typeface="consolas"/>
+                <a:cs typeface="Courier New" pitchFamily="49" charset="0"/>
+              </a:rPr>
+              <a:t>dom</a:t>
+            </a:r>
+            <a:r>
+              <a:rPr lang="en-GB" b="1" dirty="0" smtClean="0">
+                <a:solidFill>
+                  <a:schemeClr val="accent5"/>
+                </a:solidFill>
+                <a:latin typeface="consolas"/>
+                <a:cs typeface="Courier New" pitchFamily="49" charset="0"/>
+              </a:rPr>
+              <a:t>);</a:t>
+            </a:r>
+          </a:p>
+          <a:p>
+            <a:r>
+              <a:rPr lang="en-GB" b="1" dirty="0" smtClean="0">
+                <a:solidFill>
+                  <a:schemeClr val="accent5"/>
+                </a:solidFill>
+                <a:latin typeface="consolas"/>
+                <a:cs typeface="Courier New" pitchFamily="49" charset="0"/>
+              </a:rPr>
+              <a:t>  pure virtual function </a:t>
+            </a:r>
+            <a:r>
+              <a:rPr lang="en-GB" b="1" dirty="0" err="1" smtClean="0">
+                <a:solidFill>
+                  <a:schemeClr val="accent6"/>
+                </a:solidFill>
+                <a:latin typeface="consolas"/>
+                <a:cs typeface="Courier New" pitchFamily="49" charset="0"/>
+              </a:rPr>
+              <a:t>cfgNodeBase</a:t>
+            </a:r>
+            <a:r>
+              <a:rPr lang="en-GB" b="1" dirty="0" smtClean="0">
+                <a:solidFill>
+                  <a:schemeClr val="accent5"/>
+                </a:solidFill>
+                <a:latin typeface="consolas"/>
+                <a:cs typeface="Courier New" pitchFamily="49" charset="0"/>
+              </a:rPr>
+              <a:t> </a:t>
+            </a:r>
+            <a:r>
+              <a:rPr lang="en-GB" b="1" dirty="0" err="1" smtClean="0">
+                <a:solidFill>
+                  <a:schemeClr val="accent6"/>
+                </a:solidFill>
+                <a:latin typeface="consolas"/>
+                <a:cs typeface="Courier New" pitchFamily="49" charset="0"/>
+              </a:rPr>
+              <a:t>toDOM</a:t>
+            </a:r>
+            <a:r>
+              <a:rPr lang="en-GB" b="1" dirty="0" smtClean="0">
+                <a:solidFill>
+                  <a:schemeClr val="accent5"/>
+                </a:solidFill>
+                <a:latin typeface="consolas"/>
+                <a:cs typeface="Courier New" pitchFamily="49" charset="0"/>
+              </a:rPr>
+              <a:t>();</a:t>
+            </a:r>
+          </a:p>
+          <a:p>
+            <a:r>
+              <a:rPr lang="en-GB" b="1" dirty="0" err="1" smtClean="0">
+                <a:solidFill>
+                  <a:schemeClr val="accent5"/>
+                </a:solidFill>
+                <a:latin typeface="consolas"/>
+                <a:cs typeface="Courier New" pitchFamily="49" charset="0"/>
+              </a:rPr>
+              <a:t>endclass</a:t>
+            </a:r>
+            <a:endParaRPr lang="en-GB" b="1" dirty="0" smtClean="0">
+              <a:solidFill>
+                <a:schemeClr val="accent5"/>
+              </a:solidFill>
+              <a:latin typeface="consolas"/>
+              <a:cs typeface="Courier New" pitchFamily="49" charset="0"/>
+            </a:endParaRPr>
+          </a:p>
+        </p:txBody>
+      </p:sp>
     </p:spTree>
   </p:cSld>
   <p:clrMapOvr>
@@ -18505,9 +18694,7 @@
                                           </p:stCondLst>
                                         </p:cTn>
                                         <p:tgtEl>
-                                          <p:spTgt spid="6">
-                                            <p:bg/>
-                                          </p:spTgt>
+                                          <p:spTgt spid="17"/>
                                         </p:tgtEl>
                                         <p:attrNameLst>
                                           <p:attrName>style.visibility</p:attrName>
@@ -18520,39 +18707,26 @@
                                   </p:childTnLst>
                                 </p:cTn>
                               </p:par>
+                            </p:childTnLst>
+                          </p:cTn>
+                        </p:par>
+                      </p:childTnLst>
+                    </p:cTn>
+                  </p:par>
+                  <p:par>
+                    <p:cTn id="23" fill="hold">
+                      <p:stCondLst>
+                        <p:cond delay="indefinite"/>
+                      </p:stCondLst>
+                      <p:childTnLst>
+                        <p:par>
+                          <p:cTn id="24" fill="hold">
+                            <p:stCondLst>
+                              <p:cond delay="0"/>
+                            </p:stCondLst>
+                            <p:childTnLst>
                               <p:par>
-                                <p:cTn id="23" presetID="1" presetClass="entr" presetSubtype="0" fill="hold" grpId="0" nodeType="withEffect">
-                                  <p:stCondLst>
-                                    <p:cond delay="0"/>
-                                  </p:stCondLst>
-                                  <p:childTnLst>
-                                    <p:set>
-                                      <p:cBhvr>
-                                        <p:cTn id="24" dur="1" fill="hold">
-                                          <p:stCondLst>
-                                            <p:cond delay="0"/>
-                                          </p:stCondLst>
-                                        </p:cTn>
-                                        <p:tgtEl>
-                                          <p:spTgt spid="6">
-                                            <p:txEl>
-                                              <p:pRg st="0" end="0"/>
-                                            </p:txEl>
-                                          </p:spTgt>
-                                        </p:tgtEl>
-                                        <p:attrNameLst>
-                                          <p:attrName>style.visibility</p:attrName>
-                                        </p:attrNameLst>
-                                      </p:cBhvr>
-                                      <p:to>
-                                        <p:strVal val="visible"/>
-                                      </p:to>
-                                    </p:set>
-                                  </p:childTnLst>
-                                </p:cTn>
-                              </p:par>
-                              <p:par>
-                                <p:cTn id="25" presetID="1" presetClass="entr" presetSubtype="0" fill="hold" grpId="0" nodeType="withEffect">
+                                <p:cTn id="25" presetID="1" presetClass="exit" presetSubtype="0" fill="hold" grpId="1" nodeType="clickEffect">
                                   <p:stCondLst>
                                     <p:cond delay="0"/>
                                   </p:stCondLst>
@@ -18565,56 +18739,39 @@
                                           </p:stCondLst>
                                         </p:cTn>
                                         <p:tgtEl>
-                                          <p:spTgt spid="6">
-                                            <p:txEl>
-                                              <p:pRg st="1" end="1"/>
-                                            </p:txEl>
-                                          </p:spTgt>
+                                          <p:spTgt spid="17"/>
                                         </p:tgtEl>
                                         <p:attrNameLst>
                                           <p:attrName>style.visibility</p:attrName>
                                         </p:attrNameLst>
                                       </p:cBhvr>
                                       <p:to>
-                                        <p:strVal val="visible"/>
+                                        <p:strVal val="hidden"/>
                                       </p:to>
                                     </p:set>
                                   </p:childTnLst>
                                 </p:cTn>
                               </p:par>
+                            </p:childTnLst>
+                          </p:cTn>
+                        </p:par>
+                      </p:childTnLst>
+                    </p:cTn>
+                  </p:par>
+                  <p:par>
+                    <p:cTn id="27" fill="hold">
+                      <p:stCondLst>
+                        <p:cond delay="indefinite"/>
+                      </p:stCondLst>
+                      <p:childTnLst>
+                        <p:par>
+                          <p:cTn id="28" fill="hold">
+                            <p:stCondLst>
+                              <p:cond delay="0"/>
+                            </p:stCondLst>
+                            <p:childTnLst>
                               <p:par>
-                                <p:cTn id="27" presetID="1" presetClass="entr" presetSubtype="0" fill="hold" grpId="0" nodeType="withEffect">
-                                  <p:stCondLst>
-                                    <p:cond delay="0"/>
-                                  </p:stCondLst>
-                                  <p:childTnLst>
-                                    <p:set>
-                                      <p:cBhvr>
-                                        <p:cTn id="28" dur="1" fill="hold">
-                                          <p:stCondLst>
-                                            <p:cond delay="0"/>
-                                          </p:stCondLst>
-                                        </p:cTn>
-                                        <p:tgtEl>
-                                          <p:spTgt spid="6">
-                                            <p:txEl>
-                                              <p:pRg st="2" end="2"/>
-                                            </p:txEl>
-                                          </p:spTgt>
-                                        </p:tgtEl>
-                                        <p:attrNameLst>
-                                          <p:attrName>style.visibility</p:attrName>
-                                        </p:attrNameLst>
-                                      </p:cBhvr>
-                                      <p:to>
-                                        <p:strVal val="visible"/>
-                                      </p:to>
-                                    </p:set>
-                                  </p:childTnLst>
-                                </p:cTn>
-                              </p:par>
-                              <p:par>
-                                <p:cTn id="29" presetID="1" presetClass="entr" presetSubtype="0" fill="hold" grpId="0" nodeType="withEffect">
+                                <p:cTn id="29" presetID="1" presetClass="entr" presetSubtype="0" fill="hold" grpId="0" nodeType="clickEffect">
                                   <p:stCondLst>
                                     <p:cond delay="0"/>
                                   </p:stCondLst>
@@ -18628,9 +18785,7 @@
                                         </p:cTn>
                                         <p:tgtEl>
                                           <p:spTgt spid="6">
-                                            <p:txEl>
-                                              <p:pRg st="5" end="5"/>
-                                            </p:txEl>
+                                            <p:bg/>
                                           </p:spTgt>
                                         </p:tgtEl>
                                         <p:attrNameLst>
@@ -18658,7 +18813,11 @@
                                           </p:stCondLst>
                                         </p:cTn>
                                         <p:tgtEl>
-                                          <p:spTgt spid="10"/>
+                                          <p:spTgt spid="6">
+                                            <p:txEl>
+                                              <p:pRg st="0" end="0"/>
+                                            </p:txEl>
+                                          </p:spTgt>
                                         </p:tgtEl>
                                         <p:attrNameLst>
                                           <p:attrName>style.visibility</p:attrName>
@@ -18671,26 +18830,39 @@
                                   </p:childTnLst>
                                 </p:cTn>
                               </p:par>
-                            </p:childTnLst>
-                          </p:cTn>
-                        </p:par>
-                      </p:childTnLst>
-                    </p:cTn>
-                  </p:par>
-                  <p:par>
-                    <p:cTn id="33" fill="hold">
-                      <p:stCondLst>
-                        <p:cond delay="indefinite"/>
-                      </p:stCondLst>
-                      <p:childTnLst>
-                        <p:par>
-                          <p:cTn id="34" fill="hold">
-                            <p:stCondLst>
-                              <p:cond delay="0"/>
-                            </p:stCondLst>
-                            <p:childTnLst>
                               <p:par>
-                                <p:cTn id="35" presetID="1" presetClass="entr" presetSubtype="0" fill="hold" grpId="0" nodeType="clickEffect">
+                                <p:cTn id="33" presetID="1" presetClass="entr" presetSubtype="0" fill="hold" grpId="0" nodeType="withEffect">
+                                  <p:stCondLst>
+                                    <p:cond delay="0"/>
+                                  </p:stCondLst>
+                                  <p:childTnLst>
+                                    <p:set>
+                                      <p:cBhvr>
+                                        <p:cTn id="34" dur="1" fill="hold">
+                                          <p:stCondLst>
+                                            <p:cond delay="0"/>
+                                          </p:stCondLst>
+                                        </p:cTn>
+                                        <p:tgtEl>
+                                          <p:spTgt spid="6">
+                                            <p:txEl>
+                                              <p:pRg st="1" end="1"/>
+                                            </p:txEl>
+                                          </p:spTgt>
+                                        </p:tgtEl>
+                                        <p:attrNameLst>
+                                          <p:attrName>style.visibility</p:attrName>
+                                        </p:attrNameLst>
+                                      </p:cBhvr>
+                                      <p:to>
+                                        <p:strVal val="visible"/>
+                                      </p:to>
+                                    </p:set>
+                                  </p:childTnLst>
+                                </p:cTn>
+                              </p:par>
+                              <p:par>
+                                <p:cTn id="35" presetID="1" presetClass="entr" presetSubtype="0" fill="hold" grpId="0" nodeType="withEffect">
                                   <p:stCondLst>
                                     <p:cond delay="0"/>
                                   </p:stCondLst>
@@ -18705,7 +18877,7 @@
                                         <p:tgtEl>
                                           <p:spTgt spid="6">
                                             <p:txEl>
-                                              <p:pRg st="3" end="3"/>
+                                              <p:pRg st="2" end="2"/>
                                             </p:txEl>
                                           </p:spTgt>
                                         </p:tgtEl>
@@ -18736,9 +18908,36 @@
                                         <p:tgtEl>
                                           <p:spTgt spid="6">
                                             <p:txEl>
-                                              <p:pRg st="4" end="4"/>
+                                              <p:pRg st="5" end="5"/>
                                             </p:txEl>
                                           </p:spTgt>
+                                        </p:tgtEl>
+                                        <p:attrNameLst>
+                                          <p:attrName>style.visibility</p:attrName>
+                                        </p:attrNameLst>
+                                      </p:cBhvr>
+                                      <p:to>
+                                        <p:strVal val="visible"/>
+                                      </p:to>
+                                    </p:set>
+                                  </p:childTnLst>
+                                </p:cTn>
+                              </p:par>
+                              <p:par>
+                                <p:cTn id="39" presetID="1" presetClass="entr" presetSubtype="0" fill="hold" grpId="0" nodeType="withEffect">
+                                  <p:stCondLst>
+                                    <p:cond delay="0"/>
+                                  </p:stCondLst>
+                                  <p:childTnLst>
+                                    <p:set>
+                                      <p:cBhvr>
+                                        <p:cTn id="40" dur="1" fill="hold">
+                                          <p:stCondLst>
+                                            <p:cond delay="0"/>
+                                          </p:stCondLst>
+                                        </p:cTn>
+                                        <p:tgtEl>
+                                          <p:spTgt spid="10"/>
                                         </p:tgtEl>
                                         <p:attrNameLst>
                                           <p:attrName>style.visibility</p:attrName>
@@ -18758,46 +18957,19 @@
                     </p:cTn>
                   </p:par>
                   <p:par>
-                    <p:cTn id="39" fill="hold">
+                    <p:cTn id="41" fill="hold">
                       <p:stCondLst>
                         <p:cond delay="indefinite"/>
                       </p:stCondLst>
                       <p:childTnLst>
                         <p:par>
-                          <p:cTn id="40" fill="hold">
+                          <p:cTn id="42" fill="hold">
                             <p:stCondLst>
                               <p:cond delay="0"/>
                             </p:stCondLst>
                             <p:childTnLst>
                               <p:par>
-                                <p:cTn id="41" presetID="1" presetClass="entr" presetSubtype="0" fill="hold" grpId="0" nodeType="clickEffect">
-                                  <p:stCondLst>
-                                    <p:cond delay="0"/>
-                                  </p:stCondLst>
-                                  <p:childTnLst>
-                                    <p:set>
-                                      <p:cBhvr>
-                                        <p:cTn id="42" dur="1" fill="hold">
-                                          <p:stCondLst>
-                                            <p:cond delay="0"/>
-                                          </p:stCondLst>
-                                        </p:cTn>
-                                        <p:tgtEl>
-                                          <p:spTgt spid="11"/>
-                                        </p:tgtEl>
-                                        <p:attrNameLst>
-                                          <p:attrName>style.visibility</p:attrName>
-                                        </p:attrNameLst>
-                                      </p:cBhvr>
-                                      <p:to>
-                                        <p:strVal val="visible"/>
-                                      </p:to>
-                                    </p:set>
-                                  </p:childTnLst>
-                                </p:cTn>
-                              </p:par>
-                              <p:par>
-                                <p:cTn id="43" presetID="1" presetClass="entr" presetSubtype="0" fill="hold" grpId="0" nodeType="withEffect">
+                                <p:cTn id="43" presetID="1" presetClass="entr" presetSubtype="0" fill="hold" grpId="0" nodeType="clickEffect">
                                   <p:stCondLst>
                                     <p:cond delay="0"/>
                                   </p:stCondLst>
@@ -18810,9 +18982,9 @@
                                           </p:stCondLst>
                                         </p:cTn>
                                         <p:tgtEl>
-                                          <p:spTgt spid="8">
+                                          <p:spTgt spid="6">
                                             <p:txEl>
-                                              <p:pRg st="5" end="5"/>
+                                              <p:pRg st="3" end="3"/>
                                             </p:txEl>
                                           </p:spTgt>
                                         </p:tgtEl>
@@ -18841,9 +19013,9 @@
                                           </p:stCondLst>
                                         </p:cTn>
                                         <p:tgtEl>
-                                          <p:spTgt spid="8">
+                                          <p:spTgt spid="6">
                                             <p:txEl>
-                                              <p:pRg st="6" end="6"/>
+                                              <p:pRg st="4" end="4"/>
                                             </p:txEl>
                                           </p:spTgt>
                                         </p:tgtEl>
@@ -18858,39 +19030,26 @@
                                   </p:childTnLst>
                                 </p:cTn>
                               </p:par>
+                            </p:childTnLst>
+                          </p:cTn>
+                        </p:par>
+                      </p:childTnLst>
+                    </p:cTn>
+                  </p:par>
+                  <p:par>
+                    <p:cTn id="47" fill="hold">
+                      <p:stCondLst>
+                        <p:cond delay="indefinite"/>
+                      </p:stCondLst>
+                      <p:childTnLst>
+                        <p:par>
+                          <p:cTn id="48" fill="hold">
+                            <p:stCondLst>
+                              <p:cond delay="0"/>
+                            </p:stCondLst>
+                            <p:childTnLst>
                               <p:par>
-                                <p:cTn id="47" presetID="1" presetClass="entr" presetSubtype="0" fill="hold" grpId="0" nodeType="withEffect">
-                                  <p:stCondLst>
-                                    <p:cond delay="0"/>
-                                  </p:stCondLst>
-                                  <p:childTnLst>
-                                    <p:set>
-                                      <p:cBhvr>
-                                        <p:cTn id="48" dur="1" fill="hold">
-                                          <p:stCondLst>
-                                            <p:cond delay="0"/>
-                                          </p:stCondLst>
-                                        </p:cTn>
-                                        <p:tgtEl>
-                                          <p:spTgt spid="8">
-                                            <p:txEl>
-                                              <p:pRg st="7" end="7"/>
-                                            </p:txEl>
-                                          </p:spTgt>
-                                        </p:tgtEl>
-                                        <p:attrNameLst>
-                                          <p:attrName>style.visibility</p:attrName>
-                                        </p:attrNameLst>
-                                      </p:cBhvr>
-                                      <p:to>
-                                        <p:strVal val="visible"/>
-                                      </p:to>
-                                    </p:set>
-                                  </p:childTnLst>
-                                </p:cTn>
-                              </p:par>
-                              <p:par>
-                                <p:cTn id="49" presetID="1" presetClass="entr" presetSubtype="0" fill="hold" grpId="0" nodeType="withEffect">
+                                <p:cTn id="49" presetID="1" presetClass="entr" presetSubtype="0" fill="hold" grpId="0" nodeType="clickEffect">
                                   <p:stCondLst>
                                     <p:cond delay="0"/>
                                   </p:stCondLst>
@@ -18903,11 +19062,7 @@
                                           </p:stCondLst>
                                         </p:cTn>
                                         <p:tgtEl>
-                                          <p:spTgt spid="8">
-                                            <p:txEl>
-                                              <p:pRg st="8" end="8"/>
-                                            </p:txEl>
-                                          </p:spTgt>
+                                          <p:spTgt spid="11"/>
                                         </p:tgtEl>
                                         <p:attrNameLst>
                                           <p:attrName>style.visibility</p:attrName>
@@ -18934,7 +19089,11 @@
                                           </p:stCondLst>
                                         </p:cTn>
                                         <p:tgtEl>
-                                          <p:spTgt spid="13"/>
+                                          <p:spTgt spid="8">
+                                            <p:txEl>
+                                              <p:pRg st="5" end="5"/>
+                                            </p:txEl>
+                                          </p:spTgt>
                                         </p:tgtEl>
                                         <p:attrNameLst>
                                           <p:attrName>style.visibility</p:attrName>
@@ -18961,7 +19120,11 @@
                                           </p:stCondLst>
                                         </p:cTn>
                                         <p:tgtEl>
-                                          <p:spTgt spid="12"/>
+                                          <p:spTgt spid="8">
+                                            <p:txEl>
+                                              <p:pRg st="6" end="6"/>
+                                            </p:txEl>
+                                          </p:spTgt>
                                         </p:tgtEl>
                                         <p:attrNameLst>
                                           <p:attrName>style.visibility</p:attrName>
@@ -18974,26 +19137,39 @@
                                   </p:childTnLst>
                                 </p:cTn>
                               </p:par>
-                            </p:childTnLst>
-                          </p:cTn>
-                        </p:par>
-                      </p:childTnLst>
-                    </p:cTn>
-                  </p:par>
-                  <p:par>
-                    <p:cTn id="55" fill="hold">
-                      <p:stCondLst>
-                        <p:cond delay="indefinite"/>
-                      </p:stCondLst>
-                      <p:childTnLst>
-                        <p:par>
-                          <p:cTn id="56" fill="hold">
-                            <p:stCondLst>
-                              <p:cond delay="0"/>
-                            </p:stCondLst>
-                            <p:childTnLst>
                               <p:par>
-                                <p:cTn id="57" presetID="1" presetClass="entr" presetSubtype="0" fill="hold" grpId="0" nodeType="clickEffect">
+                                <p:cTn id="55" presetID="1" presetClass="entr" presetSubtype="0" fill="hold" grpId="0" nodeType="withEffect">
+                                  <p:stCondLst>
+                                    <p:cond delay="0"/>
+                                  </p:stCondLst>
+                                  <p:childTnLst>
+                                    <p:set>
+                                      <p:cBhvr>
+                                        <p:cTn id="56" dur="1" fill="hold">
+                                          <p:stCondLst>
+                                            <p:cond delay="0"/>
+                                          </p:stCondLst>
+                                        </p:cTn>
+                                        <p:tgtEl>
+                                          <p:spTgt spid="8">
+                                            <p:txEl>
+                                              <p:pRg st="7" end="7"/>
+                                            </p:txEl>
+                                          </p:spTgt>
+                                        </p:tgtEl>
+                                        <p:attrNameLst>
+                                          <p:attrName>style.visibility</p:attrName>
+                                        </p:attrNameLst>
+                                      </p:cBhvr>
+                                      <p:to>
+                                        <p:strVal val="visible"/>
+                                      </p:to>
+                                    </p:set>
+                                  </p:childTnLst>
+                                </p:cTn>
+                              </p:par>
+                              <p:par>
+                                <p:cTn id="57" presetID="1" presetClass="entr" presetSubtype="0" fill="hold" grpId="0" nodeType="withEffect">
                                   <p:stCondLst>
                                     <p:cond delay="0"/>
                                   </p:stCondLst>
@@ -19006,7 +19182,11 @@
                                           </p:stCondLst>
                                         </p:cTn>
                                         <p:tgtEl>
-                                          <p:spTgt spid="7"/>
+                                          <p:spTgt spid="8">
+                                            <p:txEl>
+                                              <p:pRg st="8" end="8"/>
+                                            </p:txEl>
+                                          </p:spTgt>
                                         </p:tgtEl>
                                         <p:attrNameLst>
                                           <p:attrName>style.visibility</p:attrName>
@@ -19033,7 +19213,7 @@
                                           </p:stCondLst>
                                         </p:cTn>
                                         <p:tgtEl>
-                                          <p:spTgt spid="15"/>
+                                          <p:spTgt spid="13"/>
                                         </p:tgtEl>
                                         <p:attrNameLst>
                                           <p:attrName>style.visibility</p:attrName>
@@ -19060,6 +19240,105 @@
                                           </p:stCondLst>
                                         </p:cTn>
                                         <p:tgtEl>
+                                          <p:spTgt spid="12"/>
+                                        </p:tgtEl>
+                                        <p:attrNameLst>
+                                          <p:attrName>style.visibility</p:attrName>
+                                        </p:attrNameLst>
+                                      </p:cBhvr>
+                                      <p:to>
+                                        <p:strVal val="visible"/>
+                                      </p:to>
+                                    </p:set>
+                                  </p:childTnLst>
+                                </p:cTn>
+                              </p:par>
+                            </p:childTnLst>
+                          </p:cTn>
+                        </p:par>
+                      </p:childTnLst>
+                    </p:cTn>
+                  </p:par>
+                  <p:par>
+                    <p:cTn id="63" fill="hold">
+                      <p:stCondLst>
+                        <p:cond delay="indefinite"/>
+                      </p:stCondLst>
+                      <p:childTnLst>
+                        <p:par>
+                          <p:cTn id="64" fill="hold">
+                            <p:stCondLst>
+                              <p:cond delay="0"/>
+                            </p:stCondLst>
+                            <p:childTnLst>
+                              <p:par>
+                                <p:cTn id="65" presetID="1" presetClass="entr" presetSubtype="0" fill="hold" grpId="0" nodeType="clickEffect">
+                                  <p:stCondLst>
+                                    <p:cond delay="0"/>
+                                  </p:stCondLst>
+                                  <p:childTnLst>
+                                    <p:set>
+                                      <p:cBhvr>
+                                        <p:cTn id="66" dur="1" fill="hold">
+                                          <p:stCondLst>
+                                            <p:cond delay="0"/>
+                                          </p:stCondLst>
+                                        </p:cTn>
+                                        <p:tgtEl>
+                                          <p:spTgt spid="7"/>
+                                        </p:tgtEl>
+                                        <p:attrNameLst>
+                                          <p:attrName>style.visibility</p:attrName>
+                                        </p:attrNameLst>
+                                      </p:cBhvr>
+                                      <p:to>
+                                        <p:strVal val="visible"/>
+                                      </p:to>
+                                    </p:set>
+                                  </p:childTnLst>
+                                </p:cTn>
+                              </p:par>
+                              <p:par>
+                                <p:cTn id="67" presetID="1" presetClass="entr" presetSubtype="0" fill="hold" grpId="0" nodeType="withEffect">
+                                  <p:stCondLst>
+                                    <p:cond delay="0"/>
+                                  </p:stCondLst>
+                                  <p:childTnLst>
+                                    <p:set>
+                                      <p:cBhvr>
+                                        <p:cTn id="68" dur="1" fill="hold">
+                                          <p:stCondLst>
+                                            <p:cond delay="0"/>
+                                          </p:stCondLst>
+                                        </p:cTn>
+                                        <p:tgtEl>
+                                          <p:spTgt spid="15"/>
+                                        </p:tgtEl>
+                                        <p:attrNameLst>
+                                          <p:attrName>style.visibility</p:attrName>
+                                        </p:attrNameLst>
+                                      </p:cBhvr>
+                                      <p:to>
+                                        <p:strVal val="visible"/>
+                                      </p:to>
+                                    </p:set>
+                                  </p:childTnLst>
+                                </p:cTn>
+                              </p:par>
+                              <p:par>
+                                <p:cTn id="69" presetID="1" presetClass="entr" presetSubtype="0" fill="hold" grpId="0" nodeType="withEffect">
+                                  <p:stCondLst>
+                                    <p:cond delay="0"/>
+                                  </p:stCondLst>
+                                  <p:childTnLst>
+                                    <p:set>
+                                      <p:cBhvr>
+                                        <p:cTn id="70" dur="1" fill="hold">
+                                          <p:stCondLst>
+                                            <p:cond delay="0"/>
+                                          </p:stCondLst>
+                                        </p:cTn>
+                                        <p:tgtEl>
                                           <p:spTgt spid="14"/>
                                         </p:tgtEl>
                                         <p:attrNameLst>
@@ -19074,14 +19353,14 @@
                                 </p:cTn>
                               </p:par>
                               <p:par>
-                                <p:cTn id="63" presetID="1" presetClass="exit" presetSubtype="0" fill="hold" grpId="0" nodeType="withEffect">
+                                <p:cTn id="71" presetID="1" presetClass="exit" presetSubtype="0" fill="hold" grpId="0" nodeType="withEffect">
                                   <p:stCondLst>
                                     <p:cond delay="0"/>
                                   </p:stCondLst>
                                   <p:childTnLst>
                                     <p:set>
                                       <p:cBhvr>
-                                        <p:cTn id="64" dur="1" fill="hold">
+                                        <p:cTn id="72" dur="1" fill="hold">
                                           <p:stCondLst>
                                             <p:cond delay="0"/>
                                           </p:stCondLst>
@@ -19138,6 +19417,8 @@
       <p:bldP spid="14" grpId="0" animBg="1"/>
       <p:bldP spid="15" grpId="0" animBg="1"/>
       <p:bldP spid="16" grpId="0" animBg="1"/>
+      <p:bldP spid="17" grpId="0" animBg="1"/>
+      <p:bldP spid="17" grpId="1" animBg="1"/>
     </p:bldLst>
   </p:timing>
 </p:sld>
@@ -20155,7 +20436,6 @@
               <a:rPr lang="en-US" dirty="0" smtClean="0"/>
               <a:t> type</a:t>
             </a:r>
-            <a:endParaRPr lang="en-US" dirty="0" smtClean="0"/>
           </a:p>
           <a:p>
             <a:r>
@@ -20432,26 +20712,14 @@
           <a:p>
             <a:r>
               <a:rPr lang="en-US" dirty="0" smtClean="0"/>
-              <a:t>Just a bunch of stuff </a:t>
-            </a:r>
-            <a:r>
-              <a:rPr lang="en-US" dirty="0" smtClean="0"/>
-              <a:t>that SV</a:t>
-            </a:r>
-            <a:r>
-              <a:rPr lang="en-US" dirty="0" smtClean="0"/>
-              <a:t/>
+              <a:t>Just a bunch of stuff that SV</a:t>
             </a:r>
             <a:br>
               <a:rPr lang="en-US" dirty="0" smtClean="0"/>
             </a:br>
             <a:r>
               <a:rPr lang="en-US" dirty="0" smtClean="0"/>
-              <a:t>should </a:t>
-            </a:r>
-            <a:r>
-              <a:rPr lang="en-US" dirty="0" smtClean="0"/>
-              <a:t>have had all along</a:t>
+              <a:t>should have had all along</a:t>
             </a:r>
           </a:p>
           <a:p>
@@ -20660,7 +20928,6 @@
               <a:rPr lang="en-US" dirty="0" smtClean="0"/>
               <a:t>Free download at:</a:t>
             </a:r>
-            <a:endParaRPr lang="en-US" dirty="0" smtClean="0"/>
           </a:p>
         </p:txBody>
       </p:sp>
@@ -20717,24 +20984,7 @@
                 <a:ea typeface="+mn-ea"/>
                 <a:cs typeface="+mn-cs"/>
               </a:rPr>
-              <a:t>Tell </a:t>
-            </a:r>
-            <a:r>
-              <a:rPr kumimoji="0" lang="en-US" sz="2800" b="0" i="0" u="none" strike="noStrike" kern="1200" cap="none" spc="0" normalizeH="0" baseline="0" noProof="0" dirty="0" smtClean="0">
-                <a:ln>
-                  <a:noFill/>
-                </a:ln>
-                <a:solidFill>
-                  <a:schemeClr val="tx1"/>
-                </a:solidFill>
-                <a:effectLst/>
-                <a:uLnTx/>
-                <a:uFillTx/>
-                <a:latin typeface="+mn-lt"/>
-                <a:ea typeface="+mn-ea"/>
-                <a:cs typeface="+mn-cs"/>
-              </a:rPr>
-              <a:t>us what you think:</a:t>
+              <a:t>Tell us what you think:</a:t>
             </a:r>
           </a:p>
           <a:p>
@@ -20807,24 +21057,7 @@
                 <a:ea typeface="+mn-ea"/>
                 <a:cs typeface="+mn-cs"/>
               </a:rPr>
-              <a:t>for </a:t>
-            </a:r>
-            <a:r>
-              <a:rPr kumimoji="0" lang="en-US" sz="2800" b="0" i="0" u="none" strike="noStrike" kern="1200" cap="none" spc="0" normalizeH="0" baseline="0" noProof="0" smtClean="0">
-                <a:ln>
-                  <a:noFill/>
-                </a:ln>
-                <a:solidFill>
-                  <a:schemeClr val="tx1"/>
-                </a:solidFill>
-                <a:effectLst/>
-                <a:uLnTx/>
-                <a:uFillTx/>
-                <a:latin typeface="+mn-lt"/>
-                <a:ea typeface="+mn-ea"/>
-                <a:cs typeface="+mn-cs"/>
-              </a:rPr>
-              <a:t>listening - any</a:t>
+              <a:t>for listening - any</a:t>
             </a:r>
             <a:r>
               <a:rPr kumimoji="0" lang="en-US" sz="2800" b="0" i="0" u="none" strike="noStrike" kern="1200" cap="none" spc="0" normalizeH="0" noProof="0" smtClean="0">
@@ -21260,17 +21493,7 @@
                 <a:latin typeface="consolas"/>
                 <a:cs typeface="Courier New" pitchFamily="49" charset="0"/>
               </a:rPr>
-              <a:t> </a:t>
-            </a:r>
-            <a:r>
-              <a:rPr lang="en-GB" b="1" dirty="0" smtClean="0">
-                <a:solidFill>
-                  <a:schemeClr val="accent5"/>
-                </a:solidFill>
-                <a:latin typeface="consolas"/>
-                <a:cs typeface="Courier New" pitchFamily="49" charset="0"/>
-              </a:rPr>
-              <a:t>= "SIM_CFG_DIR";</a:t>
+              <a:t> = "SIM_CFG_DIR";</a:t>
             </a:r>
           </a:p>
           <a:p>
@@ -21422,6 +21645,112 @@
             <a:r>
               <a:rPr lang="en-GB" b="1" dirty="0" smtClean="0">
                 <a:solidFill>
+                  <a:schemeClr val="accent6"/>
+                </a:solidFill>
+                <a:latin typeface="consolas"/>
+                <a:cs typeface="Courier New" pitchFamily="49" charset="0"/>
+              </a:rPr>
+              <a:t>Pathname</a:t>
+            </a:r>
+            <a:r>
+              <a:rPr lang="en-GB" b="1" dirty="0" smtClean="0">
+                <a:solidFill>
+                  <a:schemeClr val="accent5"/>
+                </a:solidFill>
+                <a:latin typeface="consolas"/>
+                <a:cs typeface="Courier New" pitchFamily="49" charset="0"/>
+              </a:rPr>
+              <a:t> path = </a:t>
+            </a:r>
+            <a:r>
+              <a:rPr lang="en-GB" b="1" dirty="0" smtClean="0">
+                <a:solidFill>
+                  <a:schemeClr val="accent6"/>
+                </a:solidFill>
+                <a:latin typeface="consolas"/>
+                <a:cs typeface="Courier New" pitchFamily="49" charset="0"/>
+              </a:rPr>
+              <a:t>Pathname::create</a:t>
+            </a:r>
+            <a:r>
+              <a:rPr lang="en-GB" b="1" dirty="0" smtClean="0">
+                <a:solidFill>
+                  <a:schemeClr val="accent5"/>
+                </a:solidFill>
+                <a:latin typeface="consolas"/>
+                <a:cs typeface="Courier New" pitchFamily="49" charset="0"/>
+              </a:rPr>
+              <a:t>(</a:t>
+            </a:r>
+            <a:r>
+              <a:rPr lang="en-GB" b="1" dirty="0" err="1" smtClean="0">
+                <a:solidFill>
+                  <a:schemeClr val="accent5"/>
+                </a:solidFill>
+                <a:latin typeface="consolas"/>
+                <a:cs typeface="Courier New" pitchFamily="49" charset="0"/>
+              </a:rPr>
+              <a:t>cfgDir</a:t>
+            </a:r>
+            <a:r>
+              <a:rPr lang="en-GB" b="1" dirty="0" smtClean="0">
+                <a:solidFill>
+                  <a:schemeClr val="accent5"/>
+                </a:solidFill>
+                <a:latin typeface="consolas"/>
+                <a:cs typeface="Courier New" pitchFamily="49" charset="0"/>
+              </a:rPr>
+              <a:t>);</a:t>
+            </a:r>
+          </a:p>
+          <a:p>
+            <a:r>
+              <a:rPr lang="en-GB" b="1" dirty="0" err="1" smtClean="0">
+                <a:solidFill>
+                  <a:schemeClr val="accent5"/>
+                </a:solidFill>
+                <a:latin typeface="consolas"/>
+                <a:cs typeface="Courier New" pitchFamily="49" charset="0"/>
+              </a:rPr>
+              <a:t>path.</a:t>
+            </a:r>
+            <a:r>
+              <a:rPr lang="en-GB" b="1" dirty="0" err="1" smtClean="0">
+                <a:solidFill>
+                  <a:schemeClr val="accent6"/>
+                </a:solidFill>
+                <a:latin typeface="consolas"/>
+                <a:cs typeface="Courier New" pitchFamily="49" charset="0"/>
+              </a:rPr>
+              <a:t>append</a:t>
+            </a:r>
+            <a:r>
+              <a:rPr lang="en-GB" b="1" dirty="0" smtClean="0">
+                <a:solidFill>
+                  <a:schemeClr val="accent5"/>
+                </a:solidFill>
+                <a:latin typeface="consolas"/>
+                <a:cs typeface="Courier New" pitchFamily="49" charset="0"/>
+              </a:rPr>
+              <a:t>("*.cfg");</a:t>
+            </a:r>
+          </a:p>
+          <a:p>
+            <a:r>
+              <a:rPr lang="en-GB" b="1" dirty="0" smtClean="0">
+                <a:solidFill>
+                  <a:schemeClr val="accent5"/>
+                </a:solidFill>
+                <a:latin typeface="consolas"/>
+                <a:cs typeface="Courier New" pitchFamily="49" charset="0"/>
+              </a:rPr>
+              <a:t>...</a:t>
+            </a:r>
+          </a:p>
+          <a:p>
+            <a:r>
+              <a:rPr lang="en-GB" b="1" dirty="0" smtClean="0">
+                <a:solidFill>
                   <a:schemeClr val="accent5"/>
                 </a:solidFill>
                 <a:latin typeface="consolas"/>
@@ -21447,132 +21776,7 @@
                 <a:latin typeface="consolas"/>
                 <a:cs typeface="Courier New" pitchFamily="49" charset="0"/>
               </a:rPr>
-              <a:t>[$];</a:t>
-            </a:r>
-          </a:p>
-          <a:p>
-            <a:r>
-              <a:rPr lang="en-GB" b="1" dirty="0" smtClean="0">
-                <a:solidFill>
-                  <a:schemeClr val="accent6"/>
-                </a:solidFill>
-                <a:latin typeface="consolas"/>
-                <a:cs typeface="Courier New" pitchFamily="49" charset="0"/>
-              </a:rPr>
-              <a:t>Pathname</a:t>
-            </a:r>
-            <a:r>
-              <a:rPr lang="en-GB" b="1" dirty="0" smtClean="0">
-                <a:solidFill>
-                  <a:schemeClr val="accent5"/>
-                </a:solidFill>
-                <a:latin typeface="consolas"/>
-                <a:cs typeface="Courier New" pitchFamily="49" charset="0"/>
-              </a:rPr>
-              <a:t> path = </a:t>
-            </a:r>
-            <a:r>
-              <a:rPr lang="en-GB" b="1" dirty="0" smtClean="0">
-                <a:solidFill>
-                  <a:schemeClr val="accent6"/>
-                </a:solidFill>
-                <a:latin typeface="consolas"/>
-                <a:cs typeface="Courier New" pitchFamily="49" charset="0"/>
-              </a:rPr>
-              <a:t>Pathname::create</a:t>
-            </a:r>
-            <a:r>
-              <a:rPr lang="en-GB" b="1" dirty="0" smtClean="0">
-                <a:solidFill>
-                  <a:schemeClr val="accent5"/>
-                </a:solidFill>
-                <a:latin typeface="consolas"/>
-                <a:cs typeface="Courier New" pitchFamily="49" charset="0"/>
-              </a:rPr>
-              <a:t>(</a:t>
-            </a:r>
-            <a:r>
-              <a:rPr lang="en-GB" b="1" dirty="0" err="1" smtClean="0">
-                <a:solidFill>
-                  <a:schemeClr val="accent5"/>
-                </a:solidFill>
-                <a:latin typeface="consolas"/>
-                <a:cs typeface="Courier New" pitchFamily="49" charset="0"/>
-              </a:rPr>
-              <a:t>cfgDir</a:t>
-            </a:r>
-            <a:r>
-              <a:rPr lang="en-GB" b="1" dirty="0" smtClean="0">
-                <a:solidFill>
-                  <a:schemeClr val="accent5"/>
-                </a:solidFill>
-                <a:latin typeface="consolas"/>
-                <a:cs typeface="Courier New" pitchFamily="49" charset="0"/>
-              </a:rPr>
-              <a:t>);</a:t>
-            </a:r>
-          </a:p>
-          <a:p>
-            <a:r>
-              <a:rPr lang="en-GB" b="1" dirty="0" err="1" smtClean="0">
-                <a:solidFill>
-                  <a:schemeClr val="accent5"/>
-                </a:solidFill>
-                <a:latin typeface="consolas"/>
-                <a:cs typeface="Courier New" pitchFamily="49" charset="0"/>
-              </a:rPr>
-              <a:t>path.</a:t>
-            </a:r>
-            <a:r>
-              <a:rPr lang="en-GB" b="1" dirty="0" err="1" smtClean="0">
-                <a:solidFill>
-                  <a:schemeClr val="accent6"/>
-                </a:solidFill>
-                <a:latin typeface="consolas"/>
-                <a:cs typeface="Courier New" pitchFamily="49" charset="0"/>
-              </a:rPr>
-              <a:t>append</a:t>
-            </a:r>
-            <a:r>
-              <a:rPr lang="en-GB" b="1" dirty="0" smtClean="0">
-                <a:solidFill>
-                  <a:schemeClr val="accent5"/>
-                </a:solidFill>
-                <a:latin typeface="consolas"/>
-                <a:cs typeface="Courier New" pitchFamily="49" charset="0"/>
-              </a:rPr>
-              <a:t>("*.cfg");</a:t>
-            </a:r>
-          </a:p>
-          <a:p>
-            <a:endParaRPr lang="en-GB" b="1" dirty="0" smtClean="0">
-              <a:solidFill>
-                <a:schemeClr val="accent5"/>
-              </a:solidFill>
-              <a:latin typeface="consolas"/>
-              <a:cs typeface="Courier New" pitchFamily="49" charset="0"/>
-            </a:endParaRPr>
-          </a:p>
-          <a:p>
-            <a:r>
-              <a:rPr lang="en-GB" b="1" dirty="0" err="1" smtClean="0">
-                <a:solidFill>
-                  <a:schemeClr val="accent5"/>
-                </a:solidFill>
-                <a:latin typeface="consolas"/>
-                <a:cs typeface="Courier New" pitchFamily="49" charset="0"/>
-              </a:rPr>
-              <a:t>cfgFiles</a:t>
-            </a:r>
-            <a:r>
-              <a:rPr lang="en-GB" b="1" dirty="0" smtClean="0">
-                <a:solidFill>
-                  <a:schemeClr val="accent5"/>
-                </a:solidFill>
-                <a:latin typeface="consolas"/>
-                <a:cs typeface="Courier New" pitchFamily="49" charset="0"/>
-              </a:rPr>
-              <a:t> = </a:t>
+              <a:t>[$] = </a:t>
             </a:r>
             <a:r>
               <a:rPr lang="en-GB" b="1" dirty="0" err="1" smtClean="0">
@@ -21716,6 +21920,135 @@
           <a:p>
             <a:pPr algn="ctr"/>
             <a:endParaRPr lang="en-GB"/>
+          </a:p>
+        </p:txBody>
+      </p:sp>
+      <p:sp>
+        <p:nvSpPr>
+          <p:cNvPr id="7" name="Rounded Rectangle 6"/>
+          <p:cNvSpPr/>
+          <p:nvPr/>
+        </p:nvSpPr>
+        <p:spPr>
+          <a:xfrm>
+            <a:off x="6629400" y="4800600"/>
+            <a:ext cx="1828800" cy="609600"/>
+          </a:xfrm>
+          <a:prstGeom prst="roundRect">
+            <a:avLst>
+              <a:gd name="adj" fmla="val 27230"/>
+            </a:avLst>
+          </a:prstGeom>
+          <a:solidFill>
+            <a:srgbClr val="0070C0"/>
+          </a:solidFill>
+        </p:spPr>
+        <p:style>
+          <a:lnRef idx="2">
+            <a:schemeClr val="accent1">
+              <a:shade val="50000"/>
+            </a:schemeClr>
+          </a:lnRef>
+          <a:fillRef idx="1">
+            <a:schemeClr val="accent1"/>
+          </a:fillRef>
+          <a:effectRef idx="0">
+            <a:schemeClr val="accent1"/>
+          </a:effectRef>
+          <a:fontRef idx="minor">
+            <a:schemeClr val="lt1"/>
+          </a:fontRef>
+        </p:style>
+        <p:txBody>
+          <a:bodyPr rtlCol="0" anchor="ctr"/>
+          <a:lstStyle/>
+          <a:p>
+            <a:r>
+              <a:rPr lang="en-GB" dirty="0" smtClean="0">
+                <a:latin typeface="Consolas" pitchFamily="49" charset="0"/>
+                <a:cs typeface="Consolas" pitchFamily="49" charset="0"/>
+              </a:rPr>
+              <a:t>../</a:t>
+            </a:r>
+            <a:r>
+              <a:rPr lang="en-GB" dirty="0" err="1" smtClean="0">
+                <a:latin typeface="Consolas" pitchFamily="49" charset="0"/>
+                <a:cs typeface="Consolas" pitchFamily="49" charset="0"/>
+              </a:rPr>
+              <a:t>cfg</a:t>
+            </a:r>
+            <a:endParaRPr lang="en-GB" dirty="0">
+              <a:latin typeface="Consolas" pitchFamily="49" charset="0"/>
+              <a:cs typeface="Consolas" pitchFamily="49" charset="0"/>
+            </a:endParaRPr>
+          </a:p>
+        </p:txBody>
+      </p:sp>
+      <p:sp>
+        <p:nvSpPr>
+          <p:cNvPr id="8" name="Rounded Rectangle 7"/>
+          <p:cNvSpPr/>
+          <p:nvPr/>
+        </p:nvSpPr>
+        <p:spPr>
+          <a:xfrm>
+            <a:off x="6629400" y="4800600"/>
+            <a:ext cx="1828800" cy="609600"/>
+          </a:xfrm>
+          <a:prstGeom prst="roundRect">
+            <a:avLst>
+              <a:gd name="adj" fmla="val 27230"/>
+            </a:avLst>
+          </a:prstGeom>
+          <a:solidFill>
+            <a:srgbClr val="0070C0"/>
+          </a:solidFill>
+        </p:spPr>
+        <p:style>
+          <a:lnRef idx="2">
+            <a:schemeClr val="accent1">
+              <a:shade val="50000"/>
+            </a:schemeClr>
+          </a:lnRef>
+          <a:fillRef idx="1">
+            <a:schemeClr val="accent1"/>
+          </a:fillRef>
+          <a:effectRef idx="0">
+            <a:schemeClr val="accent1"/>
+          </a:effectRef>
+          <a:fontRef idx="minor">
+            <a:schemeClr val="lt1"/>
+          </a:fontRef>
+        </p:style>
+        <p:txBody>
+          <a:bodyPr rtlCol="0" anchor="ctr"/>
+          <a:lstStyle/>
+          <a:p>
+            <a:r>
+              <a:rPr lang="en-GB" dirty="0" smtClean="0">
+                <a:latin typeface="Consolas" pitchFamily="49" charset="0"/>
+                <a:cs typeface="Consolas" pitchFamily="49" charset="0"/>
+              </a:rPr>
+              <a:t>../</a:t>
+            </a:r>
+            <a:r>
+              <a:rPr lang="en-GB" dirty="0" err="1" smtClean="0">
+                <a:latin typeface="Consolas" pitchFamily="49" charset="0"/>
+                <a:cs typeface="Consolas" pitchFamily="49" charset="0"/>
+              </a:rPr>
+              <a:t>cfg</a:t>
+            </a:r>
+            <a:r>
+              <a:rPr lang="en-GB" dirty="0" smtClean="0">
+                <a:latin typeface="Consolas" pitchFamily="49" charset="0"/>
+                <a:cs typeface="Consolas" pitchFamily="49" charset="0"/>
+              </a:rPr>
+              <a:t>/*.cfg</a:t>
+            </a:r>
+            <a:endParaRPr lang="en-GB" dirty="0">
+              <a:latin typeface="Consolas" pitchFamily="49" charset="0"/>
+              <a:cs typeface="Consolas" pitchFamily="49" charset="0"/>
+            </a:endParaRPr>
           </a:p>
         </p:txBody>
       </p:sp>
@@ -22044,9 +22377,36 @@
                                         <p:tgtEl>
                                           <p:spTgt spid="6">
                                             <p:txEl>
-                                              <p:pRg st="9" end="9"/>
+                                              <p:pRg st="8" end="8"/>
                                             </p:txEl>
                                           </p:spTgt>
+                                        </p:tgtEl>
+                                        <p:attrNameLst>
+                                          <p:attrName>style.visibility</p:attrName>
+                                        </p:attrNameLst>
+                                      </p:cBhvr>
+                                      <p:to>
+                                        <p:strVal val="visible"/>
+                                      </p:to>
+                                    </p:set>
+                                  </p:childTnLst>
+                                </p:cTn>
+                              </p:par>
+                              <p:par>
+                                <p:cTn id="27" presetID="1" presetClass="entr" presetSubtype="0" fill="hold" grpId="0" nodeType="withEffect">
+                                  <p:stCondLst>
+                                    <p:cond delay="0"/>
+                                  </p:stCondLst>
+                                  <p:childTnLst>
+                                    <p:set>
+                                      <p:cBhvr>
+                                        <p:cTn id="28" dur="1" fill="hold">
+                                          <p:stCondLst>
+                                            <p:cond delay="0"/>
+                                          </p:stCondLst>
+                                        </p:cTn>
+                                        <p:tgtEl>
+                                          <p:spTgt spid="7"/>
                                         </p:tgtEl>
                                         <p:attrNameLst>
                                           <p:attrName>style.visibility</p:attrName>
@@ -22066,26 +22426,57 @@
                     </p:cTn>
                   </p:par>
                   <p:par>
-                    <p:cTn id="27" fill="hold">
+                    <p:cTn id="29" fill="hold">
                       <p:stCondLst>
                         <p:cond delay="indefinite"/>
                       </p:stCondLst>
                       <p:childTnLst>
                         <p:par>
-                          <p:cTn id="28" fill="hold">
+                          <p:cTn id="30" fill="hold">
                             <p:stCondLst>
                               <p:cond delay="0"/>
                             </p:stCondLst>
                             <p:childTnLst>
                               <p:par>
-                                <p:cTn id="29" presetID="1" presetClass="entr" presetSubtype="0" fill="hold" grpId="0" nodeType="clickEffect">
+                                <p:cTn id="31" presetID="1" presetClass="entr" presetSubtype="0" fill="hold" grpId="0" nodeType="clickEffect">
                                   <p:stCondLst>
                                     <p:cond delay="0"/>
                                   </p:stCondLst>
                                   <p:childTnLst>
                                     <p:set>
                                       <p:cBhvr>
-                                        <p:cTn id="30" dur="1" fill="hold">
+                                        <p:cTn id="32" dur="1" fill="hold">
+                                          <p:stCondLst>
+                                            <p:cond delay="0"/>
+                                          </p:stCondLst>
+                                        </p:cTn>
+                                        <p:tgtEl>
+                                          <p:spTgt spid="6">
+                                            <p:txEl>
+                                              <p:pRg st="9" end="9"/>
+                                            </p:txEl>
+                                          </p:spTgt>
+                                        </p:tgtEl>
+                                        <p:attrNameLst>
+                                          <p:attrName>style.visibility</p:attrName>
+                                        </p:attrNameLst>
+                                      </p:cBhvr>
+                                      <p:to>
+                                        <p:strVal val="visible"/>
+                                      </p:to>
+                                    </p:set>
+                                  </p:childTnLst>
+                                </p:cTn>
+                              </p:par>
+                              <p:par>
+                                <p:cTn id="33" presetID="1" presetClass="entr" presetSubtype="0" fill="hold" grpId="0" nodeType="withEffect">
+                                  <p:stCondLst>
+                                    <p:cond delay="0"/>
+                                  </p:stCondLst>
+                                  <p:childTnLst>
+                                    <p:set>
+                                      <p:cBhvr>
+                                        <p:cTn id="34" dur="1" fill="hold">
                                           <p:stCondLst>
                                             <p:cond delay="0"/>
                                           </p:stCondLst>
@@ -22108,25 +22499,39 @@
                                   </p:childTnLst>
                                 </p:cTn>
                               </p:par>
+                            </p:childTnLst>
+                          </p:cTn>
+                        </p:par>
+                      </p:childTnLst>
+                    </p:cTn>
+                  </p:par>
+                  <p:par>
+                    <p:cTn id="35" fill="hold">
+                      <p:stCondLst>
+                        <p:cond delay="indefinite"/>
+                      </p:stCondLst>
+                      <p:childTnLst>
+                        <p:par>
+                          <p:cTn id="36" fill="hold">
+                            <p:stCondLst>
+                              <p:cond delay="0"/>
+                            </p:stCondLst>
+                            <p:childTnLst>
                               <p:par>
-                                <p:cTn id="31" presetID="1" presetClass="entr" presetSubtype="0" fill="hold" grpId="0" nodeType="withEffect">
+                                <p:cTn id="37" presetID="1" presetClass="entr" presetSubtype="0" fill="hold" grpId="0" nodeType="clickEffect">
                                   <p:stCondLst>
                                     <p:cond delay="0"/>
                                   </p:stCondLst>
                                   <p:childTnLst>
                                     <p:set>
                                       <p:cBhvr>
-                                        <p:cTn id="32" dur="1" fill="hold">
+                                        <p:cTn id="38" dur="1" fill="hold">
                                           <p:stCondLst>
                                             <p:cond delay="0"/>
                                           </p:stCondLst>
                                         </p:cTn>
                                         <p:tgtEl>
-                                          <p:spTgt spid="6">
-                                            <p:txEl>
-                                              <p:pRg st="8" end="8"/>
-                                            </p:txEl>
-                                          </p:spTgt>
+                                          <p:spTgt spid="8"/>
                                         </p:tgtEl>
                                         <p:attrNameLst>
                                           <p:attrName>style.visibility</p:attrName>
@@ -22139,33 +22544,15 @@
                                   </p:childTnLst>
                                 </p:cTn>
                               </p:par>
-                            </p:childTnLst>
-                          </p:cTn>
-                        </p:par>
-                      </p:childTnLst>
-                    </p:cTn>
-                  </p:par>
-                  <p:par>
-                    <p:cTn id="33" fill="hold">
-                      <p:stCondLst>
-                        <p:cond delay="indefinite"/>
-                      </p:stCondLst>
-                      <p:childTnLst>
-                        <p:par>
-                          <p:cTn id="34" fill="hold">
-                            <p:stCondLst>
-                              <p:cond delay="0"/>
-                            </p:stCondLst>
-                            <p:childTnLst>
                               <p:par>
-                                <p:cTn id="35" presetID="1" presetClass="entr" presetSubtype="0" fill="hold" grpId="0" nodeType="clickEffect">
+                                <p:cTn id="39" presetID="1" presetClass="entr" presetSubtype="0" fill="hold" grpId="0" nodeType="withEffect">
                                   <p:stCondLst>
                                     <p:cond delay="0"/>
                                   </p:stCondLst>
                                   <p:childTnLst>
                                     <p:set>
                                       <p:cBhvr>
-                                        <p:cTn id="36" dur="1" fill="hold">
+                                        <p:cTn id="40" dur="1" fill="hold">
                                           <p:stCondLst>
                                             <p:cond delay="0"/>
                                           </p:stCondLst>
@@ -22173,7 +22560,7 @@
                                         <p:tgtEl>
                                           <p:spTgt spid="6">
                                             <p:txEl>
-                                              <p:pRg st="12" end="12"/>
+                                              <p:pRg st="11" end="11"/>
                                             </p:txEl>
                                           </p:spTgt>
                                         </p:tgtEl>
@@ -22189,14 +22576,14 @@
                                 </p:cTn>
                               </p:par>
                               <p:par>
-                                <p:cTn id="37" presetID="1" presetClass="exit" presetSubtype="0" fill="hold" grpId="0" nodeType="withEffect">
+                                <p:cTn id="41" presetID="1" presetClass="exit" presetSubtype="0" fill="hold" grpId="0" nodeType="withEffect">
                                   <p:stCondLst>
                                     <p:cond delay="0"/>
                                   </p:stCondLst>
                                   <p:childTnLst>
                                     <p:set>
                                       <p:cBhvr>
-                                        <p:cTn id="38" dur="1" fill="hold">
+                                        <p:cTn id="42" dur="1" fill="hold">
                                           <p:stCondLst>
                                             <p:cond delay="0"/>
                                           </p:stCondLst>
@@ -22246,6 +22633,8 @@
       <p:bldP spid="3" grpId="0" uiExpand="1" build="p"/>
       <p:bldP spid="6" grpId="0" uiExpand="1" build="p" autoUpdateAnimBg="0"/>
       <p:bldP spid="5" grpId="0" animBg="1"/>
+      <p:bldP spid="7" grpId="0" animBg="1"/>
+      <p:bldP spid="8" grpId="0" animBg="1"/>
     </p:bldLst>
   </p:timing>
 </p:sld>
@@ -22963,7 +23352,17 @@
                 <a:latin typeface="consolas"/>
                 <a:cs typeface="Courier New" pitchFamily="49" charset="0"/>
               </a:rPr>
-              <a:t>  $</a:t>
+              <a:t>  $display(</a:t>
+            </a:r>
+            <a:r>
+              <a:rPr lang="en-GB" b="1" dirty="0" err="1" smtClean="0">
+                <a:solidFill>
+                  <a:schemeClr val="accent6"/>
+                </a:solidFill>
+                <a:latin typeface="consolas"/>
+                <a:cs typeface="Courier New" pitchFamily="49" charset="0"/>
+              </a:rPr>
+              <a:t>sys_formatTime</a:t>
             </a:r>
             <a:r>
               <a:rPr lang="en-GB" b="1" dirty="0" smtClean="0">
@@ -22973,17 +23372,17 @@
                 <a:latin typeface="consolas"/>
                 <a:cs typeface="Courier New" pitchFamily="49" charset="0"/>
               </a:rPr>
-              <a:t>display(</a:t>
+              <a:t>(</a:t>
             </a:r>
             <a:r>
               <a:rPr lang="en-GB" b="1" dirty="0" err="1" smtClean="0">
                 <a:solidFill>
-                  <a:schemeClr val="accent6"/>
-                </a:solidFill>
-                <a:latin typeface="consolas"/>
-                <a:cs typeface="Courier New" pitchFamily="49" charset="0"/>
-              </a:rPr>
-              <a:t>sys_formatTime</a:t>
+                  <a:schemeClr val="accent5"/>
+                </a:solidFill>
+                <a:latin typeface="consolas"/>
+                <a:cs typeface="Courier New" pitchFamily="49" charset="0"/>
+              </a:rPr>
+              <a:t>chosenFileTime</a:t>
             </a:r>
             <a:r>
               <a:rPr lang="en-GB" b="1" dirty="0" smtClean="0">
@@ -22993,47 +23392,7 @@
                 <a:latin typeface="consolas"/>
                 <a:cs typeface="Courier New" pitchFamily="49" charset="0"/>
               </a:rPr>
-              <a:t>(</a:t>
-            </a:r>
-            <a:r>
-              <a:rPr lang="en-GB" b="1" dirty="0" err="1" smtClean="0">
-                <a:solidFill>
-                  <a:schemeClr val="accent5"/>
-                </a:solidFill>
-                <a:latin typeface="consolas"/>
-                <a:cs typeface="Courier New" pitchFamily="49" charset="0"/>
-              </a:rPr>
-              <a:t>chosenFileTime</a:t>
-            </a:r>
-            <a:r>
-              <a:rPr lang="en-GB" b="1" dirty="0" smtClean="0">
-                <a:solidFill>
-                  <a:schemeClr val="accent5"/>
-                </a:solidFill>
-                <a:latin typeface="consolas"/>
-                <a:cs typeface="Courier New" pitchFamily="49" charset="0"/>
-              </a:rPr>
-              <a:t>, </a:t>
-            </a:r>
-            <a:r>
-              <a:rPr lang="en-GB" b="1" dirty="0" smtClean="0">
-                <a:solidFill>
-                  <a:schemeClr val="accent5"/>
-                </a:solidFill>
-                <a:latin typeface="consolas"/>
-                <a:cs typeface="Courier New" pitchFamily="49" charset="0"/>
-              </a:rPr>
-              <a:t>"got %c</a:t>
-            </a:r>
-            <a:r>
-              <a:rPr lang="en-GB" b="1" dirty="0" smtClean="0">
-                <a:solidFill>
-                  <a:schemeClr val="accent5"/>
-                </a:solidFill>
-                <a:latin typeface="consolas"/>
-                <a:cs typeface="Courier New" pitchFamily="49" charset="0"/>
-              </a:rPr>
-              <a:t>"));</a:t>
+              <a:t>, "got %c"));</a:t>
             </a:r>
           </a:p>
           <a:p>
@@ -23452,33 +23811,15 @@
                                   </p:childTnLst>
                                 </p:cTn>
                               </p:par>
-                            </p:childTnLst>
-                          </p:cTn>
-                        </p:par>
-                      </p:childTnLst>
-                    </p:cTn>
-                  </p:par>
-                  <p:par>
-                    <p:cTn id="17" fill="hold">
-                      <p:stCondLst>
-                        <p:cond delay="indefinite"/>
-                      </p:stCondLst>
-                      <p:childTnLst>
-                        <p:par>
-                          <p:cTn id="18" fill="hold">
-                            <p:stCondLst>
-                              <p:cond delay="0"/>
-                            </p:stCondLst>
-                            <p:childTnLst>
                               <p:par>
-                                <p:cTn id="19" presetID="1" presetClass="entr" presetSubtype="0" fill="hold" grpId="0" nodeType="clickEffect">
+                                <p:cTn id="17" presetID="1" presetClass="entr" presetSubtype="0" fill="hold" grpId="0" nodeType="withEffect">
                                   <p:stCondLst>
                                     <p:cond delay="0"/>
                                   </p:stCondLst>
                                   <p:childTnLst>
                                     <p:set>
                                       <p:cBhvr>
-                                        <p:cTn id="20" dur="1" fill="hold">
+                                        <p:cTn id="18" dur="1" fill="hold">
                                           <p:stCondLst>
                                             <p:cond delay="0"/>
                                           </p:stCondLst>
@@ -23502,14 +23843,14 @@
                                 </p:cTn>
                               </p:par>
                               <p:par>
-                                <p:cTn id="21" presetID="1" presetClass="entr" presetSubtype="0" fill="hold" grpId="0" nodeType="withEffect">
+                                <p:cTn id="19" presetID="1" presetClass="entr" presetSubtype="0" fill="hold" grpId="0" nodeType="withEffect">
                                   <p:stCondLst>
                                     <p:cond delay="0"/>
                                   </p:stCondLst>
                                   <p:childTnLst>
                                     <p:set>
                                       <p:cBhvr>
-                                        <p:cTn id="22" dur="1" fill="hold">
+                                        <p:cTn id="20" dur="1" fill="hold">
                                           <p:stCondLst>
                                             <p:cond delay="0"/>
                                           </p:stCondLst>
@@ -23532,8 +23873,26 @@
                                   </p:childTnLst>
                                 </p:cTn>
                               </p:par>
+                            </p:childTnLst>
+                          </p:cTn>
+                        </p:par>
+                      </p:childTnLst>
+                    </p:cTn>
+                  </p:par>
+                  <p:par>
+                    <p:cTn id="21" fill="hold">
+                      <p:stCondLst>
+                        <p:cond delay="indefinite"/>
+                      </p:stCondLst>
+                      <p:childTnLst>
+                        <p:par>
+                          <p:cTn id="22" fill="hold">
+                            <p:stCondLst>
+                              <p:cond delay="0"/>
+                            </p:stCondLst>
+                            <p:childTnLst>
                               <p:par>
-                                <p:cTn id="23" presetID="1" presetClass="entr" presetSubtype="0" fill="hold" grpId="0" nodeType="withEffect">
+                                <p:cTn id="23" presetID="1" presetClass="entr" presetSubtype="0" fill="hold" grpId="0" nodeType="clickEffect">
                                   <p:stCondLst>
                                     <p:cond delay="0"/>
                                   </p:stCondLst>
@@ -30349,7 +30708,9 @@
                                           </p:stCondLst>
                                         </p:cTn>
                                         <p:tgtEl>
-                                          <p:spTgt spid="6"/>
+                                          <p:spTgt spid="6">
+                                            <p:bg/>
+                                          </p:spTgt>
                                         </p:tgtEl>
                                         <p:attrNameLst>
                                           <p:attrName>style.visibility</p:attrName>
@@ -30362,26 +30723,39 @@
                                   </p:childTnLst>
                                 </p:cTn>
                               </p:par>
-                            </p:childTnLst>
-                          </p:cTn>
-                        </p:par>
-                      </p:childTnLst>
-                    </p:cTn>
-                  </p:par>
-                  <p:par>
-                    <p:cTn id="9" fill="hold">
-                      <p:stCondLst>
-                        <p:cond delay="indefinite"/>
-                      </p:stCondLst>
-                      <p:childTnLst>
-                        <p:par>
-                          <p:cTn id="10" fill="hold">
-                            <p:stCondLst>
-                              <p:cond delay="0"/>
-                            </p:stCondLst>
-                            <p:childTnLst>
                               <p:par>
-                                <p:cTn id="11" presetID="1" presetClass="entr" presetSubtype="0" fill="hold" grpId="0" nodeType="clickEffect">
+                                <p:cTn id="9" presetID="1" presetClass="entr" presetSubtype="0" fill="hold" grpId="0" nodeType="withEffect">
+                                  <p:stCondLst>
+                                    <p:cond delay="0"/>
+                                  </p:stCondLst>
+                                  <p:childTnLst>
+                                    <p:set>
+                                      <p:cBhvr>
+                                        <p:cTn id="10" dur="1" fill="hold">
+                                          <p:stCondLst>
+                                            <p:cond delay="0"/>
+                                          </p:stCondLst>
+                                        </p:cTn>
+                                        <p:tgtEl>
+                                          <p:spTgt spid="6">
+                                            <p:txEl>
+                                              <p:pRg st="0" end="0"/>
+                                            </p:txEl>
+                                          </p:spTgt>
+                                        </p:tgtEl>
+                                        <p:attrNameLst>
+                                          <p:attrName>style.visibility</p:attrName>
+                                        </p:attrNameLst>
+                                      </p:cBhvr>
+                                      <p:to>
+                                        <p:strVal val="visible"/>
+                                      </p:to>
+                                    </p:set>
+                                  </p:childTnLst>
+                                </p:cTn>
+                              </p:par>
+                              <p:par>
+                                <p:cTn id="11" presetID="1" presetClass="entr" presetSubtype="0" fill="hold" grpId="0" nodeType="withEffect">
                                   <p:stCondLst>
                                     <p:cond delay="0"/>
                                   </p:stCondLst>
@@ -30394,7 +30768,11 @@
                                           </p:stCondLst>
                                         </p:cTn>
                                         <p:tgtEl>
-                                          <p:spTgt spid="11"/>
+                                          <p:spTgt spid="6">
+                                            <p:txEl>
+                                              <p:pRg st="1" end="1"/>
+                                            </p:txEl>
+                                          </p:spTgt>
                                         </p:tgtEl>
                                         <p:attrNameLst>
                                           <p:attrName>style.visibility</p:attrName>
@@ -30439,7 +30817,11 @@
                                           </p:stCondLst>
                                         </p:cTn>
                                         <p:tgtEl>
-                                          <p:spTgt spid="9"/>
+                                          <p:spTgt spid="6">
+                                            <p:txEl>
+                                              <p:pRg st="2" end="2"/>
+                                            </p:txEl>
+                                          </p:spTgt>
                                         </p:tgtEl>
                                         <p:attrNameLst>
                                           <p:attrName>style.visibility</p:attrName>
@@ -30466,6 +30848,253 @@
                                           </p:stCondLst>
                                         </p:cTn>
                                         <p:tgtEl>
+                                          <p:spTgt spid="6">
+                                            <p:txEl>
+                                              <p:pRg st="3" end="3"/>
+                                            </p:txEl>
+                                          </p:spTgt>
+                                        </p:tgtEl>
+                                        <p:attrNameLst>
+                                          <p:attrName>style.visibility</p:attrName>
+                                        </p:attrNameLst>
+                                      </p:cBhvr>
+                                      <p:to>
+                                        <p:strVal val="visible"/>
+                                      </p:to>
+                                    </p:set>
+                                  </p:childTnLst>
+                                </p:cTn>
+                              </p:par>
+                              <p:par>
+                                <p:cTn id="19" presetID="1" presetClass="entr" presetSubtype="0" fill="hold" grpId="0" nodeType="withEffect">
+                                  <p:stCondLst>
+                                    <p:cond delay="0"/>
+                                  </p:stCondLst>
+                                  <p:childTnLst>
+                                    <p:set>
+                                      <p:cBhvr>
+                                        <p:cTn id="20" dur="1" fill="hold">
+                                          <p:stCondLst>
+                                            <p:cond delay="0"/>
+                                          </p:stCondLst>
+                                        </p:cTn>
+                                        <p:tgtEl>
+                                          <p:spTgt spid="11">
+                                            <p:bg/>
+                                          </p:spTgt>
+                                        </p:tgtEl>
+                                        <p:attrNameLst>
+                                          <p:attrName>style.visibility</p:attrName>
+                                        </p:attrNameLst>
+                                      </p:cBhvr>
+                                      <p:to>
+                                        <p:strVal val="visible"/>
+                                      </p:to>
+                                    </p:set>
+                                  </p:childTnLst>
+                                </p:cTn>
+                              </p:par>
+                              <p:par>
+                                <p:cTn id="21" presetID="1" presetClass="entr" presetSubtype="0" fill="hold" grpId="0" nodeType="withEffect">
+                                  <p:stCondLst>
+                                    <p:cond delay="0"/>
+                                  </p:stCondLst>
+                                  <p:childTnLst>
+                                    <p:set>
+                                      <p:cBhvr>
+                                        <p:cTn id="22" dur="1" fill="hold">
+                                          <p:stCondLst>
+                                            <p:cond delay="0"/>
+                                          </p:stCondLst>
+                                        </p:cTn>
+                                        <p:tgtEl>
+                                          <p:spTgt spid="11">
+                                            <p:txEl>
+                                              <p:pRg st="0" end="0"/>
+                                            </p:txEl>
+                                          </p:spTgt>
+                                        </p:tgtEl>
+                                        <p:attrNameLst>
+                                          <p:attrName>style.visibility</p:attrName>
+                                        </p:attrNameLst>
+                                      </p:cBhvr>
+                                      <p:to>
+                                        <p:strVal val="visible"/>
+                                      </p:to>
+                                    </p:set>
+                                  </p:childTnLst>
+                                </p:cTn>
+                              </p:par>
+                            </p:childTnLst>
+                          </p:cTn>
+                        </p:par>
+                      </p:childTnLst>
+                    </p:cTn>
+                  </p:par>
+                  <p:par>
+                    <p:cTn id="23" fill="hold">
+                      <p:stCondLst>
+                        <p:cond delay="indefinite"/>
+                      </p:stCondLst>
+                      <p:childTnLst>
+                        <p:par>
+                          <p:cTn id="24" fill="hold">
+                            <p:stCondLst>
+                              <p:cond delay="0"/>
+                            </p:stCondLst>
+                            <p:childTnLst>
+                              <p:par>
+                                <p:cTn id="25" presetID="1" presetClass="entr" presetSubtype="0" fill="hold" grpId="0" nodeType="clickEffect">
+                                  <p:stCondLst>
+                                    <p:cond delay="0"/>
+                                  </p:stCondLst>
+                                  <p:childTnLst>
+                                    <p:set>
+                                      <p:cBhvr>
+                                        <p:cTn id="26" dur="1" fill="hold">
+                                          <p:stCondLst>
+                                            <p:cond delay="0"/>
+                                          </p:stCondLst>
+                                        </p:cTn>
+                                        <p:tgtEl>
+                                          <p:spTgt spid="6">
+                                            <p:txEl>
+                                              <p:pRg st="4" end="4"/>
+                                            </p:txEl>
+                                          </p:spTgt>
+                                        </p:tgtEl>
+                                        <p:attrNameLst>
+                                          <p:attrName>style.visibility</p:attrName>
+                                        </p:attrNameLst>
+                                      </p:cBhvr>
+                                      <p:to>
+                                        <p:strVal val="visible"/>
+                                      </p:to>
+                                    </p:set>
+                                  </p:childTnLst>
+                                </p:cTn>
+                              </p:par>
+                              <p:par>
+                                <p:cTn id="27" presetID="1" presetClass="entr" presetSubtype="0" fill="hold" grpId="0" nodeType="withEffect">
+                                  <p:stCondLst>
+                                    <p:cond delay="0"/>
+                                  </p:stCondLst>
+                                  <p:childTnLst>
+                                    <p:set>
+                                      <p:cBhvr>
+                                        <p:cTn id="28" dur="1" fill="hold">
+                                          <p:stCondLst>
+                                            <p:cond delay="0"/>
+                                          </p:stCondLst>
+                                        </p:cTn>
+                                        <p:tgtEl>
+                                          <p:spTgt spid="6">
+                                            <p:txEl>
+                                              <p:pRg st="5" end="5"/>
+                                            </p:txEl>
+                                          </p:spTgt>
+                                        </p:tgtEl>
+                                        <p:attrNameLst>
+                                          <p:attrName>style.visibility</p:attrName>
+                                        </p:attrNameLst>
+                                      </p:cBhvr>
+                                      <p:to>
+                                        <p:strVal val="visible"/>
+                                      </p:to>
+                                    </p:set>
+                                  </p:childTnLst>
+                                </p:cTn>
+                              </p:par>
+                              <p:par>
+                                <p:cTn id="29" presetID="1" presetClass="entr" presetSubtype="0" fill="hold" grpId="0" nodeType="withEffect">
+                                  <p:stCondLst>
+                                    <p:cond delay="0"/>
+                                  </p:stCondLst>
+                                  <p:childTnLst>
+                                    <p:set>
+                                      <p:cBhvr>
+                                        <p:cTn id="30" dur="1" fill="hold">
+                                          <p:stCondLst>
+                                            <p:cond delay="0"/>
+                                          </p:stCondLst>
+                                        </p:cTn>
+                                        <p:tgtEl>
+                                          <p:spTgt spid="11">
+                                            <p:txEl>
+                                              <p:pRg st="1" end="1"/>
+                                            </p:txEl>
+                                          </p:spTgt>
+                                        </p:tgtEl>
+                                        <p:attrNameLst>
+                                          <p:attrName>style.visibility</p:attrName>
+                                        </p:attrNameLst>
+                                      </p:cBhvr>
+                                      <p:to>
+                                        <p:strVal val="visible"/>
+                                      </p:to>
+                                    </p:set>
+                                  </p:childTnLst>
+                                </p:cTn>
+                              </p:par>
+                            </p:childTnLst>
+                          </p:cTn>
+                        </p:par>
+                      </p:childTnLst>
+                    </p:cTn>
+                  </p:par>
+                  <p:par>
+                    <p:cTn id="31" fill="hold">
+                      <p:stCondLst>
+                        <p:cond delay="indefinite"/>
+                      </p:stCondLst>
+                      <p:childTnLst>
+                        <p:par>
+                          <p:cTn id="32" fill="hold">
+                            <p:stCondLst>
+                              <p:cond delay="0"/>
+                            </p:stCondLst>
+                            <p:childTnLst>
+                              <p:par>
+                                <p:cTn id="33" presetID="1" presetClass="entr" presetSubtype="0" fill="hold" grpId="0" nodeType="clickEffect">
+                                  <p:stCondLst>
+                                    <p:cond delay="0"/>
+                                  </p:stCondLst>
+                                  <p:childTnLst>
+                                    <p:set>
+                                      <p:cBhvr>
+                                        <p:cTn id="34" dur="1" fill="hold">
+                                          <p:stCondLst>
+                                            <p:cond delay="0"/>
+                                          </p:stCondLst>
+                                        </p:cTn>
+                                        <p:tgtEl>
+                                          <p:spTgt spid="9"/>
+                                        </p:tgtEl>
+                                        <p:attrNameLst>
+                                          <p:attrName>style.visibility</p:attrName>
+                                        </p:attrNameLst>
+                                      </p:cBhvr>
+                                      <p:to>
+                                        <p:strVal val="visible"/>
+                                      </p:to>
+                                    </p:set>
+                                  </p:childTnLst>
+                                </p:cTn>
+                              </p:par>
+                              <p:par>
+                                <p:cTn id="35" presetID="1" presetClass="entr" presetSubtype="0" fill="hold" grpId="0" nodeType="withEffect">
+                                  <p:stCondLst>
+                                    <p:cond delay="0"/>
+                                  </p:stCondLst>
+                                  <p:childTnLst>
+                                    <p:set>
+                                      <p:cBhvr>
+                                        <p:cTn id="36" dur="1" fill="hold">
+                                          <p:stCondLst>
+                                            <p:cond delay="0"/>
+                                          </p:stCondLst>
+                                        </p:cTn>
+                                        <p:tgtEl>
                                           <p:spTgt spid="12"/>
                                         </p:tgtEl>
                                         <p:attrNameLst>
@@ -30486,26 +31115,26 @@
                     </p:cTn>
                   </p:par>
                   <p:par>
-                    <p:cTn id="19" fill="hold">
+                    <p:cTn id="37" fill="hold">
                       <p:stCondLst>
                         <p:cond delay="indefinite"/>
                       </p:stCondLst>
                       <p:childTnLst>
                         <p:par>
-                          <p:cTn id="20" fill="hold">
+                          <p:cTn id="38" fill="hold">
                             <p:stCondLst>
                               <p:cond delay="0"/>
                             </p:stCondLst>
                             <p:childTnLst>
                               <p:par>
-                                <p:cTn id="21" presetID="1" presetClass="entr" presetSubtype="0" fill="hold" grpId="0" nodeType="clickEffect">
+                                <p:cTn id="39" presetID="1" presetClass="entr" presetSubtype="0" fill="hold" grpId="0" nodeType="clickEffect">
                                   <p:stCondLst>
                                     <p:cond delay="0"/>
                                   </p:stCondLst>
                                   <p:childTnLst>
                                     <p:set>
                                       <p:cBhvr>
-                                        <p:cTn id="22" dur="1" fill="hold">
+                                        <p:cTn id="40" dur="1" fill="hold">
                                           <p:stCondLst>
                                             <p:cond delay="0"/>
                                           </p:stCondLst>
@@ -30525,14 +31154,14 @@
                                 </p:cTn>
                               </p:par>
                               <p:par>
-                                <p:cTn id="23" presetID="1" presetClass="exit" presetSubtype="0" fill="hold" grpId="0" nodeType="withEffect">
+                                <p:cTn id="41" presetID="1" presetClass="exit" presetSubtype="0" fill="hold" grpId="0" nodeType="withEffect">
                                   <p:stCondLst>
                                     <p:cond delay="0"/>
                                   </p:stCondLst>
                                   <p:childTnLst>
                                     <p:set>
                                       <p:cBhvr>
-                                        <p:cTn id="24" dur="1" fill="hold">
+                                        <p:cTn id="42" dur="1" fill="hold">
                                           <p:stCondLst>
                                             <p:cond delay="0"/>
                                           </p:stCondLst>
@@ -30580,8 +31209,8 @@
     </p:tnLst>
     <p:bldLst>
       <p:bldP spid="3" grpId="0" build="p"/>
-      <p:bldP spid="6" grpId="0" animBg="1"/>
-      <p:bldP spid="11" grpId="0" animBg="1"/>
+      <p:bldP spid="6" grpId="0" uiExpand="1" build="p" animBg="1"/>
+      <p:bldP spid="11" grpId="0" uiExpand="1" build="p" animBg="1"/>
       <p:bldP spid="9" grpId="0"/>
       <p:bldP spid="12" grpId="0" animBg="1"/>
       <p:bldP spid="14" grpId="0" animBg="1"/>
@@ -32059,11 +32688,7 @@
           <a:p>
             <a:r>
               <a:rPr lang="en-US" dirty="0" smtClean="0"/>
-              <a:t>Never disturb random </a:t>
-            </a:r>
-            <a:r>
-              <a:rPr lang="en-US" dirty="0" smtClean="0"/>
-              <a:t>stability</a:t>
+              <a:t>Never disturb random stability</a:t>
             </a:r>
             <a:endParaRPr lang="en-GB" dirty="0" smtClean="0"/>
           </a:p>

</xml_diff>

<commit_message>
A few final changes to the PPTX. Remove old versions from the repo.
</commit_message>
<xml_diff>
--- a/svlib/doc/163-aq602-final.pptx
+++ b/svlib/doc/163-aq602-final.pptx
@@ -5,10 +5,10 @@
     <p:sldMasterId id="2147483660" r:id="rId1"/>
   </p:sldMasterIdLst>
   <p:notesMasterIdLst>
-    <p:notesMasterId r:id="rId23"/>
+    <p:notesMasterId r:id="rId24"/>
   </p:notesMasterIdLst>
   <p:handoutMasterIdLst>
-    <p:handoutMasterId r:id="rId24"/>
+    <p:handoutMasterId r:id="rId25"/>
   </p:handoutMasterIdLst>
   <p:sldIdLst>
     <p:sldId id="256" r:id="rId2"/>
@@ -25,30 +25,31 @@
     <p:sldId id="273" r:id="rId13"/>
     <p:sldId id="274" r:id="rId14"/>
     <p:sldId id="272" r:id="rId15"/>
-    <p:sldId id="278" r:id="rId16"/>
-    <p:sldId id="269" r:id="rId17"/>
-    <p:sldId id="279" r:id="rId18"/>
-    <p:sldId id="276" r:id="rId19"/>
-    <p:sldId id="282" r:id="rId20"/>
-    <p:sldId id="275" r:id="rId21"/>
-    <p:sldId id="277" r:id="rId22"/>
+    <p:sldId id="283" r:id="rId16"/>
+    <p:sldId id="278" r:id="rId17"/>
+    <p:sldId id="269" r:id="rId18"/>
+    <p:sldId id="279" r:id="rId19"/>
+    <p:sldId id="276" r:id="rId20"/>
+    <p:sldId id="282" r:id="rId21"/>
+    <p:sldId id="275" r:id="rId22"/>
+    <p:sldId id="277" r:id="rId23"/>
   </p:sldIdLst>
   <p:sldSz cx="9144000" cy="6858000" type="screen4x3"/>
   <p:notesSz cx="6867525" cy="9994900"/>
   <p:embeddedFontLst>
     <p:embeddedFont>
       <p:font typeface="Calibri" pitchFamily="34" charset="0"/>
-      <p:regular r:id="rId25"/>
-      <p:bold r:id="rId26"/>
-      <p:italic r:id="rId27"/>
-      <p:boldItalic r:id="rId28"/>
+      <p:regular r:id="rId26"/>
+      <p:bold r:id="rId27"/>
+      <p:italic r:id="rId28"/>
+      <p:boldItalic r:id="rId29"/>
     </p:embeddedFont>
     <p:embeddedFont>
-      <p:font typeface="consolas" pitchFamily="49" charset="0"/>
-      <p:regular r:id="rId29"/>
-      <p:bold r:id="rId30"/>
-      <p:italic r:id="rId31"/>
-      <p:boldItalic r:id="rId32"/>
+      <p:font typeface="Consolas" pitchFamily="49" charset="0"/>
+      <p:regular r:id="rId30"/>
+      <p:bold r:id="rId31"/>
+      <p:italic r:id="rId32"/>
+      <p:boldItalic r:id="rId33"/>
     </p:embeddedFont>
   </p:embeddedFontLst>
   <p:defaultTextStyle>
@@ -232,7 +233,7 @@
             <a:fld id="{9503A2D3-DDE0-4FE7-BBF0-72D855FCA9B9}" type="datetimeFigureOut">
               <a:rPr lang="en-GB" smtClean="0"/>
               <a:pPr/>
-              <a:t>03/03/2014</a:t>
+              <a:t>04/03/2014</a:t>
             </a:fld>
             <a:endParaRPr lang="en-GB"/>
           </a:p>
@@ -394,7 +395,7 @@
             <a:fld id="{4CCD0033-5F2B-446E-B3A5-D3C3D848D8F7}" type="datetimeFigureOut">
               <a:rPr lang="en-GB" smtClean="0"/>
               <a:pPr/>
-              <a:t>03/03/2014</a:t>
+              <a:t>04/03/2014</a:t>
             </a:fld>
             <a:endParaRPr lang="en-GB"/>
           </a:p>
@@ -1257,7 +1258,24 @@
                 <a:ea typeface="+mn-ea"/>
                 <a:cs typeface="+mn-cs"/>
               </a:rPr>
-              <a:t> of 21</a:t>
+              <a:t> of </a:t>
+            </a:r>
+            <a:r>
+              <a:rPr kumimoji="0" lang="en-US" sz="1200" b="0" i="0" u="none" strike="noStrike" kern="1200" cap="none" spc="0" normalizeH="0" baseline="0" noProof="0" dirty="0" smtClean="0">
+                <a:ln>
+                  <a:noFill/>
+                </a:ln>
+                <a:solidFill>
+                  <a:schemeClr val="bg1"/>
+                </a:solidFill>
+                <a:effectLst/>
+                <a:uLnTx/>
+                <a:uFillTx/>
+                <a:latin typeface="+mn-lt"/>
+                <a:ea typeface="+mn-ea"/>
+                <a:cs typeface="+mn-cs"/>
+              </a:rPr>
+              <a:t>22</a:t>
             </a:r>
             <a:endParaRPr kumimoji="0" lang="en-US" sz="1200" b="0" i="0" u="none" strike="noStrike" kern="1200" cap="none" spc="0" normalizeH="0" baseline="0" noProof="0" dirty="0">
               <a:ln>
@@ -1477,7 +1495,7 @@
     </p:spTree>
     <p:extLst>
       <p:ext uri="{BB962C8B-B14F-4D97-AF65-F5344CB8AC3E}">
-        <p14:creationId xmlns="" xmlns:p14="http://schemas.microsoft.com/office/powerpoint/2010/main" val="989869968"/>
+        <p14:creationId xmlns:p14="http://schemas.microsoft.com/office/powerpoint/2010/main" xmlns="" val="989869968"/>
       </p:ext>
     </p:extLst>
   </p:cSld>
@@ -1620,7 +1638,7 @@
             <a:fld id="{1736D410-BB1B-47BE-81F8-FA61DEEC5942}" type="datetimeFigureOut">
               <a:rPr lang="en-US" smtClean="0"/>
               <a:pPr/>
-              <a:t>3/3/2014</a:t>
+              <a:t>3/4/2014</a:t>
             </a:fld>
             <a:endParaRPr lang="en-US"/>
           </a:p>
@@ -1672,7 +1690,7 @@
     </p:spTree>
     <p:extLst>
       <p:ext uri="{BB962C8B-B14F-4D97-AF65-F5344CB8AC3E}">
-        <p14:creationId xmlns="" xmlns:p14="http://schemas.microsoft.com/office/powerpoint/2010/main" val="1452775338"/>
+        <p14:creationId xmlns:p14="http://schemas.microsoft.com/office/powerpoint/2010/main" xmlns="" val="1452775338"/>
       </p:ext>
     </p:extLst>
   </p:cSld>
@@ -1808,7 +1826,7 @@
             <a:fld id="{1736D410-BB1B-47BE-81F8-FA61DEEC5942}" type="datetimeFigureOut">
               <a:rPr lang="en-US" smtClean="0"/>
               <a:pPr/>
-              <a:t>3/3/2014</a:t>
+              <a:t>3/4/2014</a:t>
             </a:fld>
             <a:endParaRPr lang="en-US"/>
           </a:p>
@@ -1860,7 +1878,7 @@
     </p:spTree>
     <p:extLst>
       <p:ext uri="{BB962C8B-B14F-4D97-AF65-F5344CB8AC3E}">
-        <p14:creationId xmlns="" xmlns:p14="http://schemas.microsoft.com/office/powerpoint/2010/main" val="3894337954"/>
+        <p14:creationId xmlns:p14="http://schemas.microsoft.com/office/powerpoint/2010/main" xmlns="" val="3894337954"/>
       </p:ext>
     </p:extLst>
   </p:cSld>
@@ -2058,7 +2076,7 @@
             <a:fld id="{1736D410-BB1B-47BE-81F8-FA61DEEC5942}" type="datetimeFigureOut">
               <a:rPr lang="en-US" smtClean="0"/>
               <a:pPr/>
-              <a:t>3/3/2014</a:t>
+              <a:t>3/4/2014</a:t>
             </a:fld>
             <a:endParaRPr lang="en-US"/>
           </a:p>
@@ -2110,7 +2128,7 @@
     </p:spTree>
     <p:extLst>
       <p:ext uri="{BB962C8B-B14F-4D97-AF65-F5344CB8AC3E}">
-        <p14:creationId xmlns="" xmlns:p14="http://schemas.microsoft.com/office/powerpoint/2010/main" val="1362160421"/>
+        <p14:creationId xmlns:p14="http://schemas.microsoft.com/office/powerpoint/2010/main" xmlns="" val="1362160421"/>
       </p:ext>
     </p:extLst>
   </p:cSld>
@@ -2246,7 +2264,7 @@
             <a:fld id="{1736D410-BB1B-47BE-81F8-FA61DEEC5942}" type="datetimeFigureOut">
               <a:rPr lang="en-US" smtClean="0"/>
               <a:pPr/>
-              <a:t>3/3/2014</a:t>
+              <a:t>3/4/2014</a:t>
             </a:fld>
             <a:endParaRPr lang="en-US"/>
           </a:p>
@@ -2298,7 +2316,7 @@
     </p:spTree>
     <p:extLst>
       <p:ext uri="{BB962C8B-B14F-4D97-AF65-F5344CB8AC3E}">
-        <p14:creationId xmlns="" xmlns:p14="http://schemas.microsoft.com/office/powerpoint/2010/main" val="1001508708"/>
+        <p14:creationId xmlns:p14="http://schemas.microsoft.com/office/powerpoint/2010/main" xmlns="" val="1001508708"/>
       </p:ext>
     </p:extLst>
   </p:cSld>
@@ -2500,7 +2518,7 @@
             <a:fld id="{1736D410-BB1B-47BE-81F8-FA61DEEC5942}" type="datetimeFigureOut">
               <a:rPr lang="en-US" smtClean="0"/>
               <a:pPr/>
-              <a:t>3/3/2014</a:t>
+              <a:t>3/4/2014</a:t>
             </a:fld>
             <a:endParaRPr lang="en-US"/>
           </a:p>
@@ -2552,7 +2570,7 @@
     </p:spTree>
     <p:extLst>
       <p:ext uri="{BB962C8B-B14F-4D97-AF65-F5344CB8AC3E}">
-        <p14:creationId xmlns="" xmlns:p14="http://schemas.microsoft.com/office/powerpoint/2010/main" val="3465844944"/>
+        <p14:creationId xmlns:p14="http://schemas.microsoft.com/office/powerpoint/2010/main" xmlns="" val="3465844944"/>
       </p:ext>
     </p:extLst>
   </p:cSld>
@@ -2804,7 +2822,7 @@
             <a:fld id="{1736D410-BB1B-47BE-81F8-FA61DEEC5942}" type="datetimeFigureOut">
               <a:rPr lang="en-US" smtClean="0"/>
               <a:pPr/>
-              <a:t>3/3/2014</a:t>
+              <a:t>3/4/2014</a:t>
             </a:fld>
             <a:endParaRPr lang="en-US"/>
           </a:p>
@@ -2856,7 +2874,7 @@
     </p:spTree>
     <p:extLst>
       <p:ext uri="{BB962C8B-B14F-4D97-AF65-F5344CB8AC3E}">
-        <p14:creationId xmlns="" xmlns:p14="http://schemas.microsoft.com/office/powerpoint/2010/main" val="3500538590"/>
+        <p14:creationId xmlns:p14="http://schemas.microsoft.com/office/powerpoint/2010/main" xmlns="" val="3500538590"/>
       </p:ext>
     </p:extLst>
   </p:cSld>
@@ -3248,7 +3266,7 @@
             <a:fld id="{1736D410-BB1B-47BE-81F8-FA61DEEC5942}" type="datetimeFigureOut">
               <a:rPr lang="en-US" smtClean="0"/>
               <a:pPr/>
-              <a:t>3/3/2014</a:t>
+              <a:t>3/4/2014</a:t>
             </a:fld>
             <a:endParaRPr lang="en-US"/>
           </a:p>
@@ -3300,7 +3318,7 @@
     </p:spTree>
     <p:extLst>
       <p:ext uri="{BB962C8B-B14F-4D97-AF65-F5344CB8AC3E}">
-        <p14:creationId xmlns="" xmlns:p14="http://schemas.microsoft.com/office/powerpoint/2010/main" val="1822163244"/>
+        <p14:creationId xmlns:p14="http://schemas.microsoft.com/office/powerpoint/2010/main" xmlns="" val="1822163244"/>
       </p:ext>
     </p:extLst>
   </p:cSld>
@@ -3345,7 +3363,7 @@
             <a:fld id="{1736D410-BB1B-47BE-81F8-FA61DEEC5942}" type="datetimeFigureOut">
               <a:rPr lang="en-US" smtClean="0"/>
               <a:pPr/>
-              <a:t>3/3/2014</a:t>
+              <a:t>3/4/2014</a:t>
             </a:fld>
             <a:endParaRPr lang="en-US"/>
           </a:p>
@@ -3397,7 +3415,7 @@
     </p:spTree>
     <p:extLst>
       <p:ext uri="{BB962C8B-B14F-4D97-AF65-F5344CB8AC3E}">
-        <p14:creationId xmlns="" xmlns:p14="http://schemas.microsoft.com/office/powerpoint/2010/main" val="2405767068"/>
+        <p14:creationId xmlns:p14="http://schemas.microsoft.com/office/powerpoint/2010/main" xmlns="" val="2405767068"/>
       </p:ext>
     </p:extLst>
   </p:cSld>
@@ -3633,7 +3651,7 @@
             <a:fld id="{1736D410-BB1B-47BE-81F8-FA61DEEC5942}" type="datetimeFigureOut">
               <a:rPr lang="en-US" smtClean="0"/>
               <a:pPr/>
-              <a:t>3/3/2014</a:t>
+              <a:t>3/4/2014</a:t>
             </a:fld>
             <a:endParaRPr lang="en-US"/>
           </a:p>
@@ -3685,7 +3703,7 @@
     </p:spTree>
     <p:extLst>
       <p:ext uri="{BB962C8B-B14F-4D97-AF65-F5344CB8AC3E}">
-        <p14:creationId xmlns="" xmlns:p14="http://schemas.microsoft.com/office/powerpoint/2010/main" val="1001517974"/>
+        <p14:creationId xmlns:p14="http://schemas.microsoft.com/office/powerpoint/2010/main" xmlns="" val="1001517974"/>
       </p:ext>
     </p:extLst>
   </p:cSld>
@@ -3897,7 +3915,7 @@
             <a:fld id="{1736D410-BB1B-47BE-81F8-FA61DEEC5942}" type="datetimeFigureOut">
               <a:rPr lang="en-US" smtClean="0"/>
               <a:pPr/>
-              <a:t>3/3/2014</a:t>
+              <a:t>3/4/2014</a:t>
             </a:fld>
             <a:endParaRPr lang="en-US"/>
           </a:p>
@@ -3949,7 +3967,7 @@
     </p:spTree>
     <p:extLst>
       <p:ext uri="{BB962C8B-B14F-4D97-AF65-F5344CB8AC3E}">
-        <p14:creationId xmlns="" xmlns:p14="http://schemas.microsoft.com/office/powerpoint/2010/main" val="1032843098"/>
+        <p14:creationId xmlns:p14="http://schemas.microsoft.com/office/powerpoint/2010/main" xmlns="" val="1032843098"/>
       </p:ext>
     </p:extLst>
   </p:cSld>
@@ -4026,7 +4044,7 @@
             <a:fld id="{1736D410-BB1B-47BE-81F8-FA61DEEC5942}" type="datetimeFigureOut">
               <a:rPr lang="en-US" smtClean="0"/>
               <a:pPr/>
-              <a:t>3/3/2014</a:t>
+              <a:t>3/4/2014</a:t>
             </a:fld>
             <a:endParaRPr lang="en-US"/>
           </a:p>
@@ -4109,7 +4127,7 @@
     </p:spTree>
     <p:extLst>
       <p:ext uri="{BB962C8B-B14F-4D97-AF65-F5344CB8AC3E}">
-        <p14:creationId xmlns="" xmlns:p14="http://schemas.microsoft.com/office/powerpoint/2010/main" val="2425591320"/>
+        <p14:creationId xmlns:p14="http://schemas.microsoft.com/office/powerpoint/2010/main" xmlns="" val="2425591320"/>
       </p:ext>
     </p:extLst>
   </p:cSld>
@@ -4530,7 +4548,7 @@
     </p:spTree>
     <p:extLst>
       <p:ext uri="{BB962C8B-B14F-4D97-AF65-F5344CB8AC3E}">
-        <p14:creationId xmlns="" xmlns:p14="http://schemas.microsoft.com/office/powerpoint/2010/main" val="3983013449"/>
+        <p14:creationId xmlns:p14="http://schemas.microsoft.com/office/powerpoint/2010/main" xmlns="" val="3983013449"/>
       </p:ext>
     </p:extLst>
   </p:cSld>
@@ -10966,6 +10984,1445 @@
           <a:lstStyle/>
           <a:p>
             <a:r>
+              <a:rPr lang="en-US" dirty="0" smtClean="0"/>
+              <a:t>Implementation </a:t>
+            </a:r>
+            <a:r>
+              <a:rPr lang="en-US" dirty="0" smtClean="0"/>
+              <a:t>architecture</a:t>
+            </a:r>
+            <a:endParaRPr lang="en-GB" dirty="0"/>
+          </a:p>
+        </p:txBody>
+      </p:sp>
+      <p:sp>
+        <p:nvSpPr>
+          <p:cNvPr id="3" name="Content Placeholder 2"/>
+          <p:cNvSpPr>
+            <a:spLocks noGrp="1"/>
+          </p:cNvSpPr>
+          <p:nvPr>
+            <p:ph sz="half" idx="1"/>
+          </p:nvPr>
+        </p:nvSpPr>
+        <p:spPr>
+          <a:xfrm>
+            <a:off x="457200" y="1447801"/>
+            <a:ext cx="3657600" cy="2362199"/>
+          </a:xfrm>
+        </p:spPr>
+        <p:txBody>
+          <a:bodyPr/>
+          <a:lstStyle/>
+          <a:p>
+            <a:r>
+              <a:rPr lang="en-US" dirty="0" smtClean="0"/>
+              <a:t>Avoid </a:t>
+            </a:r>
+            <a:r>
+              <a:rPr lang="en-US" dirty="0" smtClean="0"/>
+              <a:t>unnecessary movement of data across </a:t>
+            </a:r>
+            <a:r>
+              <a:rPr lang="en-US" dirty="0" smtClean="0"/>
+              <a:t>DPI</a:t>
+            </a:r>
+          </a:p>
+          <a:p>
+            <a:r>
+              <a:rPr lang="en-US" dirty="0" smtClean="0"/>
+              <a:t>C memory managed within </a:t>
+            </a:r>
+            <a:r>
+              <a:rPr lang="en-US" i="1" dirty="0" err="1" smtClean="0"/>
+              <a:t>svlib</a:t>
+            </a:r>
+            <a:endParaRPr lang="en-US" i="1" dirty="0" smtClean="0"/>
+          </a:p>
+        </p:txBody>
+      </p:sp>
+      <p:sp>
+        <p:nvSpPr>
+          <p:cNvPr id="1029" name="Text Box 5"/>
+          <p:cNvSpPr txBox="1">
+            <a:spLocks noChangeArrowheads="1"/>
+          </p:cNvSpPr>
+          <p:nvPr/>
+        </p:nvSpPr>
+        <p:spPr bwMode="auto">
+          <a:xfrm>
+            <a:off x="4055406" y="4495799"/>
+            <a:ext cx="1576353" cy="304801"/>
+          </a:xfrm>
+          <a:prstGeom prst="rect">
+            <a:avLst/>
+          </a:prstGeom>
+          <a:solidFill>
+            <a:srgbClr val="FFFFFF"/>
+          </a:solidFill>
+          <a:ln w="9525">
+            <a:noFill/>
+            <a:miter lim="800000"/>
+            <a:headEnd/>
+            <a:tailEnd/>
+          </a:ln>
+        </p:spPr>
+        <p:txBody>
+          <a:bodyPr vert="horz" wrap="square" lIns="91440" tIns="45720" rIns="91440" bIns="45720" numCol="1" anchor="t" anchorCtr="0" compatLnSpc="1">
+            <a:prstTxWarp prst="textNoShape">
+              <a:avLst/>
+            </a:prstTxWarp>
+          </a:bodyPr>
+          <a:lstStyle/>
+          <a:p>
+            <a:pPr marL="0" marR="0" lvl="0" indent="0" algn="ctr" defTabSz="914400" rtl="0" eaLnBrk="1" fontAlgn="base" latinLnBrk="0" hangingPunct="1">
+              <a:lnSpc>
+                <a:spcPct val="100000"/>
+              </a:lnSpc>
+              <a:spcBef>
+                <a:spcPct val="0"/>
+              </a:spcBef>
+              <a:spcAft>
+                <a:spcPts val="1000"/>
+              </a:spcAft>
+              <a:buClrTx/>
+              <a:buSzTx/>
+              <a:buFontTx/>
+              <a:buNone/>
+              <a:tabLst/>
+            </a:pPr>
+            <a:r>
+              <a:rPr kumimoji="0" lang="en-GB" sz="1600" b="0" i="0" u="none" strike="noStrike" cap="none" normalizeH="0" baseline="0" dirty="0" smtClean="0">
+                <a:ln>
+                  <a:noFill/>
+                </a:ln>
+                <a:solidFill>
+                  <a:schemeClr val="tx1"/>
+                </a:solidFill>
+                <a:effectLst/>
+                <a:cs typeface="Arial" pitchFamily="34" charset="0"/>
+              </a:rPr>
+              <a:t>C</a:t>
+            </a:r>
+            <a:endParaRPr kumimoji="0" lang="en-US" sz="1600" b="0" i="0" u="none" strike="noStrike" cap="none" normalizeH="0" baseline="0" dirty="0" smtClean="0">
+              <a:ln>
+                <a:noFill/>
+              </a:ln>
+              <a:solidFill>
+                <a:schemeClr val="tx1"/>
+              </a:solidFill>
+              <a:effectLst/>
+              <a:cs typeface="Arial" pitchFamily="34" charset="0"/>
+            </a:endParaRPr>
+          </a:p>
+        </p:txBody>
+      </p:sp>
+      <p:sp>
+        <p:nvSpPr>
+          <p:cNvPr id="1030" name="Text Box 6"/>
+          <p:cNvSpPr txBox="1">
+            <a:spLocks noChangeArrowheads="1"/>
+          </p:cNvSpPr>
+          <p:nvPr/>
+        </p:nvSpPr>
+        <p:spPr bwMode="auto">
+          <a:xfrm>
+            <a:off x="4055406" y="4191000"/>
+            <a:ext cx="1843450" cy="341306"/>
+          </a:xfrm>
+          <a:prstGeom prst="rect">
+            <a:avLst/>
+          </a:prstGeom>
+          <a:solidFill>
+            <a:srgbClr val="FFFFFF"/>
+          </a:solidFill>
+          <a:ln w="9525">
+            <a:noFill/>
+            <a:miter lim="800000"/>
+            <a:headEnd/>
+            <a:tailEnd/>
+          </a:ln>
+        </p:spPr>
+        <p:txBody>
+          <a:bodyPr vert="horz" wrap="square" lIns="91440" tIns="45720" rIns="91440" bIns="45720" numCol="1" anchor="t" anchorCtr="0" compatLnSpc="1">
+            <a:prstTxWarp prst="textNoShape">
+              <a:avLst/>
+            </a:prstTxWarp>
+          </a:bodyPr>
+          <a:lstStyle/>
+          <a:p>
+            <a:pPr marL="0" marR="0" lvl="0" indent="0" algn="ctr" defTabSz="914400" rtl="0" eaLnBrk="1" fontAlgn="base" latinLnBrk="0" hangingPunct="1">
+              <a:lnSpc>
+                <a:spcPct val="100000"/>
+              </a:lnSpc>
+              <a:spcBef>
+                <a:spcPct val="0"/>
+              </a:spcBef>
+              <a:spcAft>
+                <a:spcPts val="1000"/>
+              </a:spcAft>
+              <a:buClrTx/>
+              <a:buSzTx/>
+              <a:buFontTx/>
+              <a:buNone/>
+              <a:tabLst/>
+            </a:pPr>
+            <a:r>
+              <a:rPr kumimoji="0" lang="en-GB" sz="1600" b="0" i="0" u="none" strike="noStrike" cap="none" normalizeH="0" baseline="0" dirty="0" err="1" smtClean="0">
+                <a:ln>
+                  <a:noFill/>
+                </a:ln>
+                <a:solidFill>
+                  <a:schemeClr val="tx1"/>
+                </a:solidFill>
+                <a:effectLst/>
+                <a:cs typeface="Arial" pitchFamily="34" charset="0"/>
+              </a:rPr>
+              <a:t>SystemVerilog</a:t>
+            </a:r>
+            <a:endParaRPr kumimoji="0" lang="en-US" sz="1600" b="0" i="0" u="none" strike="noStrike" cap="none" normalizeH="0" baseline="0" dirty="0" smtClean="0">
+              <a:ln>
+                <a:noFill/>
+              </a:ln>
+              <a:solidFill>
+                <a:schemeClr val="tx1"/>
+              </a:solidFill>
+              <a:effectLst/>
+              <a:cs typeface="Arial" pitchFamily="34" charset="0"/>
+            </a:endParaRPr>
+          </a:p>
+        </p:txBody>
+      </p:sp>
+      <p:sp>
+        <p:nvSpPr>
+          <p:cNvPr id="1031" name="Text Box 7"/>
+          <p:cNvSpPr txBox="1">
+            <a:spLocks noChangeArrowheads="1"/>
+          </p:cNvSpPr>
+          <p:nvPr/>
+        </p:nvSpPr>
+        <p:spPr bwMode="auto">
+          <a:xfrm>
+            <a:off x="4911550" y="2227927"/>
+            <a:ext cx="2860850" cy="370061"/>
+          </a:xfrm>
+          <a:prstGeom prst="rect">
+            <a:avLst/>
+          </a:prstGeom>
+          <a:solidFill>
+            <a:srgbClr val="FFFFFF"/>
+          </a:solidFill>
+          <a:ln w="9525">
+            <a:solidFill>
+              <a:srgbClr val="000000"/>
+            </a:solidFill>
+            <a:miter lim="800000"/>
+            <a:headEnd/>
+            <a:tailEnd/>
+          </a:ln>
+        </p:spPr>
+        <p:txBody>
+          <a:bodyPr vert="horz" wrap="square" lIns="91440" tIns="45720" rIns="91440" bIns="45720" numCol="1" anchor="t" anchorCtr="0" compatLnSpc="1">
+            <a:prstTxWarp prst="textNoShape">
+              <a:avLst/>
+            </a:prstTxWarp>
+          </a:bodyPr>
+          <a:lstStyle/>
+          <a:p>
+            <a:pPr marL="0" marR="0" lvl="0" indent="0" algn="ctr" defTabSz="914400" rtl="0" eaLnBrk="1" fontAlgn="base" latinLnBrk="0" hangingPunct="1">
+              <a:lnSpc>
+                <a:spcPct val="100000"/>
+              </a:lnSpc>
+              <a:spcBef>
+                <a:spcPct val="0"/>
+              </a:spcBef>
+              <a:spcAft>
+                <a:spcPts val="1000"/>
+              </a:spcAft>
+              <a:buClrTx/>
+              <a:buSzTx/>
+              <a:buFontTx/>
+              <a:buNone/>
+              <a:tabLst/>
+            </a:pPr>
+            <a:r>
+              <a:rPr kumimoji="0" lang="en-GB" sz="1600" b="0" i="0" u="none" strike="noStrike" cap="none" normalizeH="0" baseline="0" dirty="0" smtClean="0">
+                <a:ln>
+                  <a:noFill/>
+                </a:ln>
+                <a:solidFill>
+                  <a:schemeClr val="tx1"/>
+                </a:solidFill>
+                <a:effectLst/>
+                <a:cs typeface="Arial" pitchFamily="34" charset="0"/>
+              </a:rPr>
+              <a:t>User-callable </a:t>
+            </a:r>
+            <a:r>
+              <a:rPr kumimoji="0" lang="en-GB" sz="1600" b="0" i="0" u="none" strike="noStrike" cap="none" normalizeH="0" baseline="0" dirty="0" err="1" smtClean="0">
+                <a:ln>
+                  <a:noFill/>
+                </a:ln>
+                <a:solidFill>
+                  <a:schemeClr val="tx1"/>
+                </a:solidFill>
+                <a:effectLst/>
+                <a:cs typeface="Arial" pitchFamily="34" charset="0"/>
+              </a:rPr>
+              <a:t>svLib</a:t>
+            </a:r>
+            <a:r>
+              <a:rPr kumimoji="0" lang="en-GB" sz="1600" b="0" i="0" u="none" strike="noStrike" cap="none" normalizeH="0" baseline="0" dirty="0" smtClean="0">
+                <a:ln>
+                  <a:noFill/>
+                </a:ln>
+                <a:solidFill>
+                  <a:schemeClr val="tx1"/>
+                </a:solidFill>
+                <a:effectLst/>
+                <a:cs typeface="Arial" pitchFamily="34" charset="0"/>
+              </a:rPr>
+              <a:t> functions</a:t>
+            </a:r>
+            <a:endParaRPr kumimoji="0" lang="en-US" sz="1600" b="0" i="0" u="none" strike="noStrike" cap="none" normalizeH="0" baseline="0" dirty="0" smtClean="0">
+              <a:ln>
+                <a:noFill/>
+              </a:ln>
+              <a:solidFill>
+                <a:schemeClr val="tx1"/>
+              </a:solidFill>
+              <a:effectLst/>
+              <a:cs typeface="Arial" pitchFamily="34" charset="0"/>
+            </a:endParaRPr>
+          </a:p>
+        </p:txBody>
+      </p:sp>
+      <p:sp>
+        <p:nvSpPr>
+          <p:cNvPr id="1032" name="Text Box 8"/>
+          <p:cNvSpPr txBox="1">
+            <a:spLocks noChangeArrowheads="1"/>
+          </p:cNvSpPr>
+          <p:nvPr/>
+        </p:nvSpPr>
+        <p:spPr bwMode="auto">
+          <a:xfrm>
+            <a:off x="4005893" y="3250096"/>
+            <a:ext cx="1937708" cy="870142"/>
+          </a:xfrm>
+          <a:prstGeom prst="rect">
+            <a:avLst/>
+          </a:prstGeom>
+          <a:solidFill>
+            <a:srgbClr val="FFFFFF"/>
+          </a:solidFill>
+          <a:ln w="9525">
+            <a:solidFill>
+              <a:srgbClr val="000000"/>
+            </a:solidFill>
+            <a:miter lim="800000"/>
+            <a:headEnd/>
+            <a:tailEnd/>
+          </a:ln>
+        </p:spPr>
+        <p:txBody>
+          <a:bodyPr vert="horz" wrap="square" lIns="91440" tIns="45720" rIns="91440" bIns="45720" numCol="1" anchor="t" anchorCtr="0" compatLnSpc="1">
+            <a:prstTxWarp prst="textNoShape">
+              <a:avLst/>
+            </a:prstTxWarp>
+          </a:bodyPr>
+          <a:lstStyle/>
+          <a:p>
+            <a:pPr marL="0" marR="0" lvl="0" indent="0" algn="ctr" defTabSz="914400" rtl="0" eaLnBrk="1" fontAlgn="base" latinLnBrk="0" hangingPunct="1">
+              <a:lnSpc>
+                <a:spcPct val="100000"/>
+              </a:lnSpc>
+              <a:spcBef>
+                <a:spcPct val="0"/>
+              </a:spcBef>
+              <a:spcAft>
+                <a:spcPts val="1000"/>
+              </a:spcAft>
+              <a:buClrTx/>
+              <a:buSzTx/>
+              <a:buFontTx/>
+              <a:buNone/>
+              <a:tabLst/>
+            </a:pPr>
+            <a:r>
+              <a:rPr kumimoji="0" lang="en-GB" sz="1600" b="0" i="0" u="none" strike="noStrike" cap="none" normalizeH="0" baseline="0" dirty="0" smtClean="0">
+                <a:ln>
+                  <a:noFill/>
+                </a:ln>
+                <a:solidFill>
+                  <a:schemeClr val="tx1"/>
+                </a:solidFill>
+                <a:effectLst/>
+                <a:cs typeface="Arial" pitchFamily="34" charset="0"/>
+              </a:rPr>
+              <a:t>Pure SV implementation of some functions</a:t>
+            </a:r>
+            <a:endParaRPr kumimoji="0" lang="en-US" sz="1600" b="0" i="0" u="none" strike="noStrike" cap="none" normalizeH="0" baseline="0" dirty="0" smtClean="0">
+              <a:ln>
+                <a:noFill/>
+              </a:ln>
+              <a:solidFill>
+                <a:schemeClr val="tx1"/>
+              </a:solidFill>
+              <a:effectLst/>
+              <a:cs typeface="Arial" pitchFamily="34" charset="0"/>
+            </a:endParaRPr>
+          </a:p>
+        </p:txBody>
+      </p:sp>
+      <p:sp>
+        <p:nvSpPr>
+          <p:cNvPr id="1033" name="Text Box 9"/>
+          <p:cNvSpPr txBox="1">
+            <a:spLocks noChangeArrowheads="1"/>
+          </p:cNvSpPr>
+          <p:nvPr/>
+        </p:nvSpPr>
+        <p:spPr bwMode="auto">
+          <a:xfrm>
+            <a:off x="6170724" y="3250096"/>
+            <a:ext cx="2160628" cy="870142"/>
+          </a:xfrm>
+          <a:prstGeom prst="rect">
+            <a:avLst/>
+          </a:prstGeom>
+          <a:solidFill>
+            <a:srgbClr val="FFFFFF"/>
+          </a:solidFill>
+          <a:ln w="9525">
+            <a:solidFill>
+              <a:srgbClr val="000000"/>
+            </a:solidFill>
+            <a:miter lim="800000"/>
+            <a:headEnd/>
+            <a:tailEnd/>
+          </a:ln>
+        </p:spPr>
+        <p:txBody>
+          <a:bodyPr vert="horz" wrap="square" lIns="91440" tIns="45720" rIns="91440" bIns="45720" numCol="1" anchor="t" anchorCtr="0" compatLnSpc="1">
+            <a:prstTxWarp prst="textNoShape">
+              <a:avLst/>
+            </a:prstTxWarp>
+          </a:bodyPr>
+          <a:lstStyle/>
+          <a:p>
+            <a:pPr marL="0" marR="0" lvl="0" indent="0" algn="ctr" defTabSz="914400" rtl="0" eaLnBrk="1" fontAlgn="base" latinLnBrk="0" hangingPunct="1">
+              <a:lnSpc>
+                <a:spcPct val="100000"/>
+              </a:lnSpc>
+              <a:spcBef>
+                <a:spcPct val="0"/>
+              </a:spcBef>
+              <a:spcAft>
+                <a:spcPts val="1000"/>
+              </a:spcAft>
+              <a:buClrTx/>
+              <a:buSzTx/>
+              <a:buFontTx/>
+              <a:buNone/>
+              <a:tabLst/>
+            </a:pPr>
+            <a:r>
+              <a:rPr kumimoji="0" lang="en-GB" sz="1600" b="0" i="0" u="none" strike="noStrike" cap="none" normalizeH="0" baseline="0" smtClean="0">
+                <a:ln>
+                  <a:noFill/>
+                </a:ln>
+                <a:solidFill>
+                  <a:schemeClr val="tx1"/>
+                </a:solidFill>
+                <a:effectLst/>
+                <a:cs typeface="Arial" pitchFamily="34" charset="0"/>
+              </a:rPr>
+              <a:t>Import and call </a:t>
+            </a:r>
+            <a:br>
+              <a:rPr kumimoji="0" lang="en-GB" sz="1600" b="0" i="0" u="none" strike="noStrike" cap="none" normalizeH="0" baseline="0" smtClean="0">
+                <a:ln>
+                  <a:noFill/>
+                </a:ln>
+                <a:solidFill>
+                  <a:schemeClr val="tx1"/>
+                </a:solidFill>
+                <a:effectLst/>
+                <a:cs typeface="Arial" pitchFamily="34" charset="0"/>
+              </a:rPr>
+            </a:br>
+            <a:r>
+              <a:rPr kumimoji="0" lang="en-GB" sz="1600" b="0" i="0" u="none" strike="noStrike" cap="none" normalizeH="0" baseline="0" smtClean="0">
+                <a:ln>
+                  <a:noFill/>
+                </a:ln>
+                <a:solidFill>
+                  <a:schemeClr val="tx1"/>
+                </a:solidFill>
+                <a:effectLst/>
+                <a:cs typeface="Arial" pitchFamily="34" charset="0"/>
+              </a:rPr>
+              <a:t>private DPI functions</a:t>
+            </a:r>
+            <a:endParaRPr kumimoji="0" lang="en-US" sz="1600" b="0" i="0" u="none" strike="noStrike" cap="none" normalizeH="0" baseline="0" smtClean="0">
+              <a:ln>
+                <a:noFill/>
+              </a:ln>
+              <a:solidFill>
+                <a:schemeClr val="tx1"/>
+              </a:solidFill>
+              <a:effectLst/>
+              <a:cs typeface="Arial" pitchFamily="34" charset="0"/>
+            </a:endParaRPr>
+          </a:p>
+        </p:txBody>
+      </p:sp>
+      <p:cxnSp>
+        <p:nvCxnSpPr>
+          <p:cNvPr id="1037" name="AutoShape 13"/>
+          <p:cNvCxnSpPr>
+            <a:cxnSpLocks noChangeShapeType="1"/>
+          </p:cNvCxnSpPr>
+          <p:nvPr/>
+        </p:nvCxnSpPr>
+        <p:spPr bwMode="auto">
+          <a:xfrm>
+            <a:off x="3962400" y="4532305"/>
+            <a:ext cx="4800599" cy="6002"/>
+          </a:xfrm>
+          <a:prstGeom prst="straightConnector1">
+            <a:avLst/>
+          </a:prstGeom>
+          <a:noFill/>
+          <a:ln w="63500">
+            <a:solidFill>
+              <a:srgbClr val="A5A5A5"/>
+            </a:solidFill>
+            <a:round/>
+            <a:headEnd/>
+            <a:tailEnd/>
+          </a:ln>
+        </p:spPr>
+      </p:cxnSp>
+      <p:cxnSp>
+        <p:nvCxnSpPr>
+          <p:cNvPr id="1038" name="AutoShape 14"/>
+          <p:cNvCxnSpPr>
+            <a:cxnSpLocks noChangeShapeType="1"/>
+            <a:stCxn id="1043" idx="2"/>
+          </p:cNvCxnSpPr>
+          <p:nvPr/>
+        </p:nvCxnSpPr>
+        <p:spPr bwMode="auto">
+          <a:xfrm flipH="1">
+            <a:off x="6316198" y="1803858"/>
+            <a:ext cx="7152" cy="424070"/>
+          </a:xfrm>
+          <a:prstGeom prst="straightConnector1">
+            <a:avLst/>
+          </a:prstGeom>
+          <a:noFill/>
+          <a:ln w="25400">
+            <a:solidFill>
+              <a:srgbClr val="000000"/>
+            </a:solidFill>
+            <a:round/>
+            <a:headEnd w="lg" len="lg"/>
+            <a:tailEnd type="triangle" w="lg" len="lg"/>
+          </a:ln>
+        </p:spPr>
+      </p:cxnSp>
+      <p:cxnSp>
+        <p:nvCxnSpPr>
+          <p:cNvPr id="1040" name="AutoShape 16"/>
+          <p:cNvCxnSpPr>
+            <a:cxnSpLocks noChangeShapeType="1"/>
+          </p:cNvCxnSpPr>
+          <p:nvPr/>
+        </p:nvCxnSpPr>
+        <p:spPr bwMode="auto">
+          <a:xfrm>
+            <a:off x="6316196" y="2597989"/>
+            <a:ext cx="934841" cy="652106"/>
+          </a:xfrm>
+          <a:prstGeom prst="straightConnector1">
+            <a:avLst/>
+          </a:prstGeom>
+          <a:noFill/>
+          <a:ln w="25400">
+            <a:solidFill>
+              <a:srgbClr val="000000"/>
+            </a:solidFill>
+            <a:round/>
+            <a:headEnd w="lg" len="lg"/>
+            <a:tailEnd type="triangle" w="lg" len="lg"/>
+          </a:ln>
+        </p:spPr>
+      </p:cxnSp>
+      <p:cxnSp>
+        <p:nvCxnSpPr>
+          <p:cNvPr id="1041" name="AutoShape 17"/>
+          <p:cNvCxnSpPr>
+            <a:cxnSpLocks noChangeShapeType="1"/>
+          </p:cNvCxnSpPr>
+          <p:nvPr/>
+        </p:nvCxnSpPr>
+        <p:spPr bwMode="auto">
+          <a:xfrm flipH="1">
+            <a:off x="4975939" y="2597989"/>
+            <a:ext cx="1340257" cy="652106"/>
+          </a:xfrm>
+          <a:prstGeom prst="straightConnector1">
+            <a:avLst/>
+          </a:prstGeom>
+          <a:noFill/>
+          <a:ln w="25400">
+            <a:solidFill>
+              <a:srgbClr val="000000"/>
+            </a:solidFill>
+            <a:round/>
+            <a:headEnd w="lg" len="lg"/>
+            <a:tailEnd type="triangle" w="lg" len="lg"/>
+          </a:ln>
+        </p:spPr>
+      </p:cxnSp>
+      <p:cxnSp>
+        <p:nvCxnSpPr>
+          <p:cNvPr id="1042" name="AutoShape 18"/>
+          <p:cNvCxnSpPr>
+            <a:cxnSpLocks noChangeShapeType="1"/>
+            <a:endCxn id="1049" idx="0"/>
+          </p:cNvCxnSpPr>
+          <p:nvPr/>
+        </p:nvCxnSpPr>
+        <p:spPr bwMode="auto">
+          <a:xfrm>
+            <a:off x="7251037" y="4120238"/>
+            <a:ext cx="1" cy="680363"/>
+          </a:xfrm>
+          <a:prstGeom prst="straightConnector1">
+            <a:avLst/>
+          </a:prstGeom>
+          <a:noFill/>
+          <a:ln w="25400">
+            <a:solidFill>
+              <a:srgbClr val="000000"/>
+            </a:solidFill>
+            <a:round/>
+            <a:headEnd w="lg" len="lg"/>
+            <a:tailEnd type="triangle" w="lg" len="lg"/>
+          </a:ln>
+        </p:spPr>
+      </p:cxnSp>
+      <p:sp>
+        <p:nvSpPr>
+          <p:cNvPr id="1043" name="Text Box 19"/>
+          <p:cNvSpPr txBox="1">
+            <a:spLocks noChangeArrowheads="1"/>
+          </p:cNvSpPr>
+          <p:nvPr/>
+        </p:nvSpPr>
+        <p:spPr bwMode="auto">
+          <a:xfrm>
+            <a:off x="5562600" y="1447800"/>
+            <a:ext cx="1521500" cy="356058"/>
+          </a:xfrm>
+          <a:prstGeom prst="rect">
+            <a:avLst/>
+          </a:prstGeom>
+          <a:solidFill>
+            <a:srgbClr val="FFFFFF"/>
+          </a:solidFill>
+          <a:ln w="9525">
+            <a:solidFill>
+              <a:srgbClr val="000000"/>
+            </a:solidFill>
+            <a:miter lim="800000"/>
+            <a:headEnd/>
+            <a:tailEnd/>
+          </a:ln>
+        </p:spPr>
+        <p:txBody>
+          <a:bodyPr vert="horz" wrap="square" lIns="91440" tIns="45720" rIns="91440" bIns="45720" numCol="1" anchor="t" anchorCtr="0" compatLnSpc="1">
+            <a:prstTxWarp prst="textNoShape">
+              <a:avLst/>
+            </a:prstTxWarp>
+          </a:bodyPr>
+          <a:lstStyle/>
+          <a:p>
+            <a:pPr marL="0" marR="0" lvl="0" indent="0" algn="ctr" defTabSz="914400" rtl="0" eaLnBrk="1" fontAlgn="base" latinLnBrk="0" hangingPunct="1">
+              <a:lnSpc>
+                <a:spcPct val="100000"/>
+              </a:lnSpc>
+              <a:spcBef>
+                <a:spcPct val="0"/>
+              </a:spcBef>
+              <a:spcAft>
+                <a:spcPts val="1000"/>
+              </a:spcAft>
+              <a:buClrTx/>
+              <a:buSzTx/>
+              <a:buFontTx/>
+              <a:buNone/>
+              <a:tabLst/>
+            </a:pPr>
+            <a:r>
+              <a:rPr kumimoji="0" lang="en-GB" sz="1600" b="0" i="0" u="none" strike="noStrike" cap="none" normalizeH="0" baseline="0" dirty="0" smtClean="0">
+                <a:ln>
+                  <a:noFill/>
+                </a:ln>
+                <a:solidFill>
+                  <a:schemeClr val="tx1"/>
+                </a:solidFill>
+                <a:effectLst/>
+                <a:cs typeface="Arial" pitchFamily="34" charset="0"/>
+              </a:rPr>
+              <a:t>User code</a:t>
+            </a:r>
+            <a:endParaRPr kumimoji="0" lang="en-US" sz="1600" b="0" i="0" u="none" strike="noStrike" cap="none" normalizeH="0" baseline="0" dirty="0" smtClean="0">
+              <a:ln>
+                <a:noFill/>
+              </a:ln>
+              <a:solidFill>
+                <a:schemeClr val="tx1"/>
+              </a:solidFill>
+              <a:effectLst/>
+              <a:cs typeface="Arial" pitchFamily="34" charset="0"/>
+            </a:endParaRPr>
+          </a:p>
+        </p:txBody>
+      </p:sp>
+      <p:sp>
+        <p:nvSpPr>
+          <p:cNvPr id="1045" name="AutoShape 21"/>
+          <p:cNvSpPr>
+            <a:spLocks noChangeArrowheads="1"/>
+          </p:cNvSpPr>
+          <p:nvPr/>
+        </p:nvSpPr>
+        <p:spPr bwMode="auto">
+          <a:xfrm>
+            <a:off x="6043439" y="3010056"/>
+            <a:ext cx="2392843" cy="2618429"/>
+          </a:xfrm>
+          <a:prstGeom prst="roundRect">
+            <a:avLst>
+              <a:gd name="adj" fmla="val 9384"/>
+            </a:avLst>
+          </a:prstGeom>
+          <a:noFill/>
+          <a:ln w="25400">
+            <a:solidFill>
+              <a:srgbClr val="000000"/>
+            </a:solidFill>
+            <a:prstDash val="sysDot"/>
+            <a:round/>
+            <a:headEnd/>
+            <a:tailEnd/>
+          </a:ln>
+        </p:spPr>
+        <p:txBody>
+          <a:bodyPr vert="horz" wrap="square" lIns="91440" tIns="45720" rIns="91440" bIns="45720" numCol="1" anchor="t" anchorCtr="0" compatLnSpc="1">
+            <a:prstTxWarp prst="textNoShape">
+              <a:avLst/>
+            </a:prstTxWarp>
+          </a:bodyPr>
+          <a:lstStyle/>
+          <a:p>
+            <a:pPr marL="0" marR="0" lvl="0" indent="0" algn="ctr" defTabSz="914400" rtl="0" eaLnBrk="1" fontAlgn="base" latinLnBrk="0" hangingPunct="1">
+              <a:lnSpc>
+                <a:spcPct val="100000"/>
+              </a:lnSpc>
+              <a:spcBef>
+                <a:spcPct val="0"/>
+              </a:spcBef>
+              <a:spcAft>
+                <a:spcPct val="0"/>
+              </a:spcAft>
+              <a:buClrTx/>
+              <a:buSzTx/>
+              <a:buFontTx/>
+              <a:buNone/>
+              <a:tabLst/>
+            </a:pPr>
+            <a:endParaRPr kumimoji="0" lang="en-US" sz="1600" b="0" i="0" u="none" strike="noStrike" cap="none" normalizeH="0" baseline="0" smtClean="0">
+              <a:ln>
+                <a:noFill/>
+              </a:ln>
+              <a:solidFill>
+                <a:schemeClr val="tx1"/>
+              </a:solidFill>
+              <a:effectLst/>
+              <a:cs typeface="Arial" pitchFamily="34" charset="0"/>
+            </a:endParaRPr>
+          </a:p>
+        </p:txBody>
+      </p:sp>
+      <p:sp>
+        <p:nvSpPr>
+          <p:cNvPr id="1046" name="AutoShape 22"/>
+          <p:cNvSpPr>
+            <a:spLocks noChangeArrowheads="1"/>
+          </p:cNvSpPr>
+          <p:nvPr/>
+        </p:nvSpPr>
+        <p:spPr bwMode="auto">
+          <a:xfrm>
+            <a:off x="4055407" y="4800600"/>
+            <a:ext cx="2192994" cy="827885"/>
+          </a:xfrm>
+          <a:prstGeom prst="roundRect">
+            <a:avLst>
+              <a:gd name="adj" fmla="val 21046"/>
+            </a:avLst>
+          </a:prstGeom>
+          <a:solidFill>
+            <a:srgbClr val="FFFFFF"/>
+          </a:solidFill>
+          <a:ln w="25400">
+            <a:solidFill>
+              <a:srgbClr val="000000"/>
+            </a:solidFill>
+            <a:prstDash val="sysDot"/>
+            <a:round/>
+            <a:headEnd/>
+            <a:tailEnd/>
+          </a:ln>
+        </p:spPr>
+        <p:txBody>
+          <a:bodyPr vert="horz" wrap="square" lIns="91440" tIns="0" rIns="91440" bIns="45720" numCol="1" anchor="t" anchorCtr="0" compatLnSpc="1">
+            <a:prstTxWarp prst="textNoShape">
+              <a:avLst/>
+            </a:prstTxWarp>
+          </a:bodyPr>
+          <a:lstStyle/>
+          <a:p>
+            <a:pPr marL="0" marR="0" lvl="0" indent="0" algn="ctr" defTabSz="914400" rtl="0" eaLnBrk="1" fontAlgn="base" latinLnBrk="0" hangingPunct="1">
+              <a:lnSpc>
+                <a:spcPct val="100000"/>
+              </a:lnSpc>
+              <a:spcBef>
+                <a:spcPct val="0"/>
+              </a:spcBef>
+              <a:spcAft>
+                <a:spcPts val="1000"/>
+              </a:spcAft>
+              <a:buClrTx/>
+              <a:buSzTx/>
+              <a:buFontTx/>
+              <a:buNone/>
+              <a:tabLst/>
+            </a:pPr>
+            <a:r>
+              <a:rPr kumimoji="0" lang="en-GB" sz="1600" b="0" i="0" u="none" strike="noStrike" cap="none" normalizeH="0" baseline="0" dirty="0" smtClean="0">
+                <a:ln>
+                  <a:noFill/>
+                </a:ln>
+                <a:solidFill>
+                  <a:schemeClr val="tx1"/>
+                </a:solidFill>
+                <a:effectLst/>
+                <a:cs typeface="Arial" pitchFamily="34" charset="0"/>
+              </a:rPr>
+              <a:t>Shared responsibility</a:t>
+            </a:r>
+            <a:br>
+              <a:rPr kumimoji="0" lang="en-GB" sz="1600" b="0" i="0" u="none" strike="noStrike" cap="none" normalizeH="0" baseline="0" dirty="0" smtClean="0">
+                <a:ln>
+                  <a:noFill/>
+                </a:ln>
+                <a:solidFill>
+                  <a:schemeClr val="tx1"/>
+                </a:solidFill>
+                <a:effectLst/>
+                <a:cs typeface="Arial" pitchFamily="34" charset="0"/>
+              </a:rPr>
+            </a:br>
+            <a:r>
+              <a:rPr kumimoji="0" lang="en-GB" sz="1600" b="0" i="0" u="none" strike="noStrike" cap="none" normalizeH="0" baseline="0" dirty="0" smtClean="0">
+                <a:ln>
+                  <a:noFill/>
+                </a:ln>
+                <a:solidFill>
+                  <a:schemeClr val="tx1"/>
+                </a:solidFill>
+                <a:effectLst/>
+                <a:cs typeface="Arial" pitchFamily="34" charset="0"/>
+              </a:rPr>
+              <a:t>for C memory</a:t>
+            </a:r>
+            <a:br>
+              <a:rPr kumimoji="0" lang="en-GB" sz="1600" b="0" i="0" u="none" strike="noStrike" cap="none" normalizeH="0" baseline="0" dirty="0" smtClean="0">
+                <a:ln>
+                  <a:noFill/>
+                </a:ln>
+                <a:solidFill>
+                  <a:schemeClr val="tx1"/>
+                </a:solidFill>
+                <a:effectLst/>
+                <a:cs typeface="Arial" pitchFamily="34" charset="0"/>
+              </a:rPr>
+            </a:br>
+            <a:r>
+              <a:rPr kumimoji="0" lang="en-GB" sz="1600" b="0" i="0" u="none" strike="noStrike" cap="none" normalizeH="0" baseline="0" dirty="0" smtClean="0">
+                <a:ln>
+                  <a:noFill/>
+                </a:ln>
+                <a:solidFill>
+                  <a:schemeClr val="tx1"/>
+                </a:solidFill>
+                <a:effectLst/>
+                <a:cs typeface="Arial" pitchFamily="34" charset="0"/>
+              </a:rPr>
+              <a:t>management</a:t>
+            </a:r>
+            <a:endParaRPr kumimoji="0" lang="en-US" sz="1600" b="0" i="0" u="none" strike="noStrike" cap="none" normalizeH="0" baseline="0" dirty="0" smtClean="0">
+              <a:ln>
+                <a:noFill/>
+              </a:ln>
+              <a:solidFill>
+                <a:schemeClr val="tx1"/>
+              </a:solidFill>
+              <a:effectLst/>
+              <a:cs typeface="Arial" pitchFamily="34" charset="0"/>
+            </a:endParaRPr>
+          </a:p>
+        </p:txBody>
+      </p:sp>
+      <p:sp>
+        <p:nvSpPr>
+          <p:cNvPr id="1047" name="Rectangle 23"/>
+          <p:cNvSpPr>
+            <a:spLocks noChangeArrowheads="1"/>
+          </p:cNvSpPr>
+          <p:nvPr/>
+        </p:nvSpPr>
+        <p:spPr bwMode="auto">
+          <a:xfrm>
+            <a:off x="6072116" y="4696407"/>
+            <a:ext cx="425483" cy="907476"/>
+          </a:xfrm>
+          <a:prstGeom prst="rect">
+            <a:avLst/>
+          </a:prstGeom>
+          <a:solidFill>
+            <a:srgbClr val="FFFFFF"/>
+          </a:solidFill>
+          <a:ln w="9525">
+            <a:noFill/>
+            <a:miter lim="800000"/>
+            <a:headEnd/>
+            <a:tailEnd/>
+          </a:ln>
+        </p:spPr>
+        <p:txBody>
+          <a:bodyPr vert="horz" wrap="square" lIns="91440" tIns="45720" rIns="91440" bIns="45720" numCol="1" anchor="t" anchorCtr="0" compatLnSpc="1">
+            <a:prstTxWarp prst="textNoShape">
+              <a:avLst/>
+            </a:prstTxWarp>
+          </a:bodyPr>
+          <a:lstStyle/>
+          <a:p>
+            <a:pPr algn="ctr"/>
+            <a:endParaRPr lang="en-GB" sz="1600"/>
+          </a:p>
+        </p:txBody>
+      </p:sp>
+      <p:sp>
+        <p:nvSpPr>
+          <p:cNvPr id="1048" name="Text Box 24"/>
+          <p:cNvSpPr txBox="1">
+            <a:spLocks noChangeArrowheads="1"/>
+          </p:cNvSpPr>
+          <p:nvPr/>
+        </p:nvSpPr>
+        <p:spPr bwMode="auto">
+          <a:xfrm>
+            <a:off x="6170724" y="5798514"/>
+            <a:ext cx="2160628" cy="602286"/>
+          </a:xfrm>
+          <a:prstGeom prst="rect">
+            <a:avLst/>
+          </a:prstGeom>
+          <a:solidFill>
+            <a:srgbClr val="FFFFFF"/>
+          </a:solidFill>
+          <a:ln w="9525">
+            <a:solidFill>
+              <a:srgbClr val="000000"/>
+            </a:solidFill>
+            <a:miter lim="800000"/>
+            <a:headEnd/>
+            <a:tailEnd/>
+          </a:ln>
+        </p:spPr>
+        <p:txBody>
+          <a:bodyPr vert="horz" wrap="square" lIns="91440" tIns="45720" rIns="91440" bIns="45720" numCol="1" anchor="t" anchorCtr="0" compatLnSpc="1">
+            <a:prstTxWarp prst="textNoShape">
+              <a:avLst/>
+            </a:prstTxWarp>
+          </a:bodyPr>
+          <a:lstStyle/>
+          <a:p>
+            <a:pPr marL="0" marR="0" lvl="0" indent="0" algn="ctr" defTabSz="914400" rtl="0" eaLnBrk="1" fontAlgn="base" latinLnBrk="0" hangingPunct="1">
+              <a:lnSpc>
+                <a:spcPct val="100000"/>
+              </a:lnSpc>
+              <a:spcBef>
+                <a:spcPct val="0"/>
+              </a:spcBef>
+              <a:spcAft>
+                <a:spcPts val="1000"/>
+              </a:spcAft>
+              <a:buClrTx/>
+              <a:buSzTx/>
+              <a:buFontTx/>
+              <a:buNone/>
+              <a:tabLst/>
+            </a:pPr>
+            <a:r>
+              <a:rPr kumimoji="0" lang="en-GB" sz="1600" b="0" i="0" u="none" strike="noStrike" cap="none" normalizeH="0" baseline="0" dirty="0" smtClean="0">
+                <a:ln>
+                  <a:noFill/>
+                </a:ln>
+                <a:solidFill>
+                  <a:schemeClr val="tx1"/>
+                </a:solidFill>
+                <a:effectLst/>
+                <a:cs typeface="Arial" pitchFamily="34" charset="0"/>
+              </a:rPr>
+              <a:t>System-provided</a:t>
+            </a:r>
+            <a:br>
+              <a:rPr kumimoji="0" lang="en-GB" sz="1600" b="0" i="0" u="none" strike="noStrike" cap="none" normalizeH="0" baseline="0" dirty="0" smtClean="0">
+                <a:ln>
+                  <a:noFill/>
+                </a:ln>
+                <a:solidFill>
+                  <a:schemeClr val="tx1"/>
+                </a:solidFill>
+                <a:effectLst/>
+                <a:cs typeface="Arial" pitchFamily="34" charset="0"/>
+              </a:rPr>
+            </a:br>
+            <a:r>
+              <a:rPr kumimoji="0" lang="en-GB" sz="1600" b="0" i="0" u="none" strike="noStrike" cap="none" normalizeH="0" baseline="0" dirty="0" smtClean="0">
+                <a:ln>
+                  <a:noFill/>
+                </a:ln>
+                <a:solidFill>
+                  <a:schemeClr val="tx1"/>
+                </a:solidFill>
+                <a:effectLst/>
+                <a:cs typeface="Arial" pitchFamily="34" charset="0"/>
+              </a:rPr>
+              <a:t>C library</a:t>
+            </a:r>
+            <a:endParaRPr kumimoji="0" lang="en-US" sz="1600" b="0" i="0" u="none" strike="noStrike" cap="none" normalizeH="0" baseline="0" dirty="0" smtClean="0">
+              <a:ln>
+                <a:noFill/>
+              </a:ln>
+              <a:solidFill>
+                <a:schemeClr val="tx1"/>
+              </a:solidFill>
+              <a:effectLst/>
+              <a:cs typeface="Arial" pitchFamily="34" charset="0"/>
+            </a:endParaRPr>
+          </a:p>
+        </p:txBody>
+      </p:sp>
+      <p:sp>
+        <p:nvSpPr>
+          <p:cNvPr id="1049" name="Text Box 25"/>
+          <p:cNvSpPr txBox="1">
+            <a:spLocks noChangeArrowheads="1"/>
+          </p:cNvSpPr>
+          <p:nvPr/>
+        </p:nvSpPr>
+        <p:spPr bwMode="auto">
+          <a:xfrm>
+            <a:off x="6170724" y="4800601"/>
+            <a:ext cx="2160628" cy="595846"/>
+          </a:xfrm>
+          <a:prstGeom prst="rect">
+            <a:avLst/>
+          </a:prstGeom>
+          <a:solidFill>
+            <a:srgbClr val="FFFFFF"/>
+          </a:solidFill>
+          <a:ln w="9525">
+            <a:solidFill>
+              <a:srgbClr val="000000"/>
+            </a:solidFill>
+            <a:miter lim="800000"/>
+            <a:headEnd/>
+            <a:tailEnd/>
+          </a:ln>
+        </p:spPr>
+        <p:txBody>
+          <a:bodyPr vert="horz" wrap="square" lIns="91440" tIns="45720" rIns="91440" bIns="45720" numCol="1" anchor="t" anchorCtr="0" compatLnSpc="1">
+            <a:prstTxWarp prst="textNoShape">
+              <a:avLst/>
+            </a:prstTxWarp>
+          </a:bodyPr>
+          <a:lstStyle/>
+          <a:p>
+            <a:pPr marL="0" marR="0" lvl="0" indent="0" algn="ctr" defTabSz="914400" rtl="0" eaLnBrk="1" fontAlgn="base" latinLnBrk="0" hangingPunct="1">
+              <a:lnSpc>
+                <a:spcPct val="100000"/>
+              </a:lnSpc>
+              <a:spcBef>
+                <a:spcPct val="0"/>
+              </a:spcBef>
+              <a:spcAft>
+                <a:spcPts val="1000"/>
+              </a:spcAft>
+              <a:buClrTx/>
+              <a:buSzTx/>
+              <a:buFontTx/>
+              <a:buNone/>
+              <a:tabLst/>
+            </a:pPr>
+            <a:r>
+              <a:rPr kumimoji="0" lang="en-GB" sz="1600" b="0" i="0" u="none" strike="noStrike" cap="none" normalizeH="0" baseline="0" smtClean="0">
+                <a:ln>
+                  <a:noFill/>
+                </a:ln>
+                <a:solidFill>
+                  <a:schemeClr val="tx1"/>
+                </a:solidFill>
+                <a:effectLst/>
+                <a:cs typeface="Arial" pitchFamily="34" charset="0"/>
+              </a:rPr>
+              <a:t>Package-specific</a:t>
+            </a:r>
+            <a:br>
+              <a:rPr kumimoji="0" lang="en-GB" sz="1600" b="0" i="0" u="none" strike="noStrike" cap="none" normalizeH="0" baseline="0" smtClean="0">
+                <a:ln>
+                  <a:noFill/>
+                </a:ln>
+                <a:solidFill>
+                  <a:schemeClr val="tx1"/>
+                </a:solidFill>
+                <a:effectLst/>
+                <a:cs typeface="Arial" pitchFamily="34" charset="0"/>
+              </a:rPr>
+            </a:br>
+            <a:r>
+              <a:rPr kumimoji="0" lang="en-GB" sz="1600" b="0" i="0" u="none" strike="noStrike" cap="none" normalizeH="0" baseline="0" smtClean="0">
+                <a:ln>
+                  <a:noFill/>
+                </a:ln>
+                <a:solidFill>
+                  <a:schemeClr val="tx1"/>
+                </a:solidFill>
+                <a:effectLst/>
+                <a:cs typeface="Arial" pitchFamily="34" charset="0"/>
+              </a:rPr>
+              <a:t>C helper code</a:t>
+            </a:r>
+            <a:endParaRPr kumimoji="0" lang="en-US" sz="1600" b="0" i="0" u="none" strike="noStrike" cap="none" normalizeH="0" baseline="0" smtClean="0">
+              <a:ln>
+                <a:noFill/>
+              </a:ln>
+              <a:solidFill>
+                <a:schemeClr val="tx1"/>
+              </a:solidFill>
+              <a:effectLst/>
+              <a:cs typeface="Arial" pitchFamily="34" charset="0"/>
+            </a:endParaRPr>
+          </a:p>
+        </p:txBody>
+      </p:sp>
+      <p:cxnSp>
+        <p:nvCxnSpPr>
+          <p:cNvPr id="1050" name="AutoShape 26"/>
+          <p:cNvCxnSpPr>
+            <a:cxnSpLocks noChangeShapeType="1"/>
+          </p:cNvCxnSpPr>
+          <p:nvPr/>
+        </p:nvCxnSpPr>
+        <p:spPr bwMode="auto">
+          <a:xfrm>
+            <a:off x="7251037" y="5396448"/>
+            <a:ext cx="0" cy="402067"/>
+          </a:xfrm>
+          <a:prstGeom prst="straightConnector1">
+            <a:avLst/>
+          </a:prstGeom>
+          <a:noFill/>
+          <a:ln w="25400">
+            <a:solidFill>
+              <a:srgbClr val="000000"/>
+            </a:solidFill>
+            <a:round/>
+            <a:headEnd w="lg" len="lg"/>
+            <a:tailEnd type="triangle" w="lg" len="lg"/>
+          </a:ln>
+        </p:spPr>
+      </p:cxnSp>
+      <p:sp>
+        <p:nvSpPr>
+          <p:cNvPr id="4" name="Rounded Rectangle 3"/>
+          <p:cNvSpPr/>
+          <p:nvPr/>
+        </p:nvSpPr>
+        <p:spPr>
+          <a:xfrm>
+            <a:off x="1981200" y="4267200"/>
+            <a:ext cx="2057400" cy="533400"/>
+          </a:xfrm>
+          <a:prstGeom prst="roundRect">
+            <a:avLst>
+              <a:gd name="adj" fmla="val 31183"/>
+            </a:avLst>
+          </a:prstGeom>
+          <a:solidFill>
+            <a:srgbClr val="0070C0"/>
+          </a:solidFill>
+        </p:spPr>
+        <p:style>
+          <a:lnRef idx="2">
+            <a:schemeClr val="accent1">
+              <a:shade val="50000"/>
+            </a:schemeClr>
+          </a:lnRef>
+          <a:fillRef idx="1">
+            <a:schemeClr val="accent1"/>
+          </a:fillRef>
+          <a:effectRef idx="0">
+            <a:schemeClr val="accent1"/>
+          </a:effectRef>
+          <a:fontRef idx="minor">
+            <a:schemeClr val="lt1"/>
+          </a:fontRef>
+        </p:style>
+        <p:txBody>
+          <a:bodyPr rtlCol="0" anchor="ctr"/>
+          <a:lstStyle/>
+          <a:p>
+            <a:pPr algn="ctr"/>
+            <a:r>
+              <a:rPr lang="en-GB" sz="2000" dirty="0" smtClean="0"/>
+              <a:t>DPI boundary</a:t>
+            </a:r>
+            <a:endParaRPr lang="en-GB" sz="2000" dirty="0"/>
+          </a:p>
+        </p:txBody>
+      </p:sp>
+    </p:spTree>
+  </p:cSld>
+  <p:clrMapOvr>
+    <a:masterClrMapping/>
+  </p:clrMapOvr>
+  <p:timing>
+    <p:tnLst>
+      <p:par>
+        <p:cTn id="1" dur="indefinite" restart="never" nodeType="tmRoot">
+          <p:childTnLst>
+            <p:seq concurrent="1" nextAc="seek">
+              <p:cTn id="2" dur="indefinite" nodeType="mainSeq">
+                <p:childTnLst>
+                  <p:par>
+                    <p:cTn id="3" fill="hold">
+                      <p:stCondLst>
+                        <p:cond delay="indefinite"/>
+                      </p:stCondLst>
+                      <p:childTnLst>
+                        <p:par>
+                          <p:cTn id="4" fill="hold">
+                            <p:stCondLst>
+                              <p:cond delay="0"/>
+                            </p:stCondLst>
+                            <p:childTnLst>
+                              <p:par>
+                                <p:cTn id="5" presetID="1" presetClass="entr" presetSubtype="0" fill="hold" grpId="0" nodeType="clickEffect">
+                                  <p:stCondLst>
+                                    <p:cond delay="0"/>
+                                  </p:stCondLst>
+                                  <p:childTnLst>
+                                    <p:set>
+                                      <p:cBhvr>
+                                        <p:cTn id="6" dur="1" fill="hold">
+                                          <p:stCondLst>
+                                            <p:cond delay="0"/>
+                                          </p:stCondLst>
+                                        </p:cTn>
+                                        <p:tgtEl>
+                                          <p:spTgt spid="3">
+                                            <p:txEl>
+                                              <p:pRg st="0" end="0"/>
+                                            </p:txEl>
+                                          </p:spTgt>
+                                        </p:tgtEl>
+                                        <p:attrNameLst>
+                                          <p:attrName>style.visibility</p:attrName>
+                                        </p:attrNameLst>
+                                      </p:cBhvr>
+                                      <p:to>
+                                        <p:strVal val="visible"/>
+                                      </p:to>
+                                    </p:set>
+                                  </p:childTnLst>
+                                  <p:subTnLst>
+                                    <p:animClr>
+                                      <p:cBhvr override="childStyle">
+                                        <p:cTn dur="1" fill="hold" display="0" masterRel="nextClick" afterEffect="1"/>
+                                        <p:tgtEl>
+                                          <p:spTgt spid="3">
+                                            <p:txEl>
+                                              <p:pRg st="0" end="0"/>
+                                            </p:txEl>
+                                          </p:spTgt>
+                                        </p:tgtEl>
+                                        <p:attrNameLst>
+                                          <p:attrName>ppt_c</p:attrName>
+                                        </p:attrNameLst>
+                                      </p:cBhvr>
+                                      <p:to>
+                                        <a:srgbClr val="C0C0C0"/>
+                                      </p:to>
+                                    </p:animClr>
+                                  </p:subTnLst>
+                                </p:cTn>
+                              </p:par>
+                            </p:childTnLst>
+                          </p:cTn>
+                        </p:par>
+                      </p:childTnLst>
+                    </p:cTn>
+                  </p:par>
+                  <p:par>
+                    <p:cTn id="7" fill="hold">
+                      <p:stCondLst>
+                        <p:cond delay="indefinite"/>
+                      </p:stCondLst>
+                      <p:childTnLst>
+                        <p:par>
+                          <p:cTn id="8" fill="hold">
+                            <p:stCondLst>
+                              <p:cond delay="0"/>
+                            </p:stCondLst>
+                            <p:childTnLst>
+                              <p:par>
+                                <p:cTn id="9" presetID="1" presetClass="entr" presetSubtype="0" fill="hold" grpId="0" nodeType="clickEffect">
+                                  <p:stCondLst>
+                                    <p:cond delay="0"/>
+                                  </p:stCondLst>
+                                  <p:childTnLst>
+                                    <p:set>
+                                      <p:cBhvr>
+                                        <p:cTn id="10" dur="1" fill="hold">
+                                          <p:stCondLst>
+                                            <p:cond delay="0"/>
+                                          </p:stCondLst>
+                                        </p:cTn>
+                                        <p:tgtEl>
+                                          <p:spTgt spid="3">
+                                            <p:txEl>
+                                              <p:pRg st="1" end="1"/>
+                                            </p:txEl>
+                                          </p:spTgt>
+                                        </p:tgtEl>
+                                        <p:attrNameLst>
+                                          <p:attrName>style.visibility</p:attrName>
+                                        </p:attrNameLst>
+                                      </p:cBhvr>
+                                      <p:to>
+                                        <p:strVal val="visible"/>
+                                      </p:to>
+                                    </p:set>
+                                  </p:childTnLst>
+                                  <p:subTnLst>
+                                    <p:animClr>
+                                      <p:cBhvr override="childStyle">
+                                        <p:cTn dur="1" fill="hold" display="0" masterRel="nextClick" afterEffect="1"/>
+                                        <p:tgtEl>
+                                          <p:spTgt spid="3">
+                                            <p:txEl>
+                                              <p:pRg st="1" end="1"/>
+                                            </p:txEl>
+                                          </p:spTgt>
+                                        </p:tgtEl>
+                                        <p:attrNameLst>
+                                          <p:attrName>ppt_c</p:attrName>
+                                        </p:attrNameLst>
+                                      </p:cBhvr>
+                                      <p:to>
+                                        <a:srgbClr val="C0C0C0"/>
+                                      </p:to>
+                                    </p:animClr>
+                                  </p:subTnLst>
+                                </p:cTn>
+                              </p:par>
+                            </p:childTnLst>
+                          </p:cTn>
+                        </p:par>
+                      </p:childTnLst>
+                    </p:cTn>
+                  </p:par>
+                </p:childTnLst>
+              </p:cTn>
+              <p:prevCondLst>
+                <p:cond evt="onPrev" delay="0">
+                  <p:tgtEl>
+                    <p:sldTgt/>
+                  </p:tgtEl>
+                </p:cond>
+              </p:prevCondLst>
+              <p:nextCondLst>
+                <p:cond evt="onNext" delay="0">
+                  <p:tgtEl>
+                    <p:sldTgt/>
+                  </p:tgtEl>
+                </p:cond>
+              </p:nextCondLst>
+            </p:seq>
+          </p:childTnLst>
+        </p:cTn>
+      </p:par>
+    </p:tnLst>
+    <p:bldLst>
+      <p:bldP spid="3" grpId="0" build="p"/>
+    </p:bldLst>
+  </p:timing>
+</p:sld>
+</file>
+
+<file path=ppt/slides/slide16.xml><?xml version="1.0" encoding="utf-8"?>
+<p:sld xmlns:a="http://schemas.openxmlformats.org/drawingml/2006/main" xmlns:r="http://schemas.openxmlformats.org/officeDocument/2006/relationships" xmlns:p="http://schemas.openxmlformats.org/presentationml/2006/main">
+  <p:cSld>
+    <p:spTree>
+      <p:nvGrpSpPr>
+        <p:cNvPr id="1" name=""/>
+        <p:cNvGrpSpPr/>
+        <p:nvPr/>
+      </p:nvGrpSpPr>
+      <p:grpSpPr>
+        <a:xfrm>
+          <a:off x="0" y="0"/>
+          <a:ext cx="0" cy="0"/>
+          <a:chOff x="0" y="0"/>
+          <a:chExt cx="0" cy="0"/>
+        </a:xfrm>
+      </p:grpSpPr>
+      <p:sp>
+        <p:nvSpPr>
+          <p:cNvPr id="2" name="Title 1"/>
+          <p:cNvSpPr>
+            <a:spLocks noGrp="1"/>
+          </p:cNvSpPr>
+          <p:nvPr>
+            <p:ph type="title"/>
+          </p:nvPr>
+        </p:nvSpPr>
+        <p:spPr/>
+        <p:txBody>
+          <a:bodyPr/>
+          <a:lstStyle/>
+          <a:p>
+            <a:r>
               <a:rPr lang="en-US" smtClean="0"/>
               <a:t>Reminder: DOM↔object</a:t>
             </a:r>
@@ -14826,7 +16283,7 @@
 </p:sld>
 </file>
 
-<file path=ppt/slides/slide16.xml><?xml version="1.0" encoding="utf-8"?>
+<file path=ppt/slides/slide17.xml><?xml version="1.0" encoding="utf-8"?>
 <p:sld xmlns:a="http://schemas.openxmlformats.org/drawingml/2006/main" xmlns:r="http://schemas.openxmlformats.org/officeDocument/2006/relationships" xmlns:p="http://schemas.openxmlformats.org/presentationml/2006/main">
   <p:cSld>
     <p:spTree>
@@ -15680,7 +17137,7 @@
 </p:sld>
 </file>
 
-<file path=ppt/slides/slide17.xml><?xml version="1.0" encoding="utf-8"?>
+<file path=ppt/slides/slide18.xml><?xml version="1.0" encoding="utf-8"?>
 <p:sld xmlns:a="http://schemas.openxmlformats.org/drawingml/2006/main" xmlns:r="http://schemas.openxmlformats.org/officeDocument/2006/relationships" xmlns:p="http://schemas.openxmlformats.org/presentationml/2006/main">
   <p:cSld>
     <p:spTree>
@@ -19424,7 +20881,7 @@
 </p:sld>
 </file>
 
-<file path=ppt/slides/slide18.xml><?xml version="1.0" encoding="utf-8"?>
+<file path=ppt/slides/slide19.xml><?xml version="1.0" encoding="utf-8"?>
 <p:sld xmlns:a="http://schemas.openxmlformats.org/drawingml/2006/main" xmlns:r="http://schemas.openxmlformats.org/officeDocument/2006/relationships" xmlns:p="http://schemas.openxmlformats.org/presentationml/2006/main">
   <p:cSld>
     <p:spTree>
@@ -20257,255 +21714,6 @@
           <a:p>
             <a:pPr algn="ctr"/>
             <a:endParaRPr lang="en-GB"/>
-          </a:p>
-        </p:txBody>
-      </p:sp>
-    </p:spTree>
-  </p:cSld>
-  <p:clrMapOvr>
-    <a:masterClrMapping/>
-  </p:clrMapOvr>
-  <p:timing>
-    <p:tnLst>
-      <p:par>
-        <p:cTn id="1" dur="indefinite" restart="never" nodeType="tmRoot"/>
-      </p:par>
-    </p:tnLst>
-  </p:timing>
-</p:sld>
-</file>
-
-<file path=ppt/slides/slide19.xml><?xml version="1.0" encoding="utf-8"?>
-<p:sld xmlns:a="http://schemas.openxmlformats.org/drawingml/2006/main" xmlns:r="http://schemas.openxmlformats.org/officeDocument/2006/relationships" xmlns:p="http://schemas.openxmlformats.org/presentationml/2006/main">
-  <p:cSld>
-    <p:spTree>
-      <p:nvGrpSpPr>
-        <p:cNvPr id="1" name=""/>
-        <p:cNvGrpSpPr/>
-        <p:nvPr/>
-      </p:nvGrpSpPr>
-      <p:grpSpPr>
-        <a:xfrm>
-          <a:off x="0" y="0"/>
-          <a:ext cx="0" cy="0"/>
-          <a:chOff x="0" y="0"/>
-          <a:chExt cx="0" cy="0"/>
-        </a:xfrm>
-      </p:grpSpPr>
-      <p:sp>
-        <p:nvSpPr>
-          <p:cNvPr id="2" name="Title 1"/>
-          <p:cNvSpPr>
-            <a:spLocks noGrp="1"/>
-          </p:cNvSpPr>
-          <p:nvPr>
-            <p:ph type="title"/>
-          </p:nvPr>
-        </p:nvSpPr>
-        <p:spPr>
-          <a:xfrm>
-            <a:off x="1143000" y="274638"/>
-            <a:ext cx="6705600" cy="868362"/>
-          </a:xfrm>
-        </p:spPr>
-        <p:txBody>
-          <a:bodyPr/>
-          <a:lstStyle/>
-          <a:p>
-            <a:r>
-              <a:rPr lang="en-US" dirty="0" smtClean="0"/>
-              <a:t>No time to describe…</a:t>
-            </a:r>
-            <a:endParaRPr lang="en-GB" dirty="0"/>
-          </a:p>
-        </p:txBody>
-      </p:sp>
-      <p:sp>
-        <p:nvSpPr>
-          <p:cNvPr id="3" name="Content Placeholder 2"/>
-          <p:cNvSpPr>
-            <a:spLocks noGrp="1"/>
-          </p:cNvSpPr>
-          <p:nvPr>
-            <p:ph sz="half" idx="1"/>
-          </p:nvPr>
-        </p:nvSpPr>
-        <p:spPr>
-          <a:xfrm>
-            <a:off x="381000" y="1524000"/>
-            <a:ext cx="7772400" cy="4572000"/>
-          </a:xfrm>
-        </p:spPr>
-        <p:txBody>
-          <a:bodyPr/>
-          <a:lstStyle/>
-          <a:p>
-            <a:r>
-              <a:rPr lang="en-US" dirty="0" smtClean="0"/>
-              <a:t>Many string manipulation functions</a:t>
-            </a:r>
-          </a:p>
-          <a:p>
-            <a:pPr lvl="1"/>
-            <a:r>
-              <a:rPr lang="en-US" dirty="0" smtClean="0"/>
-              <a:t>slice, insert, append, left/right/center pad</a:t>
-            </a:r>
-          </a:p>
-          <a:p>
-            <a:pPr lvl="1"/>
-            <a:r>
-              <a:rPr lang="en-US" dirty="0" smtClean="0"/>
-              <a:t>find first/last occurrence of substring</a:t>
-            </a:r>
-          </a:p>
-          <a:p>
-            <a:r>
-              <a:rPr lang="en-US" dirty="0" smtClean="0"/>
-              <a:t>Utility functions wrapper for </a:t>
-            </a:r>
-            <a:r>
-              <a:rPr lang="en-US" dirty="0" err="1" smtClean="0"/>
-              <a:t>enums</a:t>
-            </a:r>
-            <a:r>
-              <a:rPr lang="en-US" dirty="0" smtClean="0"/>
-              <a:t>:</a:t>
-            </a:r>
-          </a:p>
-          <a:p>
-            <a:pPr lvl="1"/>
-            <a:r>
-              <a:rPr lang="en-US" dirty="0" smtClean="0"/>
-              <a:t>get length of longest </a:t>
-            </a:r>
-            <a:r>
-              <a:rPr lang="en-US" dirty="0" err="1" smtClean="0"/>
-              <a:t>enum</a:t>
-            </a:r>
-            <a:r>
-              <a:rPr lang="en-US" dirty="0" smtClean="0"/>
-              <a:t> name</a:t>
-            </a:r>
-          </a:p>
-          <a:p>
-            <a:pPr lvl="1"/>
-            <a:r>
-              <a:rPr lang="en-US" dirty="0" smtClean="0"/>
-              <a:t>safe conversion from string to </a:t>
-            </a:r>
-            <a:r>
-              <a:rPr lang="en-US" dirty="0" err="1" smtClean="0"/>
-              <a:t>enum</a:t>
-            </a:r>
-            <a:endParaRPr lang="en-US" dirty="0" smtClean="0"/>
-          </a:p>
-          <a:p>
-            <a:pPr lvl="1"/>
-            <a:r>
-              <a:rPr lang="en-US" dirty="0" smtClean="0"/>
-              <a:t>wildcard match of values against </a:t>
-            </a:r>
-            <a:r>
-              <a:rPr lang="en-US" dirty="0" err="1" smtClean="0"/>
-              <a:t>enums</a:t>
-            </a:r>
-            <a:r>
-              <a:rPr lang="en-US" dirty="0" smtClean="0"/>
-              <a:t/>
-            </a:r>
-            <a:br>
-              <a:rPr lang="en-US" dirty="0" smtClean="0"/>
-            </a:br>
-            <a:r>
-              <a:rPr lang="en-US" dirty="0" smtClean="0"/>
-              <a:t>that have some X/Z bits</a:t>
-            </a:r>
-          </a:p>
-          <a:p>
-            <a:pPr lvl="1"/>
-            <a:r>
-              <a:rPr lang="en-US" dirty="0" smtClean="0"/>
-              <a:t>queue of all values of </a:t>
-            </a:r>
-            <a:r>
-              <a:rPr lang="en-US" dirty="0" err="1" smtClean="0"/>
-              <a:t>enum</a:t>
-            </a:r>
-            <a:r>
-              <a:rPr lang="en-US" dirty="0" smtClean="0"/>
-              <a:t> type</a:t>
-            </a:r>
-          </a:p>
-          <a:p>
-            <a:r>
-              <a:rPr lang="en-US" dirty="0" smtClean="0"/>
-              <a:t>One </a:t>
-            </a:r>
-            <a:r>
-              <a:rPr lang="en-US" dirty="0" err="1" smtClean="0"/>
-              <a:t>easter</a:t>
-            </a:r>
-            <a:r>
-              <a:rPr lang="en-US" dirty="0" smtClean="0"/>
-              <a:t>-egg</a:t>
-            </a:r>
-          </a:p>
-        </p:txBody>
-      </p:sp>
-      <p:sp>
-        <p:nvSpPr>
-          <p:cNvPr id="6" name="Rounded Rectangle 5"/>
-          <p:cNvSpPr/>
-          <p:nvPr/>
-        </p:nvSpPr>
-        <p:spPr>
-          <a:xfrm>
-            <a:off x="6172200" y="2971800"/>
-            <a:ext cx="2667000" cy="685800"/>
-          </a:xfrm>
-          <a:prstGeom prst="roundRect">
-            <a:avLst>
-              <a:gd name="adj" fmla="val 25587"/>
-            </a:avLst>
-          </a:prstGeom>
-          <a:solidFill>
-            <a:srgbClr val="0070C0"/>
-          </a:solidFill>
-        </p:spPr>
-        <p:style>
-          <a:lnRef idx="2">
-            <a:schemeClr val="accent1">
-              <a:shade val="50000"/>
-            </a:schemeClr>
-          </a:lnRef>
-          <a:fillRef idx="1">
-            <a:schemeClr val="accent1"/>
-          </a:fillRef>
-          <a:effectRef idx="0">
-            <a:schemeClr val="accent1"/>
-          </a:effectRef>
-          <a:fontRef idx="minor">
-            <a:schemeClr val="lt1"/>
-          </a:fontRef>
-        </p:style>
-        <p:txBody>
-          <a:bodyPr rtlCol="0" anchor="ctr"/>
-          <a:lstStyle/>
-          <a:p>
-            <a:pPr algn="ctr"/>
-            <a:r>
-              <a:rPr lang="en-GB" dirty="0" smtClean="0"/>
-              <a:t>great minds think alike,</a:t>
-            </a:r>
-            <a:br>
-              <a:rPr lang="en-GB" dirty="0" smtClean="0"/>
-            </a:br>
-            <a:r>
-              <a:rPr lang="en-GB" dirty="0" smtClean="0"/>
-              <a:t>UVM1.2!</a:t>
-            </a:r>
-            <a:endParaRPr lang="en-GB" dirty="0"/>
           </a:p>
         </p:txBody>
       </p:sp>
@@ -20640,6 +21848,255 @@
 </file>
 
 <file path=ppt/slides/slide20.xml><?xml version="1.0" encoding="utf-8"?>
+<p:sld xmlns:a="http://schemas.openxmlformats.org/drawingml/2006/main" xmlns:r="http://schemas.openxmlformats.org/officeDocument/2006/relationships" xmlns:p="http://schemas.openxmlformats.org/presentationml/2006/main">
+  <p:cSld>
+    <p:spTree>
+      <p:nvGrpSpPr>
+        <p:cNvPr id="1" name=""/>
+        <p:cNvGrpSpPr/>
+        <p:nvPr/>
+      </p:nvGrpSpPr>
+      <p:grpSpPr>
+        <a:xfrm>
+          <a:off x="0" y="0"/>
+          <a:ext cx="0" cy="0"/>
+          <a:chOff x="0" y="0"/>
+          <a:chExt cx="0" cy="0"/>
+        </a:xfrm>
+      </p:grpSpPr>
+      <p:sp>
+        <p:nvSpPr>
+          <p:cNvPr id="2" name="Title 1"/>
+          <p:cNvSpPr>
+            <a:spLocks noGrp="1"/>
+          </p:cNvSpPr>
+          <p:nvPr>
+            <p:ph type="title"/>
+          </p:nvPr>
+        </p:nvSpPr>
+        <p:spPr>
+          <a:xfrm>
+            <a:off x="1143000" y="274638"/>
+            <a:ext cx="6705600" cy="868362"/>
+          </a:xfrm>
+        </p:spPr>
+        <p:txBody>
+          <a:bodyPr/>
+          <a:lstStyle/>
+          <a:p>
+            <a:r>
+              <a:rPr lang="en-US" dirty="0" smtClean="0"/>
+              <a:t>No time to describe…</a:t>
+            </a:r>
+            <a:endParaRPr lang="en-GB" dirty="0"/>
+          </a:p>
+        </p:txBody>
+      </p:sp>
+      <p:sp>
+        <p:nvSpPr>
+          <p:cNvPr id="3" name="Content Placeholder 2"/>
+          <p:cNvSpPr>
+            <a:spLocks noGrp="1"/>
+          </p:cNvSpPr>
+          <p:nvPr>
+            <p:ph sz="half" idx="1"/>
+          </p:nvPr>
+        </p:nvSpPr>
+        <p:spPr>
+          <a:xfrm>
+            <a:off x="381000" y="1524000"/>
+            <a:ext cx="7772400" cy="4572000"/>
+          </a:xfrm>
+        </p:spPr>
+        <p:txBody>
+          <a:bodyPr/>
+          <a:lstStyle/>
+          <a:p>
+            <a:r>
+              <a:rPr lang="en-US" dirty="0" smtClean="0"/>
+              <a:t>Many string manipulation functions</a:t>
+            </a:r>
+          </a:p>
+          <a:p>
+            <a:pPr lvl="1"/>
+            <a:r>
+              <a:rPr lang="en-US" dirty="0" smtClean="0"/>
+              <a:t>slice, insert, append, left/right/center pad</a:t>
+            </a:r>
+          </a:p>
+          <a:p>
+            <a:pPr lvl="1"/>
+            <a:r>
+              <a:rPr lang="en-US" dirty="0" smtClean="0"/>
+              <a:t>find first/last occurrence of substring</a:t>
+            </a:r>
+          </a:p>
+          <a:p>
+            <a:r>
+              <a:rPr lang="en-US" dirty="0" smtClean="0"/>
+              <a:t>Utility functions wrapper for </a:t>
+            </a:r>
+            <a:r>
+              <a:rPr lang="en-US" dirty="0" err="1" smtClean="0"/>
+              <a:t>enums</a:t>
+            </a:r>
+            <a:r>
+              <a:rPr lang="en-US" dirty="0" smtClean="0"/>
+              <a:t>:</a:t>
+            </a:r>
+          </a:p>
+          <a:p>
+            <a:pPr lvl="1"/>
+            <a:r>
+              <a:rPr lang="en-US" dirty="0" smtClean="0"/>
+              <a:t>get length of longest </a:t>
+            </a:r>
+            <a:r>
+              <a:rPr lang="en-US" dirty="0" err="1" smtClean="0"/>
+              <a:t>enum</a:t>
+            </a:r>
+            <a:r>
+              <a:rPr lang="en-US" dirty="0" smtClean="0"/>
+              <a:t> name</a:t>
+            </a:r>
+          </a:p>
+          <a:p>
+            <a:pPr lvl="1"/>
+            <a:r>
+              <a:rPr lang="en-US" dirty="0" smtClean="0"/>
+              <a:t>safe conversion from string to </a:t>
+            </a:r>
+            <a:r>
+              <a:rPr lang="en-US" dirty="0" err="1" smtClean="0"/>
+              <a:t>enum</a:t>
+            </a:r>
+            <a:endParaRPr lang="en-US" dirty="0" smtClean="0"/>
+          </a:p>
+          <a:p>
+            <a:pPr lvl="1"/>
+            <a:r>
+              <a:rPr lang="en-US" dirty="0" smtClean="0"/>
+              <a:t>wildcard match of values against </a:t>
+            </a:r>
+            <a:r>
+              <a:rPr lang="en-US" dirty="0" err="1" smtClean="0"/>
+              <a:t>enums</a:t>
+            </a:r>
+            <a:r>
+              <a:rPr lang="en-US" dirty="0" smtClean="0"/>
+              <a:t/>
+            </a:r>
+            <a:br>
+              <a:rPr lang="en-US" dirty="0" smtClean="0"/>
+            </a:br>
+            <a:r>
+              <a:rPr lang="en-US" dirty="0" smtClean="0"/>
+              <a:t>that have some X/Z bits</a:t>
+            </a:r>
+          </a:p>
+          <a:p>
+            <a:pPr lvl="1"/>
+            <a:r>
+              <a:rPr lang="en-US" dirty="0" smtClean="0"/>
+              <a:t>queue of all values of </a:t>
+            </a:r>
+            <a:r>
+              <a:rPr lang="en-US" dirty="0" err="1" smtClean="0"/>
+              <a:t>enum</a:t>
+            </a:r>
+            <a:r>
+              <a:rPr lang="en-US" dirty="0" smtClean="0"/>
+              <a:t> type</a:t>
+            </a:r>
+          </a:p>
+          <a:p>
+            <a:r>
+              <a:rPr lang="en-US" dirty="0" smtClean="0"/>
+              <a:t>One </a:t>
+            </a:r>
+            <a:r>
+              <a:rPr lang="en-US" dirty="0" err="1" smtClean="0"/>
+              <a:t>easter</a:t>
+            </a:r>
+            <a:r>
+              <a:rPr lang="en-US" dirty="0" smtClean="0"/>
+              <a:t>-egg</a:t>
+            </a:r>
+          </a:p>
+        </p:txBody>
+      </p:sp>
+      <p:sp>
+        <p:nvSpPr>
+          <p:cNvPr id="6" name="Rounded Rectangle 5"/>
+          <p:cNvSpPr/>
+          <p:nvPr/>
+        </p:nvSpPr>
+        <p:spPr>
+          <a:xfrm>
+            <a:off x="6172200" y="2971800"/>
+            <a:ext cx="2667000" cy="685800"/>
+          </a:xfrm>
+          <a:prstGeom prst="roundRect">
+            <a:avLst>
+              <a:gd name="adj" fmla="val 25587"/>
+            </a:avLst>
+          </a:prstGeom>
+          <a:solidFill>
+            <a:srgbClr val="0070C0"/>
+          </a:solidFill>
+        </p:spPr>
+        <p:style>
+          <a:lnRef idx="2">
+            <a:schemeClr val="accent1">
+              <a:shade val="50000"/>
+            </a:schemeClr>
+          </a:lnRef>
+          <a:fillRef idx="1">
+            <a:schemeClr val="accent1"/>
+          </a:fillRef>
+          <a:effectRef idx="0">
+            <a:schemeClr val="accent1"/>
+          </a:effectRef>
+          <a:fontRef idx="minor">
+            <a:schemeClr val="lt1"/>
+          </a:fontRef>
+        </p:style>
+        <p:txBody>
+          <a:bodyPr rtlCol="0" anchor="ctr"/>
+          <a:lstStyle/>
+          <a:p>
+            <a:pPr algn="ctr"/>
+            <a:r>
+              <a:rPr lang="en-GB" dirty="0" smtClean="0"/>
+              <a:t>great minds think alike,</a:t>
+            </a:r>
+            <a:br>
+              <a:rPr lang="en-GB" dirty="0" smtClean="0"/>
+            </a:br>
+            <a:r>
+              <a:rPr lang="en-GB" dirty="0" smtClean="0"/>
+              <a:t>UVM1.2!</a:t>
+            </a:r>
+            <a:endParaRPr lang="en-GB" dirty="0"/>
+          </a:p>
+        </p:txBody>
+      </p:sp>
+    </p:spTree>
+  </p:cSld>
+  <p:clrMapOvr>
+    <a:masterClrMapping/>
+  </p:clrMapOvr>
+  <p:timing>
+    <p:tnLst>
+      <p:par>
+        <p:cTn id="1" dur="indefinite" restart="never" nodeType="tmRoot"/>
+      </p:par>
+    </p:tnLst>
+  </p:timing>
+</p:sld>
+</file>
+
+<file path=ppt/slides/slide21.xml><?xml version="1.0" encoding="utf-8"?>
 <p:sld xmlns:a="http://schemas.openxmlformats.org/drawingml/2006/main" xmlns:r="http://schemas.openxmlformats.org/officeDocument/2006/relationships" xmlns:p="http://schemas.openxmlformats.org/presentationml/2006/main">
   <p:cSld>
     <p:spTree>
@@ -20859,7 +22316,7 @@
 </p:sld>
 </file>
 
-<file path=ppt/slides/slide21.xml><?xml version="1.0" encoding="utf-8"?>
+<file path=ppt/slides/slide22.xml><?xml version="1.0" encoding="utf-8"?>
 <p:sld xmlns:a="http://schemas.openxmlformats.org/drawingml/2006/main" xmlns:r="http://schemas.openxmlformats.org/officeDocument/2006/relationships" xmlns:p="http://schemas.openxmlformats.org/presentationml/2006/main">
   <p:cSld>
     <p:spTree>

</xml_diff>

<commit_message>
Final version of presentation as delivered at DVCon.
</commit_message>
<xml_diff>
--- a/svlib/doc/163-aq602-final.pptx
+++ b/svlib/doc/163-aq602-final.pptx
@@ -45,7 +45,7 @@
       <p:boldItalic r:id="rId29"/>
     </p:embeddedFont>
     <p:embeddedFont>
-      <p:font typeface="Consolas" pitchFamily="49" charset="0"/>
+      <p:font typeface="consolas" pitchFamily="49" charset="0"/>
       <p:regular r:id="rId30"/>
       <p:bold r:id="rId31"/>
       <p:italic r:id="rId32"/>
@@ -1153,6 +1153,88 @@
 </p:notes>
 </file>
 
+<file path=ppt/notesSlides/notesSlide7.xml><?xml version="1.0" encoding="utf-8"?>
+<p:notes xmlns:a="http://schemas.openxmlformats.org/drawingml/2006/main" xmlns:r="http://schemas.openxmlformats.org/officeDocument/2006/relationships" xmlns:p="http://schemas.openxmlformats.org/presentationml/2006/main">
+  <p:cSld>
+    <p:spTree>
+      <p:nvGrpSpPr>
+        <p:cNvPr id="1" name=""/>
+        <p:cNvGrpSpPr/>
+        <p:nvPr/>
+      </p:nvGrpSpPr>
+      <p:grpSpPr>
+        <a:xfrm>
+          <a:off x="0" y="0"/>
+          <a:ext cx="0" cy="0"/>
+          <a:chOff x="0" y="0"/>
+          <a:chExt cx="0" cy="0"/>
+        </a:xfrm>
+      </p:grpSpPr>
+      <p:sp>
+        <p:nvSpPr>
+          <p:cNvPr id="2" name="Slide Image Placeholder 1"/>
+          <p:cNvSpPr>
+            <a:spLocks noGrp="1" noRot="1" noChangeAspect="1"/>
+          </p:cNvSpPr>
+          <p:nvPr>
+            <p:ph type="sldImg"/>
+          </p:nvPr>
+        </p:nvSpPr>
+        <p:spPr/>
+      </p:sp>
+      <p:sp>
+        <p:nvSpPr>
+          <p:cNvPr id="3" name="Notes Placeholder 2"/>
+          <p:cNvSpPr>
+            <a:spLocks noGrp="1"/>
+          </p:cNvSpPr>
+          <p:nvPr>
+            <p:ph type="body" idx="1"/>
+          </p:nvPr>
+        </p:nvSpPr>
+        <p:spPr/>
+        <p:txBody>
+          <a:bodyPr>
+            <a:normAutofit/>
+          </a:bodyPr>
+          <a:lstStyle/>
+          <a:p>
+            <a:endParaRPr lang="en-GB" dirty="0"/>
+          </a:p>
+        </p:txBody>
+      </p:sp>
+      <p:sp>
+        <p:nvSpPr>
+          <p:cNvPr id="4" name="Slide Number Placeholder 3"/>
+          <p:cNvSpPr>
+            <a:spLocks noGrp="1"/>
+          </p:cNvSpPr>
+          <p:nvPr>
+            <p:ph type="sldNum" sz="quarter" idx="10"/>
+          </p:nvPr>
+        </p:nvSpPr>
+        <p:spPr/>
+        <p:txBody>
+          <a:bodyPr/>
+          <a:lstStyle/>
+          <a:p>
+            <a:fld id="{BC894F08-F219-4AC0-95BA-DA83F48EC7C1}" type="slidenum">
+              <a:rPr lang="en-GB" smtClean="0"/>
+              <a:pPr/>
+              <a:t>19</a:t>
+            </a:fld>
+            <a:endParaRPr lang="en-GB"/>
+          </a:p>
+        </p:txBody>
+      </p:sp>
+    </p:spTree>
+  </p:cSld>
+  <p:clrMapOvr>
+    <a:masterClrMapping/>
+  </p:clrMapOvr>
+</p:notes>
+</file>
+
 <file path=ppt/slideLayouts/slideLayout1.xml><?xml version="1.0" encoding="utf-8"?>
 <p:sldLayout xmlns:a="http://schemas.openxmlformats.org/drawingml/2006/main" xmlns:r="http://schemas.openxmlformats.org/officeDocument/2006/relationships" xmlns:p="http://schemas.openxmlformats.org/presentationml/2006/main" preserve="1" userDrawn="1">
   <p:cSld name="Title Only">
@@ -1258,24 +1340,7 @@
                 <a:ea typeface="+mn-ea"/>
                 <a:cs typeface="+mn-cs"/>
               </a:rPr>
-              <a:t> of </a:t>
-            </a:r>
-            <a:r>
-              <a:rPr kumimoji="0" lang="en-US" sz="1200" b="0" i="0" u="none" strike="noStrike" kern="1200" cap="none" spc="0" normalizeH="0" baseline="0" noProof="0" dirty="0" smtClean="0">
-                <a:ln>
-                  <a:noFill/>
-                </a:ln>
-                <a:solidFill>
-                  <a:schemeClr val="bg1"/>
-                </a:solidFill>
-                <a:effectLst/>
-                <a:uLnTx/>
-                <a:uFillTx/>
-                <a:latin typeface="+mn-lt"/>
-                <a:ea typeface="+mn-ea"/>
-                <a:cs typeface="+mn-cs"/>
-              </a:rPr>
-              <a:t>22</a:t>
+              <a:t> of 22</a:t>
             </a:r>
             <a:endParaRPr kumimoji="0" lang="en-US" sz="1200" b="0" i="0" u="none" strike="noStrike" kern="1200" cap="none" spc="0" normalizeH="0" baseline="0" noProof="0" dirty="0">
               <a:ln>
@@ -1495,7 +1560,7 @@
     </p:spTree>
     <p:extLst>
       <p:ext uri="{BB962C8B-B14F-4D97-AF65-F5344CB8AC3E}">
-        <p14:creationId xmlns:p14="http://schemas.microsoft.com/office/powerpoint/2010/main" xmlns="" val="989869968"/>
+        <p14:creationId xmlns="" xmlns:p14="http://schemas.microsoft.com/office/powerpoint/2010/main" val="989869968"/>
       </p:ext>
     </p:extLst>
   </p:cSld>
@@ -1690,7 +1755,7 @@
     </p:spTree>
     <p:extLst>
       <p:ext uri="{BB962C8B-B14F-4D97-AF65-F5344CB8AC3E}">
-        <p14:creationId xmlns:p14="http://schemas.microsoft.com/office/powerpoint/2010/main" xmlns="" val="1452775338"/>
+        <p14:creationId xmlns="" xmlns:p14="http://schemas.microsoft.com/office/powerpoint/2010/main" val="1452775338"/>
       </p:ext>
     </p:extLst>
   </p:cSld>
@@ -1878,7 +1943,7 @@
     </p:spTree>
     <p:extLst>
       <p:ext uri="{BB962C8B-B14F-4D97-AF65-F5344CB8AC3E}">
-        <p14:creationId xmlns:p14="http://schemas.microsoft.com/office/powerpoint/2010/main" xmlns="" val="3894337954"/>
+        <p14:creationId xmlns="" xmlns:p14="http://schemas.microsoft.com/office/powerpoint/2010/main" val="3894337954"/>
       </p:ext>
     </p:extLst>
   </p:cSld>
@@ -2128,7 +2193,7 @@
     </p:spTree>
     <p:extLst>
       <p:ext uri="{BB962C8B-B14F-4D97-AF65-F5344CB8AC3E}">
-        <p14:creationId xmlns:p14="http://schemas.microsoft.com/office/powerpoint/2010/main" xmlns="" val="1362160421"/>
+        <p14:creationId xmlns="" xmlns:p14="http://schemas.microsoft.com/office/powerpoint/2010/main" val="1362160421"/>
       </p:ext>
     </p:extLst>
   </p:cSld>
@@ -2316,7 +2381,7 @@
     </p:spTree>
     <p:extLst>
       <p:ext uri="{BB962C8B-B14F-4D97-AF65-F5344CB8AC3E}">
-        <p14:creationId xmlns:p14="http://schemas.microsoft.com/office/powerpoint/2010/main" xmlns="" val="1001508708"/>
+        <p14:creationId xmlns="" xmlns:p14="http://schemas.microsoft.com/office/powerpoint/2010/main" val="1001508708"/>
       </p:ext>
     </p:extLst>
   </p:cSld>
@@ -2570,7 +2635,7 @@
     </p:spTree>
     <p:extLst>
       <p:ext uri="{BB962C8B-B14F-4D97-AF65-F5344CB8AC3E}">
-        <p14:creationId xmlns:p14="http://schemas.microsoft.com/office/powerpoint/2010/main" xmlns="" val="3465844944"/>
+        <p14:creationId xmlns="" xmlns:p14="http://schemas.microsoft.com/office/powerpoint/2010/main" val="3465844944"/>
       </p:ext>
     </p:extLst>
   </p:cSld>
@@ -2874,7 +2939,7 @@
     </p:spTree>
     <p:extLst>
       <p:ext uri="{BB962C8B-B14F-4D97-AF65-F5344CB8AC3E}">
-        <p14:creationId xmlns:p14="http://schemas.microsoft.com/office/powerpoint/2010/main" xmlns="" val="3500538590"/>
+        <p14:creationId xmlns="" xmlns:p14="http://schemas.microsoft.com/office/powerpoint/2010/main" val="3500538590"/>
       </p:ext>
     </p:extLst>
   </p:cSld>
@@ -3318,7 +3383,7 @@
     </p:spTree>
     <p:extLst>
       <p:ext uri="{BB962C8B-B14F-4D97-AF65-F5344CB8AC3E}">
-        <p14:creationId xmlns:p14="http://schemas.microsoft.com/office/powerpoint/2010/main" xmlns="" val="1822163244"/>
+        <p14:creationId xmlns="" xmlns:p14="http://schemas.microsoft.com/office/powerpoint/2010/main" val="1822163244"/>
       </p:ext>
     </p:extLst>
   </p:cSld>
@@ -3415,7 +3480,7 @@
     </p:spTree>
     <p:extLst>
       <p:ext uri="{BB962C8B-B14F-4D97-AF65-F5344CB8AC3E}">
-        <p14:creationId xmlns:p14="http://schemas.microsoft.com/office/powerpoint/2010/main" xmlns="" val="2405767068"/>
+        <p14:creationId xmlns="" xmlns:p14="http://schemas.microsoft.com/office/powerpoint/2010/main" val="2405767068"/>
       </p:ext>
     </p:extLst>
   </p:cSld>
@@ -3703,7 +3768,7 @@
     </p:spTree>
     <p:extLst>
       <p:ext uri="{BB962C8B-B14F-4D97-AF65-F5344CB8AC3E}">
-        <p14:creationId xmlns:p14="http://schemas.microsoft.com/office/powerpoint/2010/main" xmlns="" val="1001517974"/>
+        <p14:creationId xmlns="" xmlns:p14="http://schemas.microsoft.com/office/powerpoint/2010/main" val="1001517974"/>
       </p:ext>
     </p:extLst>
   </p:cSld>
@@ -3967,7 +4032,7 @@
     </p:spTree>
     <p:extLst>
       <p:ext uri="{BB962C8B-B14F-4D97-AF65-F5344CB8AC3E}">
-        <p14:creationId xmlns:p14="http://schemas.microsoft.com/office/powerpoint/2010/main" xmlns="" val="1032843098"/>
+        <p14:creationId xmlns="" xmlns:p14="http://schemas.microsoft.com/office/powerpoint/2010/main" val="1032843098"/>
       </p:ext>
     </p:extLst>
   </p:cSld>
@@ -4127,7 +4192,7 @@
     </p:spTree>
     <p:extLst>
       <p:ext uri="{BB962C8B-B14F-4D97-AF65-F5344CB8AC3E}">
-        <p14:creationId xmlns:p14="http://schemas.microsoft.com/office/powerpoint/2010/main" xmlns="" val="2425591320"/>
+        <p14:creationId xmlns="" xmlns:p14="http://schemas.microsoft.com/office/powerpoint/2010/main" val="2425591320"/>
       </p:ext>
     </p:extLst>
   </p:cSld>
@@ -4548,7 +4613,7 @@
     </p:spTree>
     <p:extLst>
       <p:ext uri="{BB962C8B-B14F-4D97-AF65-F5344CB8AC3E}">
-        <p14:creationId xmlns:p14="http://schemas.microsoft.com/office/powerpoint/2010/main" xmlns="" val="3983013449"/>
+        <p14:creationId xmlns="" xmlns:p14="http://schemas.microsoft.com/office/powerpoint/2010/main" val="3983013449"/>
       </p:ext>
     </p:extLst>
   </p:cSld>
@@ -10985,11 +11050,7 @@
           <a:p>
             <a:r>
               <a:rPr lang="en-US" dirty="0" smtClean="0"/>
-              <a:t>Implementation </a:t>
-            </a:r>
-            <a:r>
-              <a:rPr lang="en-US" dirty="0" smtClean="0"/>
-              <a:t>architecture</a:t>
+              <a:t>Implementation architecture</a:t>
             </a:r>
             <a:endParaRPr lang="en-GB" dirty="0"/>
           </a:p>
@@ -11017,15 +11078,7 @@
           <a:p>
             <a:r>
               <a:rPr lang="en-US" dirty="0" smtClean="0"/>
-              <a:t>Avoid </a:t>
-            </a:r>
-            <a:r>
-              <a:rPr lang="en-US" dirty="0" smtClean="0"/>
-              <a:t>unnecessary movement of data across </a:t>
-            </a:r>
-            <a:r>
-              <a:rPr lang="en-US" dirty="0" smtClean="0"/>
-              <a:t>DPI</a:t>
+              <a:t>Avoid unnecessary movement of data across DPI</a:t>
             </a:r>
           </a:p>
           <a:p>
@@ -12219,173 +12272,9 @@
   <p:timing>
     <p:tnLst>
       <p:par>
-        <p:cTn id="1" dur="indefinite" restart="never" nodeType="tmRoot">
-          <p:childTnLst>
-            <p:seq concurrent="1" nextAc="seek">
-              <p:cTn id="2" dur="indefinite" nodeType="mainSeq">
-                <p:childTnLst>
-                  <p:par>
-                    <p:cTn id="3" fill="hold">
-                      <p:stCondLst>
-                        <p:cond delay="indefinite"/>
-                      </p:stCondLst>
-                      <p:childTnLst>
-                        <p:par>
-                          <p:cTn id="4" fill="hold">
-                            <p:stCondLst>
-                              <p:cond delay="0"/>
-                            </p:stCondLst>
-                            <p:childTnLst>
-                              <p:par>
-                                <p:cTn id="5" presetID="1" presetClass="entr" presetSubtype="0" fill="hold" grpId="0" nodeType="clickEffect">
-                                  <p:stCondLst>
-                                    <p:cond delay="0"/>
-                                  </p:stCondLst>
-                                  <p:childTnLst>
-                                    <p:set>
-                                      <p:cBhvr>
-                                        <p:cTn id="6" dur="1" fill="hold">
-                                          <p:stCondLst>
-                                            <p:cond delay="0"/>
-                                          </p:stCondLst>
-                                        </p:cTn>
-                                        <p:tgtEl>
-                                          <p:spTgt spid="3">
-                                            <p:txEl>
-                                              <p:pRg st="0" end="0"/>
-                                            </p:txEl>
-                                          </p:spTgt>
-                                        </p:tgtEl>
-                                        <p:attrNameLst>
-                                          <p:attrName>style.visibility</p:attrName>
-                                        </p:attrNameLst>
-                                      </p:cBhvr>
-                                      <p:to>
-                                        <p:strVal val="visible"/>
-                                      </p:to>
-                                    </p:set>
-                                  </p:childTnLst>
-                                  <p:subTnLst>
-                                    <p:animClr>
-                                      <p:cBhvr override="childStyle">
-                                        <p:cTn dur="1" fill="hold" display="0" masterRel="nextClick" afterEffect="1"/>
-                                        <p:tgtEl>
-                                          <p:spTgt spid="3">
-                                            <p:txEl>
-                                              <p:pRg st="0" end="0"/>
-                                            </p:txEl>
-                                          </p:spTgt>
-                                        </p:tgtEl>
-                                        <p:attrNameLst>
-                                          <p:attrName>ppt_c</p:attrName>
-                                        </p:attrNameLst>
-                                      </p:cBhvr>
-                                      <p:to>
-                                        <a:srgbClr val="C0C0C0"/>
-                                      </p:to>
-                                    </p:animClr>
-                                  </p:subTnLst>
-                                </p:cTn>
-                              </p:par>
-                            </p:childTnLst>
-                          </p:cTn>
-                        </p:par>
-                      </p:childTnLst>
-                    </p:cTn>
-                  </p:par>
-                  <p:par>
-                    <p:cTn id="7" fill="hold">
-                      <p:stCondLst>
-                        <p:cond delay="indefinite"/>
-                      </p:stCondLst>
-                      <p:childTnLst>
-                        <p:par>
-                          <p:cTn id="8" fill="hold">
-                            <p:stCondLst>
-                              <p:cond delay="0"/>
-                            </p:stCondLst>
-                            <p:childTnLst>
-                              <p:par>
-                                <p:cTn id="9" presetID="1" presetClass="entr" presetSubtype="0" fill="hold" grpId="0" nodeType="clickEffect">
-                                  <p:stCondLst>
-                                    <p:cond delay="0"/>
-                                  </p:stCondLst>
-                                  <p:childTnLst>
-                                    <p:set>
-                                      <p:cBhvr>
-                                        <p:cTn id="10" dur="1" fill="hold">
-                                          <p:stCondLst>
-                                            <p:cond delay="0"/>
-                                          </p:stCondLst>
-                                        </p:cTn>
-                                        <p:tgtEl>
-                                          <p:spTgt spid="3">
-                                            <p:txEl>
-                                              <p:pRg st="1" end="1"/>
-                                            </p:txEl>
-                                          </p:spTgt>
-                                        </p:tgtEl>
-                                        <p:attrNameLst>
-                                          <p:attrName>style.visibility</p:attrName>
-                                        </p:attrNameLst>
-                                      </p:cBhvr>
-                                      <p:to>
-                                        <p:strVal val="visible"/>
-                                      </p:to>
-                                    </p:set>
-                                  </p:childTnLst>
-                                  <p:subTnLst>
-                                    <p:animClr>
-                                      <p:cBhvr override="childStyle">
-                                        <p:cTn dur="1" fill="hold" display="0" masterRel="nextClick" afterEffect="1"/>
-                                        <p:tgtEl>
-                                          <p:spTgt spid="3">
-                                            <p:txEl>
-                                              <p:pRg st="1" end="1"/>
-                                            </p:txEl>
-                                          </p:spTgt>
-                                        </p:tgtEl>
-                                        <p:attrNameLst>
-                                          <p:attrName>ppt_c</p:attrName>
-                                        </p:attrNameLst>
-                                      </p:cBhvr>
-                                      <p:to>
-                                        <a:srgbClr val="C0C0C0"/>
-                                      </p:to>
-                                    </p:animClr>
-                                  </p:subTnLst>
-                                </p:cTn>
-                              </p:par>
-                            </p:childTnLst>
-                          </p:cTn>
-                        </p:par>
-                      </p:childTnLst>
-                    </p:cTn>
-                  </p:par>
-                </p:childTnLst>
-              </p:cTn>
-              <p:prevCondLst>
-                <p:cond evt="onPrev" delay="0">
-                  <p:tgtEl>
-                    <p:sldTgt/>
-                  </p:tgtEl>
-                </p:cond>
-              </p:prevCondLst>
-              <p:nextCondLst>
-                <p:cond evt="onNext" delay="0">
-                  <p:tgtEl>
-                    <p:sldTgt/>
-                  </p:tgtEl>
-                </p:cond>
-              </p:nextCondLst>
-            </p:seq>
-          </p:childTnLst>
-        </p:cTn>
+        <p:cTn id="1" dur="indefinite" restart="never" nodeType="tmRoot"/>
       </p:par>
     </p:tnLst>
-    <p:bldLst>
-      <p:bldP spid="3" grpId="0" build="p"/>
-    </p:bldLst>
   </p:timing>
 </p:sld>
 </file>
@@ -20957,7 +20846,7 @@
         <p:spPr>
           <a:xfrm>
             <a:off x="381000" y="1828800"/>
-            <a:ext cx="8534400" cy="762000"/>
+            <a:ext cx="7543800" cy="762000"/>
           </a:xfrm>
           <a:prstGeom prst="rect">
             <a:avLst/>
@@ -21111,7 +21000,7 @@
         </p:nvSpPr>
         <p:spPr>
           <a:xfrm>
-            <a:off x="381000" y="2743201"/>
+            <a:off x="381000" y="2667000"/>
             <a:ext cx="8534400" cy="609599"/>
           </a:xfrm>
           <a:prstGeom prst="rect">
@@ -21140,7 +21029,7 @@
               <a:defRPr/>
             </a:pPr>
             <a:r>
-              <a:rPr kumimoji="0" lang="en-US" sz="2800" b="0" i="0" u="none" strike="noStrike" kern="1200" cap="none" spc="0" normalizeH="0" baseline="0" noProof="0" smtClean="0">
+              <a:rPr kumimoji="0" lang="en-US" sz="2800" b="0" i="0" u="none" strike="noStrike" kern="1200" cap="none" spc="0" normalizeH="0" baseline="0" noProof="0" dirty="0" smtClean="0">
                 <a:ln>
                   <a:noFill/>
                 </a:ln>
@@ -21154,8 +21043,39 @@
                 <a:ea typeface="+mn-ea"/>
                 <a:cs typeface="+mn-cs"/>
               </a:rPr>
-              <a:t>Loop over enums</a:t>
-            </a:r>
+              <a:t>Loop over </a:t>
+            </a:r>
+            <a:r>
+              <a:rPr kumimoji="0" lang="en-US" sz="2800" b="0" i="0" u="none" strike="noStrike" kern="1200" cap="none" spc="0" normalizeH="0" baseline="0" noProof="0" dirty="0" err="1" smtClean="0">
+                <a:ln>
+                  <a:noFill/>
+                </a:ln>
+                <a:solidFill>
+                  <a:schemeClr val="tx1"/>
+                </a:solidFill>
+                <a:effectLst/>
+                <a:uLnTx/>
+                <a:uFillTx/>
+                <a:latin typeface="+mn-lt"/>
+                <a:ea typeface="+mn-ea"/>
+                <a:cs typeface="+mn-cs"/>
+              </a:rPr>
+              <a:t>enums</a:t>
+            </a:r>
+            <a:endParaRPr kumimoji="0" lang="en-US" sz="2800" b="0" i="0" u="none" strike="noStrike" kern="1200" cap="none" spc="0" normalizeH="0" baseline="0" noProof="0" dirty="0" smtClean="0">
+              <a:ln>
+                <a:noFill/>
+              </a:ln>
+              <a:solidFill>
+                <a:schemeClr val="tx1"/>
+              </a:solidFill>
+              <a:effectLst/>
+              <a:uLnTx/>
+              <a:uFillTx/>
+              <a:latin typeface="+mn-lt"/>
+              <a:ea typeface="+mn-ea"/>
+              <a:cs typeface="+mn-cs"/>
+            </a:endParaRPr>
           </a:p>
         </p:txBody>
       </p:sp>
@@ -21167,8 +21087,8 @@
         </p:nvSpPr>
         <p:spPr>
           <a:xfrm>
-            <a:off x="381000" y="3276600"/>
-            <a:ext cx="8534400" cy="1143000"/>
+            <a:off x="381000" y="3200399"/>
+            <a:ext cx="7543800" cy="1295400"/>
           </a:xfrm>
           <a:prstGeom prst="rect">
             <a:avLst/>
@@ -21284,10 +21204,8 @@
                 <a:latin typeface="consolas"/>
                 <a:cs typeface="Courier New" pitchFamily="49" charset="0"/>
               </a:rPr>
-              <a:t>, E, step)</a:t>
-            </a:r>
-          </a:p>
-          <a:p>
+              <a:t>, E, step</a:t>
+            </a:r>
             <a:r>
               <a:rPr lang="en-GB" b="1" dirty="0" smtClean="0">
                 <a:solidFill>
@@ -21296,8 +21214,56 @@
                 <a:latin typeface="consolas"/>
                 <a:cs typeface="Courier New" pitchFamily="49" charset="0"/>
               </a:rPr>
-              <a:t>  $display("[%0d] %s=%0d", step, E.name, E);</a:t>
-            </a:r>
+              <a:t>) begin</a:t>
+            </a:r>
+            <a:endParaRPr lang="en-GB" b="1" dirty="0" smtClean="0">
+              <a:solidFill>
+                <a:schemeClr val="accent5"/>
+              </a:solidFill>
+              <a:latin typeface="consolas"/>
+              <a:cs typeface="Courier New" pitchFamily="49" charset="0"/>
+            </a:endParaRPr>
+          </a:p>
+          <a:p>
+            <a:r>
+              <a:rPr lang="en-GB" b="1" dirty="0" smtClean="0">
+                <a:solidFill>
+                  <a:schemeClr val="accent5"/>
+                </a:solidFill>
+                <a:latin typeface="consolas"/>
+                <a:cs typeface="Courier New" pitchFamily="49" charset="0"/>
+              </a:rPr>
+              <a:t>  $display("[%0d] %s=%0d", step, E.name, E</a:t>
+            </a:r>
+            <a:r>
+              <a:rPr lang="en-GB" b="1" dirty="0" smtClean="0">
+                <a:solidFill>
+                  <a:schemeClr val="accent5"/>
+                </a:solidFill>
+                <a:latin typeface="consolas"/>
+                <a:cs typeface="Courier New" pitchFamily="49" charset="0"/>
+              </a:rPr>
+              <a:t>);</a:t>
+            </a:r>
+          </a:p>
+          <a:p>
+            <a:r>
+              <a:rPr lang="en-GB" b="1" dirty="0" smtClean="0">
+                <a:solidFill>
+                  <a:schemeClr val="accent5"/>
+                </a:solidFill>
+                <a:latin typeface="consolas"/>
+                <a:cs typeface="Courier New" pitchFamily="49" charset="0"/>
+              </a:rPr>
+              <a:t>end</a:t>
+            </a:r>
+            <a:endParaRPr lang="en-GB" b="1" dirty="0" smtClean="0">
+              <a:solidFill>
+                <a:schemeClr val="accent5"/>
+              </a:solidFill>
+              <a:latin typeface="consolas"/>
+              <a:cs typeface="Courier New" pitchFamily="49" charset="0"/>
+            </a:endParaRPr>
           </a:p>
         </p:txBody>
       </p:sp>
@@ -21311,8 +21277,8 @@
         </p:nvSpPr>
         <p:spPr>
           <a:xfrm>
-            <a:off x="6705600" y="3352800"/>
-            <a:ext cx="1981200" cy="769441"/>
+            <a:off x="6324600" y="3276600"/>
+            <a:ext cx="2133600" cy="769441"/>
           </a:xfrm>
           <a:prstGeom prst="rect">
             <a:avLst/>
@@ -21418,7 +21384,7 @@
         </p:nvSpPr>
         <p:spPr>
           <a:xfrm>
-            <a:off x="381000" y="4495800"/>
+            <a:off x="381000" y="4572000"/>
             <a:ext cx="8534400" cy="609599"/>
           </a:xfrm>
           <a:prstGeom prst="rect">
@@ -21447,7 +21413,7 @@
               <a:defRPr/>
             </a:pPr>
             <a:r>
-              <a:rPr kumimoji="0" lang="en-US" sz="2800" b="0" i="0" u="none" strike="noStrike" kern="1200" cap="none" spc="0" normalizeH="0" baseline="0" noProof="0" smtClean="0">
+              <a:rPr kumimoji="0" lang="en-US" sz="2800" b="0" i="0" u="none" strike="noStrike" kern="1200" cap="none" spc="0" normalizeH="0" baseline="0" noProof="0" dirty="0" smtClean="0">
                 <a:ln>
                   <a:noFill/>
                 </a:ln>
@@ -21464,7 +21430,7 @@
               <a:t>Loop over lines</a:t>
             </a:r>
             <a:r>
-              <a:rPr kumimoji="0" lang="en-US" sz="2800" b="0" i="0" u="none" strike="noStrike" kern="1200" cap="none" spc="0" normalizeH="0" noProof="0" smtClean="0">
+              <a:rPr kumimoji="0" lang="en-US" sz="2800" b="0" i="0" u="none" strike="noStrike" kern="1200" cap="none" spc="0" normalizeH="0" noProof="0" dirty="0" smtClean="0">
                 <a:ln>
                   <a:noFill/>
                 </a:ln>
@@ -21480,7 +21446,7 @@
               </a:rPr>
               <a:t> in a text file</a:t>
             </a:r>
-            <a:endParaRPr kumimoji="0" lang="en-US" sz="2800" b="0" i="0" u="none" strike="noStrike" kern="1200" cap="none" spc="0" normalizeH="0" baseline="0" noProof="0" smtClean="0">
+            <a:endParaRPr kumimoji="0" lang="en-US" sz="2800" b="0" i="0" u="none" strike="noStrike" kern="1200" cap="none" spc="0" normalizeH="0" baseline="0" noProof="0" dirty="0" smtClean="0">
               <a:ln>
                 <a:noFill/>
               </a:ln>
@@ -21505,8 +21471,8 @@
         </p:nvSpPr>
         <p:spPr>
           <a:xfrm>
-            <a:off x="381000" y="5029198"/>
-            <a:ext cx="8534400" cy="1295401"/>
+            <a:off x="381000" y="5105398"/>
+            <a:ext cx="7543800" cy="1295401"/>
           </a:xfrm>
           <a:prstGeom prst="rect">
             <a:avLst/>
@@ -23956,33 +23922,15 @@
                                   </p:childTnLst>
                                 </p:cTn>
                               </p:par>
-                            </p:childTnLst>
-                          </p:cTn>
-                        </p:par>
-                      </p:childTnLst>
-                    </p:cTn>
-                  </p:par>
-                  <p:par>
-                    <p:cTn id="35" fill="hold">
-                      <p:stCondLst>
-                        <p:cond delay="indefinite"/>
-                      </p:stCondLst>
-                      <p:childTnLst>
-                        <p:par>
-                          <p:cTn id="36" fill="hold">
-                            <p:stCondLst>
-                              <p:cond delay="0"/>
-                            </p:stCondLst>
-                            <p:childTnLst>
                               <p:par>
-                                <p:cTn id="37" presetID="1" presetClass="entr" presetSubtype="0" fill="hold" grpId="0" nodeType="clickEffect">
+                                <p:cTn id="35" presetID="1" presetClass="entr" presetSubtype="0" fill="hold" grpId="0" nodeType="withEffect">
                                   <p:stCondLst>
                                     <p:cond delay="0"/>
                                   </p:stCondLst>
                                   <p:childTnLst>
                                     <p:set>
                                       <p:cBhvr>
-                                        <p:cTn id="38" dur="1" fill="hold">
+                                        <p:cTn id="36" dur="1" fill="hold">
                                           <p:stCondLst>
                                             <p:cond delay="0"/>
                                           </p:stCondLst>
@@ -24001,8 +23949,26 @@
                                   </p:childTnLst>
                                 </p:cTn>
                               </p:par>
+                            </p:childTnLst>
+                          </p:cTn>
+                        </p:par>
+                      </p:childTnLst>
+                    </p:cTn>
+                  </p:par>
+                  <p:par>
+                    <p:cTn id="37" fill="hold">
+                      <p:stCondLst>
+                        <p:cond delay="indefinite"/>
+                      </p:stCondLst>
+                      <p:childTnLst>
+                        <p:par>
+                          <p:cTn id="38" fill="hold">
+                            <p:stCondLst>
+                              <p:cond delay="0"/>
+                            </p:stCondLst>
+                            <p:childTnLst>
                               <p:par>
-                                <p:cTn id="39" presetID="1" presetClass="entr" presetSubtype="0" fill="hold" grpId="0" nodeType="withEffect">
+                                <p:cTn id="39" presetID="1" presetClass="entr" presetSubtype="0" fill="hold" grpId="0" nodeType="clickEffect">
                                   <p:stCondLst>
                                     <p:cond delay="0"/>
                                   </p:stCondLst>

</xml_diff>

<commit_message>
Fix one typo. This is the version that was sent to the DVCon website.
</commit_message>
<xml_diff>
--- a/svlib/doc/163-aq602-final.pptx
+++ b/svlib/doc/163-aq602-final.pptx
@@ -233,7 +233,7 @@
             <a:fld id="{9503A2D3-DDE0-4FE7-BBF0-72D855FCA9B9}" type="datetimeFigureOut">
               <a:rPr lang="en-GB" smtClean="0"/>
               <a:pPr/>
-              <a:t>04/03/2014</a:t>
+              <a:t>14/03/2014</a:t>
             </a:fld>
             <a:endParaRPr lang="en-GB"/>
           </a:p>
@@ -395,7 +395,7 @@
             <a:fld id="{4CCD0033-5F2B-446E-B3A5-D3C3D848D8F7}" type="datetimeFigureOut">
               <a:rPr lang="en-GB" smtClean="0"/>
               <a:pPr/>
-              <a:t>04/03/2014</a:t>
+              <a:t>14/03/2014</a:t>
             </a:fld>
             <a:endParaRPr lang="en-GB"/>
           </a:p>
@@ -1560,7 +1560,7 @@
     </p:spTree>
     <p:extLst>
       <p:ext uri="{BB962C8B-B14F-4D97-AF65-F5344CB8AC3E}">
-        <p14:creationId xmlns="" xmlns:p14="http://schemas.microsoft.com/office/powerpoint/2010/main" val="989869968"/>
+        <p14:creationId xmlns:p14="http://schemas.microsoft.com/office/powerpoint/2010/main" xmlns="" val="989869968"/>
       </p:ext>
     </p:extLst>
   </p:cSld>
@@ -1703,7 +1703,7 @@
             <a:fld id="{1736D410-BB1B-47BE-81F8-FA61DEEC5942}" type="datetimeFigureOut">
               <a:rPr lang="en-US" smtClean="0"/>
               <a:pPr/>
-              <a:t>3/4/2014</a:t>
+              <a:t>3/14/2014</a:t>
             </a:fld>
             <a:endParaRPr lang="en-US"/>
           </a:p>
@@ -1755,7 +1755,7 @@
     </p:spTree>
     <p:extLst>
       <p:ext uri="{BB962C8B-B14F-4D97-AF65-F5344CB8AC3E}">
-        <p14:creationId xmlns="" xmlns:p14="http://schemas.microsoft.com/office/powerpoint/2010/main" val="1452775338"/>
+        <p14:creationId xmlns:p14="http://schemas.microsoft.com/office/powerpoint/2010/main" xmlns="" val="1452775338"/>
       </p:ext>
     </p:extLst>
   </p:cSld>
@@ -1891,7 +1891,7 @@
             <a:fld id="{1736D410-BB1B-47BE-81F8-FA61DEEC5942}" type="datetimeFigureOut">
               <a:rPr lang="en-US" smtClean="0"/>
               <a:pPr/>
-              <a:t>3/4/2014</a:t>
+              <a:t>3/14/2014</a:t>
             </a:fld>
             <a:endParaRPr lang="en-US"/>
           </a:p>
@@ -1943,7 +1943,7 @@
     </p:spTree>
     <p:extLst>
       <p:ext uri="{BB962C8B-B14F-4D97-AF65-F5344CB8AC3E}">
-        <p14:creationId xmlns="" xmlns:p14="http://schemas.microsoft.com/office/powerpoint/2010/main" val="3894337954"/>
+        <p14:creationId xmlns:p14="http://schemas.microsoft.com/office/powerpoint/2010/main" xmlns="" val="3894337954"/>
       </p:ext>
     </p:extLst>
   </p:cSld>
@@ -2141,7 +2141,7 @@
             <a:fld id="{1736D410-BB1B-47BE-81F8-FA61DEEC5942}" type="datetimeFigureOut">
               <a:rPr lang="en-US" smtClean="0"/>
               <a:pPr/>
-              <a:t>3/4/2014</a:t>
+              <a:t>3/14/2014</a:t>
             </a:fld>
             <a:endParaRPr lang="en-US"/>
           </a:p>
@@ -2193,7 +2193,7 @@
     </p:spTree>
     <p:extLst>
       <p:ext uri="{BB962C8B-B14F-4D97-AF65-F5344CB8AC3E}">
-        <p14:creationId xmlns="" xmlns:p14="http://schemas.microsoft.com/office/powerpoint/2010/main" val="1362160421"/>
+        <p14:creationId xmlns:p14="http://schemas.microsoft.com/office/powerpoint/2010/main" xmlns="" val="1362160421"/>
       </p:ext>
     </p:extLst>
   </p:cSld>
@@ -2329,7 +2329,7 @@
             <a:fld id="{1736D410-BB1B-47BE-81F8-FA61DEEC5942}" type="datetimeFigureOut">
               <a:rPr lang="en-US" smtClean="0"/>
               <a:pPr/>
-              <a:t>3/4/2014</a:t>
+              <a:t>3/14/2014</a:t>
             </a:fld>
             <a:endParaRPr lang="en-US"/>
           </a:p>
@@ -2381,7 +2381,7 @@
     </p:spTree>
     <p:extLst>
       <p:ext uri="{BB962C8B-B14F-4D97-AF65-F5344CB8AC3E}">
-        <p14:creationId xmlns="" xmlns:p14="http://schemas.microsoft.com/office/powerpoint/2010/main" val="1001508708"/>
+        <p14:creationId xmlns:p14="http://schemas.microsoft.com/office/powerpoint/2010/main" xmlns="" val="1001508708"/>
       </p:ext>
     </p:extLst>
   </p:cSld>
@@ -2583,7 +2583,7 @@
             <a:fld id="{1736D410-BB1B-47BE-81F8-FA61DEEC5942}" type="datetimeFigureOut">
               <a:rPr lang="en-US" smtClean="0"/>
               <a:pPr/>
-              <a:t>3/4/2014</a:t>
+              <a:t>3/14/2014</a:t>
             </a:fld>
             <a:endParaRPr lang="en-US"/>
           </a:p>
@@ -2635,7 +2635,7 @@
     </p:spTree>
     <p:extLst>
       <p:ext uri="{BB962C8B-B14F-4D97-AF65-F5344CB8AC3E}">
-        <p14:creationId xmlns="" xmlns:p14="http://schemas.microsoft.com/office/powerpoint/2010/main" val="3465844944"/>
+        <p14:creationId xmlns:p14="http://schemas.microsoft.com/office/powerpoint/2010/main" xmlns="" val="3465844944"/>
       </p:ext>
     </p:extLst>
   </p:cSld>
@@ -2887,7 +2887,7 @@
             <a:fld id="{1736D410-BB1B-47BE-81F8-FA61DEEC5942}" type="datetimeFigureOut">
               <a:rPr lang="en-US" smtClean="0"/>
               <a:pPr/>
-              <a:t>3/4/2014</a:t>
+              <a:t>3/14/2014</a:t>
             </a:fld>
             <a:endParaRPr lang="en-US"/>
           </a:p>
@@ -2939,7 +2939,7 @@
     </p:spTree>
     <p:extLst>
       <p:ext uri="{BB962C8B-B14F-4D97-AF65-F5344CB8AC3E}">
-        <p14:creationId xmlns="" xmlns:p14="http://schemas.microsoft.com/office/powerpoint/2010/main" val="3500538590"/>
+        <p14:creationId xmlns:p14="http://schemas.microsoft.com/office/powerpoint/2010/main" xmlns="" val="3500538590"/>
       </p:ext>
     </p:extLst>
   </p:cSld>
@@ -3331,7 +3331,7 @@
             <a:fld id="{1736D410-BB1B-47BE-81F8-FA61DEEC5942}" type="datetimeFigureOut">
               <a:rPr lang="en-US" smtClean="0"/>
               <a:pPr/>
-              <a:t>3/4/2014</a:t>
+              <a:t>3/14/2014</a:t>
             </a:fld>
             <a:endParaRPr lang="en-US"/>
           </a:p>
@@ -3383,7 +3383,7 @@
     </p:spTree>
     <p:extLst>
       <p:ext uri="{BB962C8B-B14F-4D97-AF65-F5344CB8AC3E}">
-        <p14:creationId xmlns="" xmlns:p14="http://schemas.microsoft.com/office/powerpoint/2010/main" val="1822163244"/>
+        <p14:creationId xmlns:p14="http://schemas.microsoft.com/office/powerpoint/2010/main" xmlns="" val="1822163244"/>
       </p:ext>
     </p:extLst>
   </p:cSld>
@@ -3428,7 +3428,7 @@
             <a:fld id="{1736D410-BB1B-47BE-81F8-FA61DEEC5942}" type="datetimeFigureOut">
               <a:rPr lang="en-US" smtClean="0"/>
               <a:pPr/>
-              <a:t>3/4/2014</a:t>
+              <a:t>3/14/2014</a:t>
             </a:fld>
             <a:endParaRPr lang="en-US"/>
           </a:p>
@@ -3480,7 +3480,7 @@
     </p:spTree>
     <p:extLst>
       <p:ext uri="{BB962C8B-B14F-4D97-AF65-F5344CB8AC3E}">
-        <p14:creationId xmlns="" xmlns:p14="http://schemas.microsoft.com/office/powerpoint/2010/main" val="2405767068"/>
+        <p14:creationId xmlns:p14="http://schemas.microsoft.com/office/powerpoint/2010/main" xmlns="" val="2405767068"/>
       </p:ext>
     </p:extLst>
   </p:cSld>
@@ -3716,7 +3716,7 @@
             <a:fld id="{1736D410-BB1B-47BE-81F8-FA61DEEC5942}" type="datetimeFigureOut">
               <a:rPr lang="en-US" smtClean="0"/>
               <a:pPr/>
-              <a:t>3/4/2014</a:t>
+              <a:t>3/14/2014</a:t>
             </a:fld>
             <a:endParaRPr lang="en-US"/>
           </a:p>
@@ -3768,7 +3768,7 @@
     </p:spTree>
     <p:extLst>
       <p:ext uri="{BB962C8B-B14F-4D97-AF65-F5344CB8AC3E}">
-        <p14:creationId xmlns="" xmlns:p14="http://schemas.microsoft.com/office/powerpoint/2010/main" val="1001517974"/>
+        <p14:creationId xmlns:p14="http://schemas.microsoft.com/office/powerpoint/2010/main" xmlns="" val="1001517974"/>
       </p:ext>
     </p:extLst>
   </p:cSld>
@@ -3980,7 +3980,7 @@
             <a:fld id="{1736D410-BB1B-47BE-81F8-FA61DEEC5942}" type="datetimeFigureOut">
               <a:rPr lang="en-US" smtClean="0"/>
               <a:pPr/>
-              <a:t>3/4/2014</a:t>
+              <a:t>3/14/2014</a:t>
             </a:fld>
             <a:endParaRPr lang="en-US"/>
           </a:p>
@@ -4032,7 +4032,7 @@
     </p:spTree>
     <p:extLst>
       <p:ext uri="{BB962C8B-B14F-4D97-AF65-F5344CB8AC3E}">
-        <p14:creationId xmlns="" xmlns:p14="http://schemas.microsoft.com/office/powerpoint/2010/main" val="1032843098"/>
+        <p14:creationId xmlns:p14="http://schemas.microsoft.com/office/powerpoint/2010/main" xmlns="" val="1032843098"/>
       </p:ext>
     </p:extLst>
   </p:cSld>
@@ -4109,7 +4109,7 @@
             <a:fld id="{1736D410-BB1B-47BE-81F8-FA61DEEC5942}" type="datetimeFigureOut">
               <a:rPr lang="en-US" smtClean="0"/>
               <a:pPr/>
-              <a:t>3/4/2014</a:t>
+              <a:t>3/14/2014</a:t>
             </a:fld>
             <a:endParaRPr lang="en-US"/>
           </a:p>
@@ -4192,7 +4192,7 @@
     </p:spTree>
     <p:extLst>
       <p:ext uri="{BB962C8B-B14F-4D97-AF65-F5344CB8AC3E}">
-        <p14:creationId xmlns="" xmlns:p14="http://schemas.microsoft.com/office/powerpoint/2010/main" val="2425591320"/>
+        <p14:creationId xmlns:p14="http://schemas.microsoft.com/office/powerpoint/2010/main" xmlns="" val="2425591320"/>
       </p:ext>
     </p:extLst>
   </p:cSld>
@@ -4613,7 +4613,7 @@
     </p:spTree>
     <p:extLst>
       <p:ext uri="{BB962C8B-B14F-4D97-AF65-F5344CB8AC3E}">
-        <p14:creationId xmlns="" xmlns:p14="http://schemas.microsoft.com/office/powerpoint/2010/main" val="3983013449"/>
+        <p14:creationId xmlns:p14="http://schemas.microsoft.com/office/powerpoint/2010/main" xmlns="" val="3983013449"/>
       </p:ext>
     </p:extLst>
   </p:cSld>
@@ -6726,7 +6726,7 @@
               <a:t>(1), </a:t>
             </a:r>
             <a:r>
-              <a:rPr lang="en-GB" b="1" dirty="0" err="1" smtClean="0">
+              <a:rPr lang="en-GB" b="1" err="1" smtClean="0">
                 <a:solidFill>
                   <a:schemeClr val="accent5"/>
                 </a:solidFill>
@@ -6736,7 +6736,7 @@
               <a:t>re</a:t>
             </a:r>
             <a:r>
-              <a:rPr lang="en-GB" b="1" dirty="0" err="1" smtClean="0">
+              <a:rPr lang="en-GB" b="1" err="1" smtClean="0">
                 <a:solidFill>
                   <a:schemeClr val="accent6"/>
                 </a:solidFill>
@@ -6746,15 +6746,32 @@
               <a:t>.getMatchStart</a:t>
             </a:r>
             <a:r>
-              <a:rPr lang="en-GB" b="1" dirty="0" smtClean="0">
-                <a:solidFill>
-                  <a:schemeClr val="accent5"/>
-                </a:solidFill>
-                <a:latin typeface="consolas"/>
-                <a:cs typeface="Courier New" pitchFamily="49" charset="0"/>
-              </a:rPr>
-              <a:t>(1), pos);</a:t>
-            </a:r>
+              <a:rPr lang="en-GB" b="1" smtClean="0">
+                <a:solidFill>
+                  <a:schemeClr val="accent5"/>
+                </a:solidFill>
+                <a:latin typeface="consolas"/>
+                <a:cs typeface="Courier New" pitchFamily="49" charset="0"/>
+              </a:rPr>
+              <a:t>(1</a:t>
+            </a:r>
+            <a:r>
+              <a:rPr lang="en-GB" b="1" smtClean="0">
+                <a:solidFill>
+                  <a:schemeClr val="accent5"/>
+                </a:solidFill>
+                <a:latin typeface="consolas"/>
+                <a:cs typeface="Courier New" pitchFamily="49" charset="0"/>
+              </a:rPr>
+              <a:t>));</a:t>
+            </a:r>
+            <a:endParaRPr lang="en-GB" b="1" dirty="0" smtClean="0">
+              <a:solidFill>
+                <a:schemeClr val="accent5"/>
+              </a:solidFill>
+              <a:latin typeface="consolas"/>
+              <a:cs typeface="Courier New" pitchFamily="49" charset="0"/>
+            </a:endParaRPr>
           </a:p>
           <a:p>
             <a:r>
@@ -21204,8 +21221,10 @@
                 <a:latin typeface="consolas"/>
                 <a:cs typeface="Courier New" pitchFamily="49" charset="0"/>
               </a:rPr>
-              <a:t>, E, step</a:t>
-            </a:r>
+              <a:t>, E, step) begin</a:t>
+            </a:r>
+          </a:p>
+          <a:p>
             <a:r>
               <a:rPr lang="en-GB" b="1" dirty="0" smtClean="0">
                 <a:solidFill>
@@ -21214,15 +21233,8 @@
                 <a:latin typeface="consolas"/>
                 <a:cs typeface="Courier New" pitchFamily="49" charset="0"/>
               </a:rPr>
-              <a:t>) begin</a:t>
-            </a:r>
-            <a:endParaRPr lang="en-GB" b="1" dirty="0" smtClean="0">
-              <a:solidFill>
-                <a:schemeClr val="accent5"/>
-              </a:solidFill>
-              <a:latin typeface="consolas"/>
-              <a:cs typeface="Courier New" pitchFamily="49" charset="0"/>
-            </a:endParaRPr>
+              <a:t>  $display("[%0d] %s=%0d", step, E.name, E);</a:t>
+            </a:r>
           </a:p>
           <a:p>
             <a:r>
@@ -21233,37 +21245,8 @@
                 <a:latin typeface="consolas"/>
                 <a:cs typeface="Courier New" pitchFamily="49" charset="0"/>
               </a:rPr>
-              <a:t>  $display("[%0d] %s=%0d", step, E.name, E</a:t>
-            </a:r>
-            <a:r>
-              <a:rPr lang="en-GB" b="1" dirty="0" smtClean="0">
-                <a:solidFill>
-                  <a:schemeClr val="accent5"/>
-                </a:solidFill>
-                <a:latin typeface="consolas"/>
-                <a:cs typeface="Courier New" pitchFamily="49" charset="0"/>
-              </a:rPr>
-              <a:t>);</a:t>
-            </a:r>
-          </a:p>
-          <a:p>
-            <a:r>
-              <a:rPr lang="en-GB" b="1" dirty="0" smtClean="0">
-                <a:solidFill>
-                  <a:schemeClr val="accent5"/>
-                </a:solidFill>
-                <a:latin typeface="consolas"/>
-                <a:cs typeface="Courier New" pitchFamily="49" charset="0"/>
-              </a:rPr>
               <a:t>end</a:t>
             </a:r>
-            <a:endParaRPr lang="en-GB" b="1" dirty="0" smtClean="0">
-              <a:solidFill>
-                <a:schemeClr val="accent5"/>
-              </a:solidFill>
-              <a:latin typeface="consolas"/>
-              <a:cs typeface="Courier New" pitchFamily="49" charset="0"/>
-            </a:endParaRPr>
           </a:p>
         </p:txBody>
       </p:sp>

</xml_diff>